<commit_message>
update report and fix timePerExercise incorrect reset
</commit_message>
<xml_diff>
--- a/report/neurorecovery_final_presentation.pptx
+++ b/report/neurorecovery_final_presentation.pptx
@@ -74,7 +74,7 @@
         <p:txBody>
           <a:bodyPr/>
           <a:p>
-            <a:fld id="{A021D9DA-F2D3-47A7-A167-45FBD44E1A33}" type="slidenum">
+            <a:fld id="{D511F990-0693-4FDB-B5DD-3A3DFE304180}" type="slidenum">
               <a:t>&lt;#&gt;</a:t>
             </a:fld>
           </a:p>
@@ -283,7 +283,7 @@
         <p:txBody>
           <a:bodyPr/>
           <a:p>
-            <a:fld id="{30F4B030-473F-4FA5-AE37-F0007F22FEA7}" type="slidenum">
+            <a:fld id="{D6559F43-390B-4471-8471-8ED0437D5305}" type="slidenum">
               <a:t>&lt;#&gt;</a:t>
             </a:fld>
           </a:p>
@@ -578,7 +578,7 @@
         <p:txBody>
           <a:bodyPr/>
           <a:p>
-            <a:fld id="{DC61F3B2-B692-448D-A85E-EBF83F7B8B41}" type="slidenum">
+            <a:fld id="{79A0210C-BCB1-4F4A-8A28-565B6C741AC0}" type="slidenum">
               <a:t>&lt;#&gt;</a:t>
             </a:fld>
           </a:p>
@@ -959,7 +959,7 @@
         <p:txBody>
           <a:bodyPr/>
           <a:p>
-            <a:fld id="{4BDD0EFB-914C-47E7-891A-CE4F8F25C96A}" type="slidenum">
+            <a:fld id="{CEF21CF3-AD6B-4BE9-9502-63125148F13B}" type="slidenum">
               <a:t>&lt;#&gt;</a:t>
             </a:fld>
           </a:p>
@@ -2099,7 +2099,7 @@
         <p:txBody>
           <a:bodyPr/>
           <a:p>
-            <a:fld id="{273895D1-6170-4C8A-A288-26FE686BE0EB}" type="slidenum">
+            <a:fld id="{DB105A50-2275-498D-B93B-4E0478B08C59}" type="slidenum">
               <a:t>&lt;#&gt;</a:t>
             </a:fld>
           </a:p>
@@ -3554,7 +3554,7 @@
         <p:txBody>
           <a:bodyPr/>
           <a:p>
-            <a:fld id="{E8A6E086-FC4E-46BC-9207-B1ED6762331D}" type="slidenum">
+            <a:fld id="{3122215C-B1C8-4470-BF97-14F675E7C56B}" type="slidenum">
               <a:t>&lt;#&gt;</a:t>
             </a:fld>
           </a:p>
@@ -3763,7 +3763,7 @@
         <p:txBody>
           <a:bodyPr/>
           <a:p>
-            <a:fld id="{69C8E9CB-4E0C-4B40-9DE3-B4A93643CC94}" type="slidenum">
+            <a:fld id="{A71AA085-2B1D-40C0-968E-8413970A5537}" type="slidenum">
               <a:t>&lt;#&gt;</a:t>
             </a:fld>
           </a:p>
@@ -3886,7 +3886,7 @@
         <p:txBody>
           <a:bodyPr/>
           <a:p>
-            <a:fld id="{F86EE0DC-3354-4125-9A9A-0CABF36BBB19}" type="slidenum">
+            <a:fld id="{4945C620-C0E6-4F26-BEF7-7AE3DB807790}" type="slidenum">
               <a:t>&lt;#&gt;</a:t>
             </a:fld>
           </a:p>
@@ -4007,7 +4007,7 @@
         <p:txBody>
           <a:bodyPr/>
           <a:p>
-            <a:fld id="{7325B27C-7F9B-44B0-A119-5D5729285D5B}" type="slidenum">
+            <a:fld id="{AD98FAED-503F-42AF-AEDF-E826CE056EE5}" type="slidenum">
               <a:t>&lt;#&gt;</a:t>
             </a:fld>
           </a:p>
@@ -4259,7 +4259,7 @@
         <p:txBody>
           <a:bodyPr/>
           <a:p>
-            <a:fld id="{8077FD86-73ED-4222-85DB-EEF85FFC2E18}" type="slidenum">
+            <a:fld id="{D6491913-9AD6-4E72-B27D-8FD3BB25711B}" type="slidenum">
               <a:t>&lt;#&gt;</a:t>
             </a:fld>
           </a:p>
@@ -4511,7 +4511,7 @@
         <p:txBody>
           <a:bodyPr/>
           <a:p>
-            <a:fld id="{1F7F4CE2-AAF5-4673-B69A-815F8490683A}" type="slidenum">
+            <a:fld id="{CCD56149-F3E7-4C28-A4F1-79BE54781B51}" type="slidenum">
               <a:t>&lt;#&gt;</a:t>
             </a:fld>
           </a:p>
@@ -4763,7 +4763,7 @@
         <p:txBody>
           <a:bodyPr/>
           <a:p>
-            <a:fld id="{E35CB7F7-CCD3-426C-ABA5-D390E6866FD6}" type="slidenum">
+            <a:fld id="{AD0EF4F5-645B-4FED-9CC5-13ACB8E36E0C}" type="slidenum">
               <a:t>&lt;#&gt;</a:t>
             </a:fld>
           </a:p>
@@ -4821,7 +4821,7 @@
         <p:spPr>
           <a:xfrm>
             <a:off x="0" y="0"/>
-            <a:ext cx="10079280" cy="5669280"/>
+            <a:ext cx="10078920" cy="5668920"/>
           </a:xfrm>
           <a:prstGeom prst="rect">
             <a:avLst/>
@@ -4868,7 +4868,7 @@
         <p:spPr>
           <a:xfrm>
             <a:off x="0" y="0"/>
-            <a:ext cx="10079280" cy="3779280"/>
+            <a:ext cx="10078920" cy="3778920"/>
           </a:xfrm>
           <a:prstGeom prst="rect">
             <a:avLst/>
@@ -4916,287 +4916,13 @@
             <a:spLocks noGrp="1"/>
           </p:cNvSpPr>
           <p:nvPr>
-            <p:ph type="title"/>
-          </p:nvPr>
-        </p:nvSpPr>
-        <p:spPr>
-          <a:xfrm>
-            <a:off x="360000" y="225720"/>
-            <a:ext cx="9359280" cy="718200"/>
-          </a:xfrm>
-          <a:prstGeom prst="rect">
-            <a:avLst/>
-          </a:prstGeom>
-          <a:noFill/>
-          <a:ln w="0">
-            <a:noFill/>
-          </a:ln>
-        </p:spPr>
-        <p:txBody>
-          <a:bodyPr lIns="0" rIns="0" tIns="0" bIns="0" anchor="ctr" anchorCtr="1">
-            <a:noAutofit/>
-          </a:bodyPr>
-          <a:p>
-            <a:pPr indent="0">
-              <a:buNone/>
-            </a:pPr>
-            <a:r>
-              <a:rPr b="0" lang="en-GB" sz="1800" spc="-1" strike="noStrike">
-                <a:solidFill>
-                  <a:srgbClr val="000000"/>
-                </a:solidFill>
-                <a:latin typeface="Arial"/>
-              </a:rPr>
-              <a:t>Click to edit the title text format</a:t>
-            </a:r>
-            <a:endParaRPr b="0" lang="en-GB" sz="1800" spc="-1" strike="noStrike">
-              <a:solidFill>
-                <a:srgbClr val="000000"/>
-              </a:solidFill>
-              <a:latin typeface="Arial"/>
-            </a:endParaRPr>
-          </a:p>
-        </p:txBody>
-      </p:sp>
-      <p:sp>
-        <p:nvSpPr>
-          <p:cNvPr id="3" name="PlaceHolder 2"/>
-          <p:cNvSpPr>
-            <a:spLocks noGrp="1"/>
-          </p:cNvSpPr>
-          <p:nvPr>
-            <p:ph type="body"/>
-          </p:nvPr>
-        </p:nvSpPr>
-        <p:spPr>
-          <a:xfrm>
-            <a:off x="360000" y="1485000"/>
-            <a:ext cx="9359280" cy="3779280"/>
-          </a:xfrm>
-          <a:prstGeom prst="rect">
-            <a:avLst/>
-          </a:prstGeom>
-          <a:noFill/>
-          <a:ln w="0">
-            <a:noFill/>
-          </a:ln>
-        </p:spPr>
-        <p:txBody>
-          <a:bodyPr lIns="0" rIns="0" tIns="0" bIns="0" anchor="t">
-            <a:normAutofit/>
-          </a:bodyPr>
-          <a:p>
-            <a:pPr marL="432000" indent="-324000">
-              <a:spcBef>
-                <a:spcPts val="1417"/>
-              </a:spcBef>
-              <a:buClr>
-                <a:srgbClr val="000000"/>
-              </a:buClr>
-              <a:buSzPct val="45000"/>
-              <a:buFont typeface="Wingdings" charset="2"/>
-              <a:buChar char=""/>
-            </a:pPr>
-            <a:r>
-              <a:rPr b="0" lang="en-GB" sz="1800" spc="-1" strike="noStrike">
-                <a:solidFill>
-                  <a:srgbClr val="000000"/>
-                </a:solidFill>
-                <a:latin typeface="Arial"/>
-              </a:rPr>
-              <a:t>Click to edit the outline text format</a:t>
-            </a:r>
-            <a:endParaRPr b="0" lang="en-GB" sz="1800" spc="-1" strike="noStrike">
-              <a:solidFill>
-                <a:srgbClr val="000000"/>
-              </a:solidFill>
-              <a:latin typeface="Arial"/>
-            </a:endParaRPr>
-          </a:p>
-          <a:p>
-            <a:pPr lvl="1" marL="864000" indent="-324000">
-              <a:spcBef>
-                <a:spcPts val="1134"/>
-              </a:spcBef>
-              <a:buClr>
-                <a:srgbClr val="000000"/>
-              </a:buClr>
-              <a:buSzPct val="75000"/>
-              <a:buFont typeface="Symbol" charset="2"/>
-              <a:buChar char=""/>
-            </a:pPr>
-            <a:r>
-              <a:rPr b="0" lang="en-GB" sz="1800" spc="-1" strike="noStrike">
-                <a:solidFill>
-                  <a:srgbClr val="000000"/>
-                </a:solidFill>
-                <a:latin typeface="Arial"/>
-              </a:rPr>
-              <a:t>Second Outline Level</a:t>
-            </a:r>
-            <a:endParaRPr b="0" lang="en-GB" sz="1800" spc="-1" strike="noStrike">
-              <a:solidFill>
-                <a:srgbClr val="000000"/>
-              </a:solidFill>
-              <a:latin typeface="Arial"/>
-            </a:endParaRPr>
-          </a:p>
-          <a:p>
-            <a:pPr lvl="2" marL="1296000" indent="-288000">
-              <a:spcBef>
-                <a:spcPts val="850"/>
-              </a:spcBef>
-              <a:buClr>
-                <a:srgbClr val="000000"/>
-              </a:buClr>
-              <a:buSzPct val="45000"/>
-              <a:buFont typeface="Wingdings" charset="2"/>
-              <a:buChar char=""/>
-            </a:pPr>
-            <a:r>
-              <a:rPr b="0" lang="en-GB" sz="1800" spc="-1" strike="noStrike">
-                <a:solidFill>
-                  <a:srgbClr val="000000"/>
-                </a:solidFill>
-                <a:latin typeface="Arial"/>
-              </a:rPr>
-              <a:t>Third Outline Level</a:t>
-            </a:r>
-            <a:endParaRPr b="0" lang="en-GB" sz="1800" spc="-1" strike="noStrike">
-              <a:solidFill>
-                <a:srgbClr val="000000"/>
-              </a:solidFill>
-              <a:latin typeface="Arial"/>
-            </a:endParaRPr>
-          </a:p>
-          <a:p>
-            <a:pPr lvl="3" marL="1728000" indent="-216000">
-              <a:spcBef>
-                <a:spcPts val="567"/>
-              </a:spcBef>
-              <a:buClr>
-                <a:srgbClr val="000000"/>
-              </a:buClr>
-              <a:buSzPct val="75000"/>
-              <a:buFont typeface="Symbol" charset="2"/>
-              <a:buChar char=""/>
-            </a:pPr>
-            <a:r>
-              <a:rPr b="0" lang="en-GB" sz="1800" spc="-1" strike="noStrike">
-                <a:solidFill>
-                  <a:srgbClr val="000000"/>
-                </a:solidFill>
-                <a:latin typeface="Arial"/>
-              </a:rPr>
-              <a:t>Fourth Outline Level</a:t>
-            </a:r>
-            <a:endParaRPr b="0" lang="en-GB" sz="1800" spc="-1" strike="noStrike">
-              <a:solidFill>
-                <a:srgbClr val="000000"/>
-              </a:solidFill>
-              <a:latin typeface="Arial"/>
-            </a:endParaRPr>
-          </a:p>
-          <a:p>
-            <a:pPr lvl="4" marL="2160000" indent="-216000">
-              <a:spcBef>
-                <a:spcPts val="283"/>
-              </a:spcBef>
-              <a:buClr>
-                <a:srgbClr val="000000"/>
-              </a:buClr>
-              <a:buSzPct val="45000"/>
-              <a:buFont typeface="Wingdings" charset="2"/>
-              <a:buChar char=""/>
-            </a:pPr>
-            <a:r>
-              <a:rPr b="0" lang="en-GB" sz="1800" spc="-1" strike="noStrike">
-                <a:solidFill>
-                  <a:srgbClr val="000000"/>
-                </a:solidFill>
-                <a:latin typeface="Arial"/>
-              </a:rPr>
-              <a:t>Fifth Outline Level</a:t>
-            </a:r>
-            <a:endParaRPr b="0" lang="en-GB" sz="1800" spc="-1" strike="noStrike">
-              <a:solidFill>
-                <a:srgbClr val="000000"/>
-              </a:solidFill>
-              <a:latin typeface="Arial"/>
-            </a:endParaRPr>
-          </a:p>
-          <a:p>
-            <a:pPr lvl="5" marL="2592000" indent="-216000">
-              <a:spcBef>
-                <a:spcPts val="283"/>
-              </a:spcBef>
-              <a:buClr>
-                <a:srgbClr val="000000"/>
-              </a:buClr>
-              <a:buSzPct val="45000"/>
-              <a:buFont typeface="Wingdings" charset="2"/>
-              <a:buChar char=""/>
-            </a:pPr>
-            <a:r>
-              <a:rPr b="0" lang="en-GB" sz="1800" spc="-1" strike="noStrike">
-                <a:solidFill>
-                  <a:srgbClr val="000000"/>
-                </a:solidFill>
-                <a:latin typeface="Arial"/>
-              </a:rPr>
-              <a:t>Sixth Outline Level</a:t>
-            </a:r>
-            <a:endParaRPr b="0" lang="en-GB" sz="1800" spc="-1" strike="noStrike">
-              <a:solidFill>
-                <a:srgbClr val="000000"/>
-              </a:solidFill>
-              <a:latin typeface="Arial"/>
-            </a:endParaRPr>
-          </a:p>
-          <a:p>
-            <a:pPr lvl="6" marL="3024000" indent="-216000">
-              <a:spcBef>
-                <a:spcPts val="283"/>
-              </a:spcBef>
-              <a:buClr>
-                <a:srgbClr val="000000"/>
-              </a:buClr>
-              <a:buSzPct val="45000"/>
-              <a:buFont typeface="Wingdings" charset="2"/>
-              <a:buChar char=""/>
-            </a:pPr>
-            <a:r>
-              <a:rPr b="0" lang="en-GB" sz="1800" spc="-1" strike="noStrike">
-                <a:solidFill>
-                  <a:srgbClr val="000000"/>
-                </a:solidFill>
-                <a:latin typeface="Arial"/>
-              </a:rPr>
-              <a:t>Seventh Outline Level</a:t>
-            </a:r>
-            <a:endParaRPr b="0" lang="en-GB" sz="1800" spc="-1" strike="noStrike">
-              <a:solidFill>
-                <a:srgbClr val="000000"/>
-              </a:solidFill>
-              <a:latin typeface="Arial"/>
-            </a:endParaRPr>
-          </a:p>
-        </p:txBody>
-      </p:sp>
-      <p:sp>
-        <p:nvSpPr>
-          <p:cNvPr id="4" name="PlaceHolder 3"/>
-          <p:cNvSpPr>
-            <a:spLocks noGrp="1"/>
-          </p:cNvSpPr>
-          <p:nvPr>
             <p:ph type="ftr" idx="1"/>
           </p:nvPr>
         </p:nvSpPr>
         <p:spPr>
           <a:xfrm>
             <a:off x="3420000" y="5400000"/>
-            <a:ext cx="3239280" cy="269280"/>
+            <a:ext cx="3238920" cy="268920"/>
           </a:xfrm>
           <a:prstGeom prst="rect">
             <a:avLst/>
@@ -5257,7 +4983,7 @@
       </p:sp>
       <p:sp>
         <p:nvSpPr>
-          <p:cNvPr id="5" name="PlaceHolder 4"/>
+          <p:cNvPr id="3" name="PlaceHolder 2"/>
           <p:cNvSpPr>
             <a:spLocks noGrp="1"/>
           </p:cNvSpPr>
@@ -5268,7 +4994,7 @@
         <p:spPr>
           <a:xfrm>
             <a:off x="9180000" y="5130000"/>
-            <a:ext cx="719280" cy="539280"/>
+            <a:ext cx="718920" cy="538920"/>
           </a:xfrm>
           <a:prstGeom prst="rect">
             <a:avLst/>
@@ -5309,7 +5035,7 @@
                 <a:tab algn="l" pos="0"/>
               </a:tabLst>
             </a:pPr>
-            <a:fld id="{4604ABC6-2C53-4444-ADDA-7D3A6580B426}" type="slidenum">
+            <a:fld id="{CE03C117-9AE9-4770-80B1-4FEA3465DCB0}" type="slidenum">
               <a:rPr b="1" lang="en-GB" sz="1800" spc="-1" strike="noStrike">
                 <a:solidFill>
                   <a:srgbClr val="ffffff"/>
@@ -5329,7 +5055,7 @@
       </p:sp>
       <p:sp>
         <p:nvSpPr>
-          <p:cNvPr id="6" name="PlaceHolder 5"/>
+          <p:cNvPr id="4" name="PlaceHolder 3"/>
           <p:cNvSpPr>
             <a:spLocks noGrp="1"/>
           </p:cNvSpPr>
@@ -5340,7 +5066,7 @@
         <p:spPr>
           <a:xfrm>
             <a:off x="360000" y="5400000"/>
-            <a:ext cx="2879280" cy="269280"/>
+            <a:ext cx="2878920" cy="268920"/>
           </a:xfrm>
           <a:prstGeom prst="rect">
             <a:avLst/>
@@ -5383,6 +5109,280 @@
                 <a:srgbClr val="000000"/>
               </a:solidFill>
               <a:latin typeface="Times New Roman"/>
+            </a:endParaRPr>
+          </a:p>
+        </p:txBody>
+      </p:sp>
+      <p:sp>
+        <p:nvSpPr>
+          <p:cNvPr id="5" name="PlaceHolder 4"/>
+          <p:cNvSpPr>
+            <a:spLocks noGrp="1"/>
+          </p:cNvSpPr>
+          <p:nvPr>
+            <p:ph type="title"/>
+          </p:nvPr>
+        </p:nvSpPr>
+        <p:spPr>
+          <a:xfrm>
+            <a:off x="504000" y="226080"/>
+            <a:ext cx="9072000" cy="946440"/>
+          </a:xfrm>
+          <a:prstGeom prst="rect">
+            <a:avLst/>
+          </a:prstGeom>
+          <a:noFill/>
+          <a:ln w="0">
+            <a:noFill/>
+          </a:ln>
+        </p:spPr>
+        <p:txBody>
+          <a:bodyPr lIns="0" rIns="0" tIns="0" bIns="0" anchor="ctr">
+            <a:noAutofit/>
+          </a:bodyPr>
+          <a:p>
+            <a:pPr indent="0" algn="ctr">
+              <a:buNone/>
+            </a:pPr>
+            <a:r>
+              <a:rPr b="0" lang="en-GB" sz="4400" spc="-1" strike="noStrike">
+                <a:solidFill>
+                  <a:srgbClr val="000000"/>
+                </a:solidFill>
+                <a:latin typeface="Arial"/>
+              </a:rPr>
+              <a:t>Click to edit the title text format</a:t>
+            </a:r>
+            <a:endParaRPr b="0" lang="en-GB" sz="4400" spc="-1" strike="noStrike">
+              <a:solidFill>
+                <a:srgbClr val="000000"/>
+              </a:solidFill>
+              <a:latin typeface="Arial"/>
+            </a:endParaRPr>
+          </a:p>
+        </p:txBody>
+      </p:sp>
+      <p:sp>
+        <p:nvSpPr>
+          <p:cNvPr id="6" name="PlaceHolder 5"/>
+          <p:cNvSpPr>
+            <a:spLocks noGrp="1"/>
+          </p:cNvSpPr>
+          <p:nvPr>
+            <p:ph type="body"/>
+          </p:nvPr>
+        </p:nvSpPr>
+        <p:spPr>
+          <a:xfrm>
+            <a:off x="504000" y="1326600"/>
+            <a:ext cx="9072000" cy="3288600"/>
+          </a:xfrm>
+          <a:prstGeom prst="rect">
+            <a:avLst/>
+          </a:prstGeom>
+          <a:noFill/>
+          <a:ln w="0">
+            <a:noFill/>
+          </a:ln>
+        </p:spPr>
+        <p:txBody>
+          <a:bodyPr lIns="0" rIns="0" tIns="0" bIns="0" anchor="t">
+            <a:normAutofit/>
+          </a:bodyPr>
+          <a:p>
+            <a:pPr marL="432000" indent="-324000">
+              <a:spcBef>
+                <a:spcPts val="1417"/>
+              </a:spcBef>
+              <a:buClr>
+                <a:srgbClr val="000000"/>
+              </a:buClr>
+              <a:buSzPct val="45000"/>
+              <a:buFont typeface="Wingdings" charset="2"/>
+              <a:buChar char=""/>
+            </a:pPr>
+            <a:r>
+              <a:rPr b="0" lang="en-GB" sz="3200" spc="-1" strike="noStrike">
+                <a:solidFill>
+                  <a:srgbClr val="000000"/>
+                </a:solidFill>
+                <a:latin typeface="Arial"/>
+              </a:rPr>
+              <a:t>Click to edit the outline text format</a:t>
+            </a:r>
+            <a:endParaRPr b="0" lang="en-GB" sz="3200" spc="-1" strike="noStrike">
+              <a:solidFill>
+                <a:srgbClr val="000000"/>
+              </a:solidFill>
+              <a:latin typeface="Arial"/>
+            </a:endParaRPr>
+          </a:p>
+          <a:p>
+            <a:pPr lvl="1" marL="864000" indent="-324000">
+              <a:spcBef>
+                <a:spcPts val="1134"/>
+              </a:spcBef>
+              <a:buClr>
+                <a:srgbClr val="000000"/>
+              </a:buClr>
+              <a:buSzPct val="75000"/>
+              <a:buFont typeface="Symbol" charset="2"/>
+              <a:buChar char=""/>
+            </a:pPr>
+            <a:r>
+              <a:rPr b="0" lang="en-GB" sz="2800" spc="-1" strike="noStrike">
+                <a:solidFill>
+                  <a:srgbClr val="000000"/>
+                </a:solidFill>
+                <a:latin typeface="Arial"/>
+              </a:rPr>
+              <a:t>Second Outline Level</a:t>
+            </a:r>
+            <a:endParaRPr b="0" lang="en-GB" sz="2800" spc="-1" strike="noStrike">
+              <a:solidFill>
+                <a:srgbClr val="000000"/>
+              </a:solidFill>
+              <a:latin typeface="Arial"/>
+            </a:endParaRPr>
+          </a:p>
+          <a:p>
+            <a:pPr lvl="2" marL="1296000" indent="-288000">
+              <a:spcBef>
+                <a:spcPts val="850"/>
+              </a:spcBef>
+              <a:buClr>
+                <a:srgbClr val="000000"/>
+              </a:buClr>
+              <a:buSzPct val="45000"/>
+              <a:buFont typeface="Wingdings" charset="2"/>
+              <a:buChar char=""/>
+            </a:pPr>
+            <a:r>
+              <a:rPr b="0" lang="en-GB" sz="2400" spc="-1" strike="noStrike">
+                <a:solidFill>
+                  <a:srgbClr val="000000"/>
+                </a:solidFill>
+                <a:latin typeface="Arial"/>
+              </a:rPr>
+              <a:t>Third Outline Level</a:t>
+            </a:r>
+            <a:endParaRPr b="0" lang="en-GB" sz="2400" spc="-1" strike="noStrike">
+              <a:solidFill>
+                <a:srgbClr val="000000"/>
+              </a:solidFill>
+              <a:latin typeface="Arial"/>
+            </a:endParaRPr>
+          </a:p>
+          <a:p>
+            <a:pPr lvl="3" marL="1728000" indent="-216000">
+              <a:spcBef>
+                <a:spcPts val="567"/>
+              </a:spcBef>
+              <a:buClr>
+                <a:srgbClr val="000000"/>
+              </a:buClr>
+              <a:buSzPct val="75000"/>
+              <a:buFont typeface="Symbol" charset="2"/>
+              <a:buChar char=""/>
+            </a:pPr>
+            <a:r>
+              <a:rPr b="0" lang="en-GB" sz="2000" spc="-1" strike="noStrike">
+                <a:solidFill>
+                  <a:srgbClr val="000000"/>
+                </a:solidFill>
+                <a:latin typeface="Arial"/>
+              </a:rPr>
+              <a:t>Fourth Outline Level</a:t>
+            </a:r>
+            <a:endParaRPr b="0" lang="en-GB" sz="2000" spc="-1" strike="noStrike">
+              <a:solidFill>
+                <a:srgbClr val="000000"/>
+              </a:solidFill>
+              <a:latin typeface="Arial"/>
+            </a:endParaRPr>
+          </a:p>
+          <a:p>
+            <a:pPr lvl="4" marL="2160000" indent="-216000">
+              <a:spcBef>
+                <a:spcPts val="283"/>
+              </a:spcBef>
+              <a:buClr>
+                <a:srgbClr val="000000"/>
+              </a:buClr>
+              <a:buSzPct val="45000"/>
+              <a:buFont typeface="Wingdings" charset="2"/>
+              <a:buChar char=""/>
+            </a:pPr>
+            <a:r>
+              <a:rPr b="0" lang="en-GB" sz="2000" spc="-1" strike="noStrike">
+                <a:solidFill>
+                  <a:srgbClr val="000000"/>
+                </a:solidFill>
+                <a:latin typeface="Arial"/>
+              </a:rPr>
+              <a:t>Fifth Outline Level</a:t>
+            </a:r>
+            <a:endParaRPr b="0" lang="en-GB" sz="2000" spc="-1" strike="noStrike">
+              <a:solidFill>
+                <a:srgbClr val="000000"/>
+              </a:solidFill>
+              <a:latin typeface="Arial"/>
+            </a:endParaRPr>
+          </a:p>
+          <a:p>
+            <a:pPr lvl="5" marL="2592000" indent="-216000">
+              <a:spcBef>
+                <a:spcPts val="283"/>
+              </a:spcBef>
+              <a:buClr>
+                <a:srgbClr val="000000"/>
+              </a:buClr>
+              <a:buSzPct val="45000"/>
+              <a:buFont typeface="Wingdings" charset="2"/>
+              <a:buChar char=""/>
+            </a:pPr>
+            <a:r>
+              <a:rPr b="0" lang="en-GB" sz="2000" spc="-1" strike="noStrike">
+                <a:solidFill>
+                  <a:srgbClr val="000000"/>
+                </a:solidFill>
+                <a:latin typeface="Arial"/>
+              </a:rPr>
+              <a:t>Sixth Outline Level</a:t>
+            </a:r>
+            <a:endParaRPr b="0" lang="en-GB" sz="2000" spc="-1" strike="noStrike">
+              <a:solidFill>
+                <a:srgbClr val="000000"/>
+              </a:solidFill>
+              <a:latin typeface="Arial"/>
+            </a:endParaRPr>
+          </a:p>
+          <a:p>
+            <a:pPr lvl="6" marL="3024000" indent="-216000">
+              <a:spcBef>
+                <a:spcPts val="283"/>
+              </a:spcBef>
+              <a:buClr>
+                <a:srgbClr val="000000"/>
+              </a:buClr>
+              <a:buSzPct val="45000"/>
+              <a:buFont typeface="Wingdings" charset="2"/>
+              <a:buChar char=""/>
+            </a:pPr>
+            <a:r>
+              <a:rPr b="0" lang="en-GB" sz="2000" spc="-1" strike="noStrike">
+                <a:solidFill>
+                  <a:srgbClr val="000000"/>
+                </a:solidFill>
+                <a:latin typeface="Arial"/>
+              </a:rPr>
+              <a:t>Seventh Outline Level</a:t>
+            </a:r>
+            <a:endParaRPr b="0" lang="en-GB" sz="2000" spc="-1" strike="noStrike">
+              <a:solidFill>
+                <a:srgbClr val="000000"/>
+              </a:solidFill>
+              <a:latin typeface="Arial"/>
             </a:endParaRPr>
           </a:p>
         </p:txBody>
@@ -5433,7 +5433,7 @@
         <p:spPr>
           <a:xfrm>
             <a:off x="0" y="5400000"/>
-            <a:ext cx="10079280" cy="269280"/>
+            <a:ext cx="10078920" cy="268920"/>
           </a:xfrm>
           <a:prstGeom prst="rect">
             <a:avLst/>
@@ -5480,7 +5480,7 @@
         <p:spPr>
           <a:xfrm>
             <a:off x="0" y="0"/>
-            <a:ext cx="10079280" cy="1214280"/>
+            <a:ext cx="10078920" cy="1213920"/>
           </a:xfrm>
           <a:prstGeom prst="rect">
             <a:avLst/>
@@ -5527,7 +5527,7 @@
         <p:spPr>
           <a:xfrm>
             <a:off x="9315000" y="5175000"/>
-            <a:ext cx="449280" cy="449280"/>
+            <a:ext cx="448920" cy="448920"/>
           </a:xfrm>
           <a:prstGeom prst="ellipse">
             <a:avLst/>
@@ -5577,7 +5577,7 @@
         <p:spPr>
           <a:xfrm>
             <a:off x="9180000" y="5130000"/>
-            <a:ext cx="719280" cy="539280"/>
+            <a:ext cx="718920" cy="538920"/>
           </a:xfrm>
           <a:prstGeom prst="rect">
             <a:avLst/>
@@ -5603,7 +5603,7 @@
                 <a:spcPct val="100000"/>
               </a:lnSpc>
             </a:pPr>
-            <a:fld id="{2933043E-5BE2-4A40-9065-E84152207B5F}" type="slidenum">
+            <a:fld id="{8219431F-EE77-4E50-96D7-2292A6EC71A9}" type="slidenum">
               <a:rPr b="1" lang="en-GB" sz="1800" spc="-1" strike="noStrike">
                 <a:solidFill>
                   <a:srgbClr val="ffffff"/>
@@ -5635,7 +5635,7 @@
         <p:spPr>
           <a:xfrm>
             <a:off x="3420000" y="5400000"/>
-            <a:ext cx="3239280" cy="269280"/>
+            <a:ext cx="3238920" cy="268920"/>
           </a:xfrm>
           <a:prstGeom prst="rect">
             <a:avLst/>
@@ -5707,7 +5707,7 @@
         <p:spPr>
           <a:xfrm>
             <a:off x="360000" y="5400000"/>
-            <a:ext cx="2879280" cy="269280"/>
+            <a:ext cx="2878920" cy="268920"/>
           </a:xfrm>
           <a:prstGeom prst="rect">
             <a:avLst/>
@@ -6078,7 +6078,7 @@
         <p:spPr>
           <a:xfrm>
             <a:off x="360000" y="2880000"/>
-            <a:ext cx="9359280" cy="718200"/>
+            <a:ext cx="9358920" cy="717840"/>
           </a:xfrm>
           <a:prstGeom prst="rect">
             <a:avLst/>
@@ -6133,7 +6133,7 @@
         <p:spPr>
           <a:xfrm>
             <a:off x="360000" y="3915000"/>
-            <a:ext cx="9359280" cy="1484280"/>
+            <a:ext cx="9358920" cy="1483920"/>
           </a:xfrm>
           <a:prstGeom prst="rect">
             <a:avLst/>
@@ -6188,7 +6188,7 @@
         <p:spPr>
           <a:xfrm>
             <a:off x="2458440" y="118080"/>
-            <a:ext cx="5280840" cy="2941200"/>
+            <a:ext cx="5280480" cy="2940840"/>
           </a:xfrm>
           <a:prstGeom prst="rect">
             <a:avLst/>
@@ -6241,7 +6241,7 @@
         <p:spPr>
           <a:xfrm>
             <a:off x="360000" y="225720"/>
-            <a:ext cx="9359280" cy="718200"/>
+            <a:ext cx="9358920" cy="717840"/>
           </a:xfrm>
           <a:prstGeom prst="rect">
             <a:avLst/>
@@ -6296,7 +6296,7 @@
         <p:spPr>
           <a:xfrm>
             <a:off x="360000" y="1485000"/>
-            <a:ext cx="9359280" cy="3779280"/>
+            <a:ext cx="9358920" cy="3778920"/>
           </a:xfrm>
           <a:prstGeom prst="rect">
             <a:avLst/>
@@ -6425,16 +6425,7 @@
                 </a:solidFill>
                 <a:latin typeface="Source Sans Pro Semibold"/>
               </a:rPr>
-              <a:t>Hosted in a Kubernetes Cluster(K3s) running in an Azure </a:t>
-            </a:r>
-            <a:r>
-              <a:rPr b="1" lang="en-GB" sz="2400" spc="-1" strike="noStrike">
-                <a:solidFill>
-                  <a:srgbClr val="2c3e50"/>
-                </a:solidFill>
-                <a:latin typeface="Source Sans Pro Semibold"/>
-              </a:rPr>
-              <a:t>RHEL Virtual Machine</a:t>
+              <a:t>Hosted in a Kubernetes Cluster(K3s) running in an Azure RHEL Virtual Machine</a:t>
             </a:r>
             <a:endParaRPr b="0" lang="en-GB" sz="2400" spc="-1" strike="noStrike">
               <a:solidFill>
@@ -6488,7 +6479,7 @@
         <p:spPr>
           <a:xfrm>
             <a:off x="360000" y="225720"/>
-            <a:ext cx="9359280" cy="718200"/>
+            <a:ext cx="9358920" cy="717840"/>
           </a:xfrm>
           <a:prstGeom prst="rect">
             <a:avLst/>
@@ -6503,25 +6494,10 @@
             <a:noAutofit/>
           </a:bodyPr>
           <a:p>
-            <a:pPr indent="0">
-              <a:lnSpc>
-                <a:spcPct val="100000"/>
-              </a:lnSpc>
-              <a:buNone/>
-              <a:tabLst>
-                <a:tab algn="l" pos="0"/>
-              </a:tabLst>
-            </a:pPr>
-            <a:r>
-              <a:rPr b="1" lang="en-GB" sz="2700" spc="-1" strike="noStrike">
-                <a:solidFill>
-                  <a:srgbClr val="ffffff"/>
-                </a:solidFill>
-                <a:latin typeface="Source Sans Pro Black"/>
-              </a:rPr>
-              <a:t>Technical Implementation – DIAGRAMS ETC.</a:t>
-            </a:r>
-            <a:endParaRPr b="0" lang="en-GB" sz="2700" spc="-1" strike="noStrike">
+            <a:pPr indent="0" algn="ctr">
+              <a:buNone/>
+            </a:pPr>
+            <a:endParaRPr b="0" lang="en-GB" sz="1800" spc="-1" strike="noStrike">
               <a:solidFill>
                 <a:srgbClr val="000000"/>
               </a:solidFill>
@@ -6543,7 +6519,7 @@
         <p:spPr>
           <a:xfrm>
             <a:off x="360000" y="1485000"/>
-            <a:ext cx="9359280" cy="3779280"/>
+            <a:ext cx="9358920" cy="3778920"/>
           </a:xfrm>
           <a:prstGeom prst="rect">
             <a:avLst/>
@@ -6726,7 +6702,7 @@
         <p:spPr>
           <a:xfrm>
             <a:off x="360000" y="225720"/>
-            <a:ext cx="9359280" cy="719280"/>
+            <a:ext cx="9358920" cy="718920"/>
           </a:xfrm>
           <a:prstGeom prst="rect">
             <a:avLst/>
@@ -6781,7 +6757,7 @@
         <p:spPr>
           <a:xfrm>
             <a:off x="180000" y="1485000"/>
-            <a:ext cx="6479640" cy="1394640"/>
+            <a:ext cx="6479280" cy="1394280"/>
           </a:xfrm>
           <a:prstGeom prst="rect">
             <a:avLst/>
@@ -6848,16 +6824,7 @@
                 </a:solidFill>
                 <a:latin typeface="Source Sans Pro Semibold"/>
               </a:rPr>
-              <a:t>Passwords are stored as Argon2id hashes </a:t>
-            </a:r>
-            <a:r>
-              <a:rPr b="1" lang="en-GB" sz="2000" spc="-1" strike="noStrike">
-                <a:solidFill>
-                  <a:srgbClr val="2c3e50"/>
-                </a:solidFill>
-                <a:latin typeface="Source Sans Pro Semibold"/>
-              </a:rPr>
-              <a:t>for security</a:t>
+              <a:t>Passwords are stored as Argon2id hashes for security</a:t>
             </a:r>
             <a:endParaRPr b="0" lang="en-GB" sz="2000" spc="-1" strike="noStrike">
               <a:solidFill>
@@ -6888,16 +6855,7 @@
                 </a:solidFill>
                 <a:latin typeface="Source Sans Pro Semibold"/>
               </a:rPr>
-              <a:t>Secure Session ID is stored in browsers </a:t>
-            </a:r>
-            <a:r>
-              <a:rPr b="1" lang="en-GB" sz="2000" spc="-1" strike="noStrike">
-                <a:solidFill>
-                  <a:srgbClr val="2c3e50"/>
-                </a:solidFill>
-                <a:latin typeface="Source Sans Pro Semibold"/>
-              </a:rPr>
-              <a:t>localStorage</a:t>
+              <a:t>Secure Session ID is stored in browsers localStorage</a:t>
             </a:r>
             <a:endParaRPr b="0" lang="en-GB" sz="2000" spc="-1" strike="noStrike">
               <a:solidFill>
@@ -6921,7 +6879,7 @@
         <p:spPr>
           <a:xfrm>
             <a:off x="543600" y="2700000"/>
-            <a:ext cx="5395680" cy="2519640"/>
+            <a:ext cx="5395320" cy="2519280"/>
           </a:xfrm>
           <a:prstGeom prst="rect">
             <a:avLst/>
@@ -6944,7 +6902,7 @@
         <p:spPr>
           <a:xfrm>
             <a:off x="6480000" y="900000"/>
-            <a:ext cx="3419640" cy="4221360"/>
+            <a:ext cx="3419280" cy="4221000"/>
           </a:xfrm>
           <a:prstGeom prst="rect">
             <a:avLst/>
@@ -6997,7 +6955,7 @@
         <p:spPr>
           <a:xfrm>
             <a:off x="360000" y="225720"/>
-            <a:ext cx="9359280" cy="718200"/>
+            <a:ext cx="9358920" cy="717840"/>
           </a:xfrm>
           <a:prstGeom prst="rect">
             <a:avLst/>
@@ -7028,223 +6986,7 @@
                 </a:solidFill>
                 <a:latin typeface="Source Sans Pro Black"/>
               </a:rPr>
-              <a:t>I</a:t>
-            </a:r>
-            <a:r>
-              <a:rPr b="1" lang="en-GB" sz="2700" spc="-1" strike="noStrike">
-                <a:solidFill>
-                  <a:srgbClr val="ffffff"/>
-                </a:solidFill>
-                <a:latin typeface="Source Sans Pro Black"/>
-              </a:rPr>
-              <a:t>n</a:t>
-            </a:r>
-            <a:r>
-              <a:rPr b="1" lang="en-GB" sz="2700" spc="-1" strike="noStrike">
-                <a:solidFill>
-                  <a:srgbClr val="ffffff"/>
-                </a:solidFill>
-                <a:latin typeface="Source Sans Pro Black"/>
-              </a:rPr>
-              <a:t>s</a:t>
-            </a:r>
-            <a:r>
-              <a:rPr b="1" lang="en-GB" sz="2700" spc="-1" strike="noStrike">
-                <a:solidFill>
-                  <a:srgbClr val="ffffff"/>
-                </a:solidFill>
-                <a:latin typeface="Source Sans Pro Black"/>
-              </a:rPr>
-              <a:t>t</a:t>
-            </a:r>
-            <a:r>
-              <a:rPr b="1" lang="en-GB" sz="2700" spc="-1" strike="noStrike">
-                <a:solidFill>
-                  <a:srgbClr val="ffffff"/>
-                </a:solidFill>
-                <a:latin typeface="Source Sans Pro Black"/>
-              </a:rPr>
-              <a:t>a</a:t>
-            </a:r>
-            <a:r>
-              <a:rPr b="1" lang="en-GB" sz="2700" spc="-1" strike="noStrike">
-                <a:solidFill>
-                  <a:srgbClr val="ffffff"/>
-                </a:solidFill>
-                <a:latin typeface="Source Sans Pro Black"/>
-              </a:rPr>
-              <a:t>n</a:t>
-            </a:r>
-            <a:r>
-              <a:rPr b="1" lang="en-GB" sz="2700" spc="-1" strike="noStrike">
-                <a:solidFill>
-                  <a:srgbClr val="ffffff"/>
-                </a:solidFill>
-                <a:latin typeface="Source Sans Pro Black"/>
-              </a:rPr>
-              <a:t>t</a:t>
-            </a:r>
-            <a:r>
-              <a:rPr b="1" lang="en-GB" sz="2700" spc="-1" strike="noStrike">
-                <a:solidFill>
-                  <a:srgbClr val="ffffff"/>
-                </a:solidFill>
-                <a:latin typeface="Source Sans Pro Black"/>
-              </a:rPr>
-              <a:t> </a:t>
-            </a:r>
-            <a:r>
-              <a:rPr b="1" lang="en-GB" sz="2700" spc="-1" strike="noStrike">
-                <a:solidFill>
-                  <a:srgbClr val="ffffff"/>
-                </a:solidFill>
-                <a:latin typeface="Source Sans Pro Black"/>
-              </a:rPr>
-              <a:t>E</a:t>
-            </a:r>
-            <a:r>
-              <a:rPr b="1" lang="en-GB" sz="2700" spc="-1" strike="noStrike">
-                <a:solidFill>
-                  <a:srgbClr val="ffffff"/>
-                </a:solidFill>
-                <a:latin typeface="Source Sans Pro Black"/>
-              </a:rPr>
-              <a:t>x</a:t>
-            </a:r>
-            <a:r>
-              <a:rPr b="1" lang="en-GB" sz="2700" spc="-1" strike="noStrike">
-                <a:solidFill>
-                  <a:srgbClr val="ffffff"/>
-                </a:solidFill>
-                <a:latin typeface="Source Sans Pro Black"/>
-              </a:rPr>
-              <a:t>e</a:t>
-            </a:r>
-            <a:r>
-              <a:rPr b="1" lang="en-GB" sz="2700" spc="-1" strike="noStrike">
-                <a:solidFill>
-                  <a:srgbClr val="ffffff"/>
-                </a:solidFill>
-                <a:latin typeface="Source Sans Pro Black"/>
-              </a:rPr>
-              <a:t>r</a:t>
-            </a:r>
-            <a:r>
-              <a:rPr b="1" lang="en-GB" sz="2700" spc="-1" strike="noStrike">
-                <a:solidFill>
-                  <a:srgbClr val="ffffff"/>
-                </a:solidFill>
-                <a:latin typeface="Source Sans Pro Black"/>
-              </a:rPr>
-              <a:t>c</a:t>
-            </a:r>
-            <a:r>
-              <a:rPr b="1" lang="en-GB" sz="2700" spc="-1" strike="noStrike">
-                <a:solidFill>
-                  <a:srgbClr val="ffffff"/>
-                </a:solidFill>
-                <a:latin typeface="Source Sans Pro Black"/>
-              </a:rPr>
-              <a:t>i</a:t>
-            </a:r>
-            <a:r>
-              <a:rPr b="1" lang="en-GB" sz="2700" spc="-1" strike="noStrike">
-                <a:solidFill>
-                  <a:srgbClr val="ffffff"/>
-                </a:solidFill>
-                <a:latin typeface="Source Sans Pro Black"/>
-              </a:rPr>
-              <a:t>s</a:t>
-            </a:r>
-            <a:r>
-              <a:rPr b="1" lang="en-GB" sz="2700" spc="-1" strike="noStrike">
-                <a:solidFill>
-                  <a:srgbClr val="ffffff"/>
-                </a:solidFill>
-                <a:latin typeface="Source Sans Pro Black"/>
-              </a:rPr>
-              <a:t>e</a:t>
-            </a:r>
-            <a:r>
-              <a:rPr b="1" lang="en-GB" sz="2700" spc="-1" strike="noStrike">
-                <a:solidFill>
-                  <a:srgbClr val="ffffff"/>
-                </a:solidFill>
-                <a:latin typeface="Source Sans Pro Black"/>
-              </a:rPr>
-              <a:t> </a:t>
-            </a:r>
-            <a:r>
-              <a:rPr b="1" lang="en-GB" sz="2700" spc="-1" strike="noStrike">
-                <a:solidFill>
-                  <a:srgbClr val="ffffff"/>
-                </a:solidFill>
-                <a:latin typeface="Source Sans Pro Black"/>
-              </a:rPr>
-              <a:t>S</a:t>
-            </a:r>
-            <a:r>
-              <a:rPr b="1" lang="en-GB" sz="2700" spc="-1" strike="noStrike">
-                <a:solidFill>
-                  <a:srgbClr val="ffffff"/>
-                </a:solidFill>
-                <a:latin typeface="Source Sans Pro Black"/>
-              </a:rPr>
-              <a:t>e</a:t>
-            </a:r>
-            <a:r>
-              <a:rPr b="1" lang="en-GB" sz="2700" spc="-1" strike="noStrike">
-                <a:solidFill>
-                  <a:srgbClr val="ffffff"/>
-                </a:solidFill>
-                <a:latin typeface="Source Sans Pro Black"/>
-              </a:rPr>
-              <a:t>s</a:t>
-            </a:r>
-            <a:r>
-              <a:rPr b="1" lang="en-GB" sz="2700" spc="-1" strike="noStrike">
-                <a:solidFill>
-                  <a:srgbClr val="ffffff"/>
-                </a:solidFill>
-                <a:latin typeface="Source Sans Pro Black"/>
-              </a:rPr>
-              <a:t>s</a:t>
-            </a:r>
-            <a:r>
-              <a:rPr b="1" lang="en-GB" sz="2700" spc="-1" strike="noStrike">
-                <a:solidFill>
-                  <a:srgbClr val="ffffff"/>
-                </a:solidFill>
-                <a:latin typeface="Source Sans Pro Black"/>
-              </a:rPr>
-              <a:t>i</a:t>
-            </a:r>
-            <a:r>
-              <a:rPr b="1" lang="en-GB" sz="2700" spc="-1" strike="noStrike">
-                <a:solidFill>
-                  <a:srgbClr val="ffffff"/>
-                </a:solidFill>
-                <a:latin typeface="Source Sans Pro Black"/>
-              </a:rPr>
-              <a:t>o</a:t>
-            </a:r>
-            <a:r>
-              <a:rPr b="1" lang="en-GB" sz="2700" spc="-1" strike="noStrike">
-                <a:solidFill>
-                  <a:srgbClr val="ffffff"/>
-                </a:solidFill>
-                <a:latin typeface="Source Sans Pro Black"/>
-              </a:rPr>
-              <a:t>n</a:t>
-            </a:r>
-            <a:r>
-              <a:rPr b="1" lang="en-GB" sz="2700" spc="-1" strike="noStrike">
-                <a:solidFill>
-                  <a:srgbClr val="ffffff"/>
-                </a:solidFill>
-                <a:latin typeface="Source Sans Pro Black"/>
-              </a:rPr>
-              <a:t>s</a:t>
+              <a:t>Instant Exercise Sessions</a:t>
             </a:r>
             <a:endParaRPr b="0" lang="en-GB" sz="2700" spc="-1" strike="noStrike">
               <a:solidFill>
@@ -7268,7 +7010,7 @@
         <p:spPr>
           <a:xfrm>
             <a:off x="360000" y="1485000"/>
-            <a:ext cx="5939640" cy="1214640"/>
+            <a:ext cx="5939280" cy="1214280"/>
           </a:xfrm>
           <a:prstGeom prst="rect">
             <a:avLst/>
@@ -7304,16 +7046,7 @@
                 </a:solidFill>
                 <a:latin typeface="Source Sans Pro Semibold"/>
               </a:rPr>
-              <a:t>Looped video clips of the exercise being </a:t>
-            </a:r>
-            <a:r>
-              <a:rPr b="1" lang="en-GB" sz="2000" spc="-1" strike="noStrike">
-                <a:solidFill>
-                  <a:srgbClr val="2c3e50"/>
-                </a:solidFill>
-                <a:latin typeface="Source Sans Pro Semibold"/>
-              </a:rPr>
-              <a:t>demonstrated</a:t>
+              <a:t>Looped video clips of the exercise being demonstrated</a:t>
             </a:r>
             <a:endParaRPr b="0" lang="en-GB" sz="2000" spc="-1" strike="noStrike">
               <a:solidFill>
@@ -7344,16 +7077,7 @@
                 </a:solidFill>
                 <a:latin typeface="Source Sans Pro Semibold"/>
               </a:rPr>
-              <a:t>Countdown timer on each exercise before </a:t>
-            </a:r>
-            <a:r>
-              <a:rPr b="1" lang="en-GB" sz="2000" spc="-1" strike="noStrike">
-                <a:solidFill>
-                  <a:srgbClr val="2c3e50"/>
-                </a:solidFill>
-                <a:latin typeface="Source Sans Pro Semibold"/>
-              </a:rPr>
-              <a:t>“Next Exercise” can be clicked</a:t>
+              <a:t>Countdown timer on each exercise before “Next Exercise” can be clicked</a:t>
             </a:r>
             <a:endParaRPr b="0" lang="en-GB" sz="2000" spc="-1" strike="noStrike">
               <a:solidFill>
@@ -7384,16 +7108,7 @@
                 </a:solidFill>
                 <a:latin typeface="Source Sans Pro Semibold"/>
               </a:rPr>
-              <a:t>Easy to add new videos with an mp4 file </a:t>
-            </a:r>
-            <a:r>
-              <a:rPr b="1" lang="en-GB" sz="2000" spc="-1" strike="noStrike">
-                <a:solidFill>
-                  <a:srgbClr val="2c3e50"/>
-                </a:solidFill>
-                <a:latin typeface="Source Sans Pro Semibold"/>
-              </a:rPr>
-              <a:t>and an array of TimeSets</a:t>
+              <a:t>Easy to add new videos with an mp4 file and an array of TimeSets</a:t>
             </a:r>
             <a:endParaRPr b="0" lang="en-GB" sz="2000" spc="-1" strike="noStrike">
               <a:solidFill>
@@ -7417,7 +7132,7 @@
         <p:spPr>
           <a:xfrm>
             <a:off x="720360" y="2734920"/>
-            <a:ext cx="3959280" cy="2484720"/>
+            <a:ext cx="3958920" cy="2484360"/>
           </a:xfrm>
           <a:prstGeom prst="rect">
             <a:avLst/>
@@ -7440,7 +7155,7 @@
         <p:spPr>
           <a:xfrm>
             <a:off x="6480000" y="943920"/>
-            <a:ext cx="3253680" cy="1545480"/>
+            <a:ext cx="3253320" cy="1545120"/>
           </a:xfrm>
           <a:prstGeom prst="rect">
             <a:avLst/>
@@ -7463,7 +7178,7 @@
         <p:spPr>
           <a:xfrm>
             <a:off x="5940000" y="2700000"/>
-            <a:ext cx="4091760" cy="2444400"/>
+            <a:ext cx="4091400" cy="2444040"/>
           </a:xfrm>
           <a:prstGeom prst="rect">
             <a:avLst/>
@@ -7516,7 +7231,7 @@
         <p:spPr>
           <a:xfrm>
             <a:off x="360000" y="225720"/>
-            <a:ext cx="9359280" cy="718200"/>
+            <a:ext cx="9358920" cy="717840"/>
           </a:xfrm>
           <a:prstGeom prst="rect">
             <a:avLst/>
@@ -7571,7 +7286,7 @@
         <p:spPr>
           <a:xfrm>
             <a:off x="360000" y="1485000"/>
-            <a:ext cx="5039640" cy="1394640"/>
+            <a:ext cx="5039280" cy="1394280"/>
           </a:xfrm>
           <a:prstGeom prst="rect">
             <a:avLst/>
@@ -7607,16 +7322,7 @@
                 </a:solidFill>
                 <a:latin typeface="Source Sans Pro Semibold"/>
               </a:rPr>
-              <a:t>Form to enter email of meeting </a:t>
-            </a:r>
-            <a:r>
-              <a:rPr b="1" lang="en-GB" sz="2400" spc="-1" strike="noStrike">
-                <a:solidFill>
-                  <a:srgbClr val="2c3e50"/>
-                </a:solidFill>
-                <a:latin typeface="Source Sans Pro Semibold"/>
-              </a:rPr>
-              <a:t>attendee and datetime</a:t>
+              <a:t>Form to enter email of meeting attendee and datetime</a:t>
             </a:r>
             <a:endParaRPr b="0" lang="en-GB" sz="2400" spc="-1" strike="noStrike">
               <a:solidFill>
@@ -7647,16 +7353,7 @@
                 </a:solidFill>
                 <a:latin typeface="Source Sans Pro Semibold"/>
               </a:rPr>
-              <a:t>Generates ICS calendar file and </a:t>
-            </a:r>
-            <a:r>
-              <a:rPr b="1" lang="en-GB" sz="2400" spc="-1" strike="noStrike">
-                <a:solidFill>
-                  <a:srgbClr val="2c3e50"/>
-                </a:solidFill>
-                <a:latin typeface="Source Sans Pro Semibold"/>
-              </a:rPr>
-              <a:t>emails it to both parties</a:t>
+              <a:t>Generates ICS calendar file and emails it to both parties</a:t>
             </a:r>
             <a:endParaRPr b="0" lang="en-GB" sz="2400" spc="-1" strike="noStrike">
               <a:solidFill>
@@ -7680,7 +7377,7 @@
         <p:spPr>
           <a:xfrm>
             <a:off x="720360" y="3190320"/>
-            <a:ext cx="4679280" cy="1849320"/>
+            <a:ext cx="4678920" cy="1848960"/>
           </a:xfrm>
           <a:prstGeom prst="rect">
             <a:avLst/>
@@ -7703,7 +7400,7 @@
         <p:spPr>
           <a:xfrm>
             <a:off x="5760000" y="540000"/>
-            <a:ext cx="3959640" cy="1815840"/>
+            <a:ext cx="3959280" cy="1815480"/>
           </a:xfrm>
           <a:prstGeom prst="rect">
             <a:avLst/>
@@ -7726,7 +7423,7 @@
         <p:spPr>
           <a:xfrm>
             <a:off x="5803200" y="2700000"/>
-            <a:ext cx="3736800" cy="2419920"/>
+            <a:ext cx="3736440" cy="2419560"/>
           </a:xfrm>
           <a:prstGeom prst="rect">
             <a:avLst/>
@@ -7779,7 +7476,7 @@
         <p:spPr>
           <a:xfrm>
             <a:off x="360000" y="225720"/>
-            <a:ext cx="9359280" cy="718200"/>
+            <a:ext cx="9358920" cy="717840"/>
           </a:xfrm>
           <a:prstGeom prst="rect">
             <a:avLst/>
@@ -7834,7 +7531,7 @@
         <p:spPr>
           <a:xfrm>
             <a:off x="360000" y="1485000"/>
-            <a:ext cx="5219640" cy="1574640"/>
+            <a:ext cx="4860000" cy="1035000"/>
           </a:xfrm>
           <a:prstGeom prst="rect">
             <a:avLst/>
@@ -7870,16 +7567,7 @@
                 </a:solidFill>
                 <a:latin typeface="Source Sans Pro Semibold"/>
               </a:rPr>
-              <a:t>Form to submit data on </a:t>
-            </a:r>
-            <a:r>
-              <a:rPr b="1" lang="en-GB" sz="2400" spc="-1" strike="noStrike">
-                <a:solidFill>
-                  <a:srgbClr val="2c3e50"/>
-                </a:solidFill>
-                <a:latin typeface="Source Sans Pro Semibold"/>
-              </a:rPr>
-              <a:t>Patient/Therapist information</a:t>
+              <a:t>Form to submit data on Patient/Therapist information</a:t>
             </a:r>
             <a:endParaRPr b="0" lang="en-GB" sz="2400" spc="-1" strike="noStrike">
               <a:solidFill>
@@ -7902,13 +7590,13 @@
         </p:blipFill>
         <p:spPr>
           <a:xfrm>
-            <a:off x="765360" y="2340000"/>
-            <a:ext cx="4274280" cy="2974320"/>
-          </a:xfrm>
-          <a:prstGeom prst="rect">
-            <a:avLst/>
-          </a:prstGeom>
-          <a:ln w="10800">
+            <a:off x="5400000" y="1620000"/>
+            <a:ext cx="4499280" cy="3248640"/>
+          </a:xfrm>
+          <a:prstGeom prst="rect">
+            <a:avLst/>
+          </a:prstGeom>
+          <a:ln w="0">
             <a:noFill/>
           </a:ln>
         </p:spPr>
@@ -7925,8 +7613,8 @@
         </p:blipFill>
         <p:spPr>
           <a:xfrm>
-            <a:off x="5400000" y="1620000"/>
-            <a:ext cx="4499640" cy="3249000"/>
+            <a:off x="987840" y="2340000"/>
+            <a:ext cx="3512160" cy="2880000"/>
           </a:xfrm>
           <a:prstGeom prst="rect">
             <a:avLst/>
@@ -7979,7 +7667,7 @@
         <p:spPr>
           <a:xfrm>
             <a:off x="360000" y="225720"/>
-            <a:ext cx="9359280" cy="718200"/>
+            <a:ext cx="9358920" cy="717840"/>
           </a:xfrm>
           <a:prstGeom prst="rect">
             <a:avLst/>
@@ -8010,133 +7698,7 @@
                 </a:solidFill>
                 <a:latin typeface="Source Sans Pro Black"/>
               </a:rPr>
-              <a:t>U</a:t>
-            </a:r>
-            <a:r>
-              <a:rPr b="1" lang="en-GB" sz="2700" spc="-1" strike="noStrike">
-                <a:solidFill>
-                  <a:srgbClr val="ffffff"/>
-                </a:solidFill>
-                <a:latin typeface="Source Sans Pro Black"/>
-              </a:rPr>
-              <a:t>s</a:t>
-            </a:r>
-            <a:r>
-              <a:rPr b="1" lang="en-GB" sz="2700" spc="-1" strike="noStrike">
-                <a:solidFill>
-                  <a:srgbClr val="ffffff"/>
-                </a:solidFill>
-                <a:latin typeface="Source Sans Pro Black"/>
-              </a:rPr>
-              <a:t>e</a:t>
-            </a:r>
-            <a:r>
-              <a:rPr b="1" lang="en-GB" sz="2700" spc="-1" strike="noStrike">
-                <a:solidFill>
-                  <a:srgbClr val="ffffff"/>
-                </a:solidFill>
-                <a:latin typeface="Source Sans Pro Black"/>
-              </a:rPr>
-              <a:t>r</a:t>
-            </a:r>
-            <a:r>
-              <a:rPr b="1" lang="en-GB" sz="2700" spc="-1" strike="noStrike">
-                <a:solidFill>
-                  <a:srgbClr val="ffffff"/>
-                </a:solidFill>
-                <a:latin typeface="Source Sans Pro Black"/>
-              </a:rPr>
-              <a:t> </a:t>
-            </a:r>
-            <a:r>
-              <a:rPr b="1" lang="en-GB" sz="2700" spc="-1" strike="noStrike">
-                <a:solidFill>
-                  <a:srgbClr val="ffffff"/>
-                </a:solidFill>
-                <a:latin typeface="Source Sans Pro Black"/>
-              </a:rPr>
-              <a:t>S</a:t>
-            </a:r>
-            <a:r>
-              <a:rPr b="1" lang="en-GB" sz="2700" spc="-1" strike="noStrike">
-                <a:solidFill>
-                  <a:srgbClr val="ffffff"/>
-                </a:solidFill>
-                <a:latin typeface="Source Sans Pro Black"/>
-              </a:rPr>
-              <a:t>t</a:t>
-            </a:r>
-            <a:r>
-              <a:rPr b="1" lang="en-GB" sz="2700" spc="-1" strike="noStrike">
-                <a:solidFill>
-                  <a:srgbClr val="ffffff"/>
-                </a:solidFill>
-                <a:latin typeface="Source Sans Pro Black"/>
-              </a:rPr>
-              <a:t>a</a:t>
-            </a:r>
-            <a:r>
-              <a:rPr b="1" lang="en-GB" sz="2700" spc="-1" strike="noStrike">
-                <a:solidFill>
-                  <a:srgbClr val="ffffff"/>
-                </a:solidFill>
-                <a:latin typeface="Source Sans Pro Black"/>
-              </a:rPr>
-              <a:t>t</a:t>
-            </a:r>
-            <a:r>
-              <a:rPr b="1" lang="en-GB" sz="2700" spc="-1" strike="noStrike">
-                <a:solidFill>
-                  <a:srgbClr val="ffffff"/>
-                </a:solidFill>
-                <a:latin typeface="Source Sans Pro Black"/>
-              </a:rPr>
-              <a:t>i</a:t>
-            </a:r>
-            <a:r>
-              <a:rPr b="1" lang="en-GB" sz="2700" spc="-1" strike="noStrike">
-                <a:solidFill>
-                  <a:srgbClr val="ffffff"/>
-                </a:solidFill>
-                <a:latin typeface="Source Sans Pro Black"/>
-              </a:rPr>
-              <a:t>s</a:t>
-            </a:r>
-            <a:r>
-              <a:rPr b="1" lang="en-GB" sz="2700" spc="-1" strike="noStrike">
-                <a:solidFill>
-                  <a:srgbClr val="ffffff"/>
-                </a:solidFill>
-                <a:latin typeface="Source Sans Pro Black"/>
-              </a:rPr>
-              <a:t>t</a:t>
-            </a:r>
-            <a:r>
-              <a:rPr b="1" lang="en-GB" sz="2700" spc="-1" strike="noStrike">
-                <a:solidFill>
-                  <a:srgbClr val="ffffff"/>
-                </a:solidFill>
-                <a:latin typeface="Source Sans Pro Black"/>
-              </a:rPr>
-              <a:t>i</a:t>
-            </a:r>
-            <a:r>
-              <a:rPr b="1" lang="en-GB" sz="2700" spc="-1" strike="noStrike">
-                <a:solidFill>
-                  <a:srgbClr val="ffffff"/>
-                </a:solidFill>
-                <a:latin typeface="Source Sans Pro Black"/>
-              </a:rPr>
-              <a:t>c</a:t>
-            </a:r>
-            <a:r>
-              <a:rPr b="1" lang="en-GB" sz="2700" spc="-1" strike="noStrike">
-                <a:solidFill>
-                  <a:srgbClr val="ffffff"/>
-                </a:solidFill>
-                <a:latin typeface="Source Sans Pro Black"/>
-              </a:rPr>
-              <a:t>s</a:t>
+              <a:t>User Statistics</a:t>
             </a:r>
             <a:endParaRPr b="0" lang="en-GB" sz="2700" spc="-1" strike="noStrike">
               <a:solidFill>
@@ -8160,7 +7722,7 @@
         <p:spPr>
           <a:xfrm>
             <a:off x="360000" y="1485000"/>
-            <a:ext cx="4679640" cy="1214640"/>
+            <a:ext cx="4679280" cy="1214280"/>
           </a:xfrm>
           <a:prstGeom prst="rect">
             <a:avLst/>
@@ -8196,16 +7758,7 @@
                 </a:solidFill>
                 <a:latin typeface="Source Sans Pro Semibold"/>
               </a:rPr>
-              <a:t>Submitted form information is </a:t>
-            </a:r>
-            <a:r>
-              <a:rPr b="1" lang="en-GB" sz="2000" spc="-1" strike="noStrike">
-                <a:solidFill>
-                  <a:srgbClr val="2c3e50"/>
-                </a:solidFill>
-                <a:latin typeface="Source Sans Pro Semibold"/>
-              </a:rPr>
-              <a:t>displayed on user stats page</a:t>
+              <a:t>Submitted form information is displayed on user stats page</a:t>
             </a:r>
             <a:endParaRPr b="0" lang="en-GB" sz="2000" spc="-1" strike="noStrike">
               <a:solidFill>
@@ -8236,25 +7789,7 @@
                 </a:solidFill>
                 <a:latin typeface="Source Sans Pro Semibold"/>
               </a:rPr>
-              <a:t>Exercise session statistics, including </a:t>
-            </a:r>
-            <a:r>
-              <a:rPr b="1" lang="en-GB" sz="2000" spc="-1" strike="noStrike">
-                <a:solidFill>
-                  <a:srgbClr val="2c3e50"/>
-                </a:solidFill>
-                <a:latin typeface="Source Sans Pro Semibold"/>
-              </a:rPr>
-              <a:t>total time spent exercising and </a:t>
-            </a:r>
-            <a:r>
-              <a:rPr b="1" lang="en-GB" sz="2000" spc="-1" strike="noStrike">
-                <a:solidFill>
-                  <a:srgbClr val="2c3e50"/>
-                </a:solidFill>
-                <a:latin typeface="Source Sans Pro Semibold"/>
-              </a:rPr>
-              <a:t>sessions completed</a:t>
+              <a:t>Exercise session statistics, including total time spent exercising and sessions completed</a:t>
             </a:r>
             <a:endParaRPr b="0" lang="en-GB" sz="2000" spc="-1" strike="noStrike">
               <a:solidFill>
@@ -8278,7 +7813,7 @@
         <p:spPr>
           <a:xfrm>
             <a:off x="720000" y="2819880"/>
-            <a:ext cx="3690000" cy="2455200"/>
+            <a:ext cx="3689640" cy="2454840"/>
           </a:xfrm>
           <a:prstGeom prst="rect">
             <a:avLst/>
@@ -8301,7 +7836,7 @@
         <p:spPr>
           <a:xfrm>
             <a:off x="5220000" y="828720"/>
-            <a:ext cx="4680000" cy="1871280"/>
+            <a:ext cx="4679640" cy="1870920"/>
           </a:xfrm>
           <a:prstGeom prst="rect">
             <a:avLst/>
@@ -8324,7 +7859,7 @@
         <p:spPr>
           <a:xfrm>
             <a:off x="5220000" y="2864160"/>
-            <a:ext cx="3678840" cy="2355480"/>
+            <a:ext cx="3678480" cy="2355120"/>
           </a:xfrm>
           <a:prstGeom prst="rect">
             <a:avLst/>
@@ -8377,7 +7912,7 @@
         <p:spPr>
           <a:xfrm>
             <a:off x="360000" y="225720"/>
-            <a:ext cx="9359280" cy="718200"/>
+            <a:ext cx="9358920" cy="717840"/>
           </a:xfrm>
           <a:prstGeom prst="rect">
             <a:avLst/>
@@ -8432,7 +7967,7 @@
         <p:spPr>
           <a:xfrm>
             <a:off x="301680" y="3013560"/>
-            <a:ext cx="5458320" cy="2026440"/>
+            <a:ext cx="5457960" cy="2026080"/>
           </a:xfrm>
           <a:prstGeom prst="rect">
             <a:avLst/>
@@ -8445,22 +7980,28 @@
       <p:sp>
         <p:nvSpPr>
           <p:cNvPr id="115" name="PlaceHolder 6"/>
-          <p:cNvSpPr txBox="1"/>
+          <p:cNvSpPr/>
           <p:nvPr/>
         </p:nvSpPr>
         <p:spPr>
           <a:xfrm>
             <a:off x="360360" y="1485000"/>
-            <a:ext cx="5399640" cy="855000"/>
-          </a:xfrm>
-          <a:prstGeom prst="rect">
-            <a:avLst/>
-          </a:prstGeom>
-          <a:noFill/>
-          <a:ln w="0">
-            <a:noFill/>
-          </a:ln>
-        </p:spPr>
+            <a:ext cx="5399280" cy="854640"/>
+          </a:xfrm>
+          <a:prstGeom prst="rect">
+            <a:avLst/>
+          </a:prstGeom>
+          <a:noFill/>
+          <a:ln w="0">
+            <a:noFill/>
+          </a:ln>
+        </p:spPr>
+        <p:style>
+          <a:lnRef idx="0"/>
+          <a:fillRef idx="0"/>
+          <a:effectRef idx="0"/>
+          <a:fontRef idx="minor"/>
+        </p:style>
         <p:txBody>
           <a:bodyPr lIns="0" rIns="0" tIns="0" bIns="0" anchor="t">
             <a:normAutofit/>
@@ -8511,7 +8052,7 @@
         <p:spPr>
           <a:xfrm>
             <a:off x="5402160" y="1260000"/>
-            <a:ext cx="4497840" cy="1260000"/>
+            <a:ext cx="4497480" cy="1259640"/>
           </a:xfrm>
           <a:prstGeom prst="rect">
             <a:avLst/>
@@ -8534,7 +8075,7 @@
         <p:spPr>
           <a:xfrm>
             <a:off x="5985000" y="2880000"/>
-            <a:ext cx="3758040" cy="2007720"/>
+            <a:ext cx="3757680" cy="2007360"/>
           </a:xfrm>
           <a:prstGeom prst="rect">
             <a:avLst/>
@@ -8587,7 +8128,7 @@
         <p:spPr>
           <a:xfrm>
             <a:off x="360000" y="225720"/>
-            <a:ext cx="9359280" cy="718200"/>
+            <a:ext cx="9358920" cy="717840"/>
           </a:xfrm>
           <a:prstGeom prst="rect">
             <a:avLst/>
@@ -8632,22 +8173,28 @@
       <p:sp>
         <p:nvSpPr>
           <p:cNvPr id="119" name="PlaceHolder 8"/>
-          <p:cNvSpPr txBox="1"/>
+          <p:cNvSpPr/>
           <p:nvPr/>
         </p:nvSpPr>
         <p:spPr>
           <a:xfrm>
             <a:off x="360360" y="1485000"/>
-            <a:ext cx="5399640" cy="855000"/>
-          </a:xfrm>
-          <a:prstGeom prst="rect">
-            <a:avLst/>
-          </a:prstGeom>
-          <a:noFill/>
-          <a:ln w="0">
-            <a:noFill/>
-          </a:ln>
-        </p:spPr>
+            <a:ext cx="5399280" cy="854640"/>
+          </a:xfrm>
+          <a:prstGeom prst="rect">
+            <a:avLst/>
+          </a:prstGeom>
+          <a:noFill/>
+          <a:ln w="0">
+            <a:noFill/>
+          </a:ln>
+        </p:spPr>
+        <p:style>
+          <a:lnRef idx="0"/>
+          <a:fillRef idx="0"/>
+          <a:effectRef idx="0"/>
+          <a:fontRef idx="minor"/>
+        </p:style>
         <p:txBody>
           <a:bodyPr lIns="0" rIns="0" tIns="0" bIns="0" anchor="t">
             <a:normAutofit fontScale="81000"/>
@@ -8705,16 +8252,7 @@
                 </a:solidFill>
                 <a:latin typeface="Source Sans Pro Semibold"/>
               </a:rPr>
-              <a:t>Therapist can add patients and view their </a:t>
-            </a:r>
-            <a:r>
-              <a:rPr b="1" lang="en-GB" sz="2000" spc="-1" strike="noStrike">
-                <a:solidFill>
-                  <a:srgbClr val="2c3e50"/>
-                </a:solidFill>
-                <a:latin typeface="Source Sans Pro Semibold"/>
-              </a:rPr>
-              <a:t>statistics</a:t>
+              <a:t>Therapist can add patients and view their statistics</a:t>
             </a:r>
             <a:endParaRPr b="0" lang="en-GB" sz="2000" spc="-1" strike="noStrike">
               <a:solidFill>
@@ -8738,7 +8276,7 @@
         <p:spPr>
           <a:xfrm>
             <a:off x="540000" y="2520000"/>
-            <a:ext cx="4793400" cy="2700000"/>
+            <a:ext cx="4793040" cy="2699640"/>
           </a:xfrm>
           <a:prstGeom prst="rect">
             <a:avLst/>
@@ -8761,7 +8299,7 @@
         <p:spPr>
           <a:xfrm>
             <a:off x="6300000" y="360000"/>
-            <a:ext cx="3060000" cy="3053160"/>
+            <a:ext cx="3059640" cy="3052800"/>
           </a:xfrm>
           <a:prstGeom prst="rect">
             <a:avLst/>
@@ -8784,7 +8322,7 @@
         <p:spPr>
           <a:xfrm>
             <a:off x="6300000" y="3600000"/>
-            <a:ext cx="2809080" cy="1893960"/>
+            <a:ext cx="2808720" cy="1893600"/>
           </a:xfrm>
           <a:prstGeom prst="rect">
             <a:avLst/>
@@ -8837,7 +8375,7 @@
         <p:spPr>
           <a:xfrm>
             <a:off x="360000" y="225720"/>
-            <a:ext cx="9359280" cy="718200"/>
+            <a:ext cx="9358920" cy="717840"/>
           </a:xfrm>
           <a:prstGeom prst="rect">
             <a:avLst/>
@@ -8868,7 +8406,7 @@
                 </a:solidFill>
                 <a:latin typeface="Source Sans Pro Black"/>
               </a:rPr>
-              <a:t>TODO - MatLab Psychtoolbox Simulation Integration</a:t>
+              <a:t>MatLab Psychtoolbox Simulation Integration</a:t>
             </a:r>
             <a:endParaRPr b="0" lang="en-GB" sz="2700" spc="-1" strike="noStrike">
               <a:solidFill>
@@ -8892,7 +8430,7 @@
         <p:spPr>
           <a:xfrm>
             <a:off x="360000" y="1485000"/>
-            <a:ext cx="5579640" cy="1934640"/>
+            <a:ext cx="5579280" cy="1934280"/>
           </a:xfrm>
           <a:prstGeom prst="rect">
             <a:avLst/>
@@ -8928,16 +8466,7 @@
                 </a:solidFill>
                 <a:latin typeface="Source Sans Pro Semibold"/>
               </a:rPr>
-              <a:t>Aim is to integrate the NeuroRecovery app with a MatLab </a:t>
-            </a:r>
-            <a:r>
-              <a:rPr b="1" lang="en-GB" sz="1600" spc="-1" strike="noStrike">
-                <a:solidFill>
-                  <a:srgbClr val="2c3e50"/>
-                </a:solidFill>
-                <a:latin typeface="Source Sans Pro Semibold"/>
-              </a:rPr>
-              <a:t>Psychtoolbox Simulation</a:t>
+              <a:t>Aim is to integrate the NeuroRecovery app with a MatLab Psychtoolbox Simulation</a:t>
             </a:r>
             <a:endParaRPr b="0" lang="en-GB" sz="1600" spc="-1" strike="noStrike">
               <a:solidFill>
@@ -8968,16 +8497,7 @@
                 </a:solidFill>
                 <a:latin typeface="Source Sans Pro Semibold"/>
               </a:rPr>
-              <a:t>Local Python server on client triggers RDP or Local Matlab </a:t>
-            </a:r>
-            <a:r>
-              <a:rPr b="1" lang="en-GB" sz="1600" spc="-1" strike="noStrike">
-                <a:solidFill>
-                  <a:srgbClr val="2c3e50"/>
-                </a:solidFill>
-                <a:latin typeface="Source Sans Pro Semibold"/>
-              </a:rPr>
-              <a:t>program for Psychtoolbox Simulation</a:t>
+              <a:t>Local Python server on client triggers RDP or Local Matlab program for Psychtoolbox Simulation</a:t>
             </a:r>
             <a:endParaRPr b="0" lang="en-GB" sz="1600" spc="-1" strike="noStrike">
               <a:solidFill>
@@ -9001,7 +8521,7 @@
         <p:spPr>
           <a:xfrm>
             <a:off x="213480" y="3391560"/>
-            <a:ext cx="5366160" cy="1648080"/>
+            <a:ext cx="5365800" cy="1647720"/>
           </a:xfrm>
           <a:prstGeom prst="rect">
             <a:avLst/>
@@ -9024,7 +8544,7 @@
         <p:spPr>
           <a:xfrm>
             <a:off x="5724720" y="3420000"/>
-            <a:ext cx="3814920" cy="1951560"/>
+            <a:ext cx="3814560" cy="1951200"/>
           </a:xfrm>
           <a:prstGeom prst="rect">
             <a:avLst/>
@@ -9047,7 +8567,7 @@
         <p:spPr>
           <a:xfrm>
             <a:off x="6889680" y="1260000"/>
-            <a:ext cx="2649960" cy="2135160"/>
+            <a:ext cx="2649600" cy="2134800"/>
           </a:xfrm>
           <a:prstGeom prst="rect">
             <a:avLst/>

</xml_diff>

<commit_message>
draft final presentation complete
</commit_message>
<xml_diff>
--- a/report/neurorecovery_final_presentation.pptx
+++ b/report/neurorecovery_final_presentation.pptx
@@ -17,6 +17,11 @@
     <p:sldId id="264" r:id="rId12"/>
     <p:sldId id="265" r:id="rId13"/>
     <p:sldId id="266" r:id="rId14"/>
+    <p:sldId id="267" r:id="rId15"/>
+    <p:sldId id="268" r:id="rId16"/>
+    <p:sldId id="269" r:id="rId17"/>
+    <p:sldId id="270" r:id="rId18"/>
+    <p:sldId id="271" r:id="rId19"/>
   </p:sldIdLst>
   <p:sldSz cx="10080625" cy="5670550"/>
   <p:notesSz cx="7559675" cy="10691813"/>
@@ -74,7 +79,7 @@
         <p:txBody>
           <a:bodyPr/>
           <a:p>
-            <a:fld id="{D511F990-0693-4FDB-B5DD-3A3DFE304180}" type="slidenum">
+            <a:fld id="{F90192C6-57B2-49B6-A247-C70792FE4DAA}" type="slidenum">
               <a:t>&lt;#&gt;</a:t>
             </a:fld>
           </a:p>
@@ -283,7 +288,7 @@
         <p:txBody>
           <a:bodyPr/>
           <a:p>
-            <a:fld id="{D6559F43-390B-4471-8471-8ED0437D5305}" type="slidenum">
+            <a:fld id="{410DC0DF-6214-4CAA-8C8E-547B690E5319}" type="slidenum">
               <a:t>&lt;#&gt;</a:t>
             </a:fld>
           </a:p>
@@ -578,7 +583,7 @@
         <p:txBody>
           <a:bodyPr/>
           <a:p>
-            <a:fld id="{79A0210C-BCB1-4F4A-8A28-565B6C741AC0}" type="slidenum">
+            <a:fld id="{94F984B3-D8F8-4F38-8FAD-F9A8CBFFC30B}" type="slidenum">
               <a:t>&lt;#&gt;</a:t>
             </a:fld>
           </a:p>
@@ -959,7 +964,7 @@
         <p:txBody>
           <a:bodyPr/>
           <a:p>
-            <a:fld id="{CEF21CF3-AD6B-4BE9-9502-63125148F13B}" type="slidenum">
+            <a:fld id="{C6E32D25-718B-4A60-B791-E7A627AFC53B}" type="slidenum">
               <a:t>&lt;#&gt;</a:t>
             </a:fld>
           </a:p>
@@ -2099,7 +2104,7 @@
         <p:txBody>
           <a:bodyPr/>
           <a:p>
-            <a:fld id="{DB105A50-2275-498D-B93B-4E0478B08C59}" type="slidenum">
+            <a:fld id="{232969BB-089D-492E-B3A8-2EE394CDBBFD}" type="slidenum">
               <a:t>&lt;#&gt;</a:t>
             </a:fld>
           </a:p>
@@ -3554,7 +3559,7 @@
         <p:txBody>
           <a:bodyPr/>
           <a:p>
-            <a:fld id="{3122215C-B1C8-4470-BF97-14F675E7C56B}" type="slidenum">
+            <a:fld id="{2E8CC0F7-BFEC-4676-87B6-C89151760CB4}" type="slidenum">
               <a:t>&lt;#&gt;</a:t>
             </a:fld>
           </a:p>
@@ -3763,7 +3768,7 @@
         <p:txBody>
           <a:bodyPr/>
           <a:p>
-            <a:fld id="{A71AA085-2B1D-40C0-968E-8413970A5537}" type="slidenum">
+            <a:fld id="{1823DC01-812B-4185-838F-4E855C25C5AA}" type="slidenum">
               <a:t>&lt;#&gt;</a:t>
             </a:fld>
           </a:p>
@@ -3886,7 +3891,7 @@
         <p:txBody>
           <a:bodyPr/>
           <a:p>
-            <a:fld id="{4945C620-C0E6-4F26-BEF7-7AE3DB807790}" type="slidenum">
+            <a:fld id="{256C3DE0-5F15-46F0-8AF4-0315653F1468}" type="slidenum">
               <a:t>&lt;#&gt;</a:t>
             </a:fld>
           </a:p>
@@ -4007,7 +4012,7 @@
         <p:txBody>
           <a:bodyPr/>
           <a:p>
-            <a:fld id="{AD98FAED-503F-42AF-AEDF-E826CE056EE5}" type="slidenum">
+            <a:fld id="{76E162F9-EC7B-4AE7-82D6-723A586BDC14}" type="slidenum">
               <a:t>&lt;#&gt;</a:t>
             </a:fld>
           </a:p>
@@ -4259,7 +4264,7 @@
         <p:txBody>
           <a:bodyPr/>
           <a:p>
-            <a:fld id="{D6491913-9AD6-4E72-B27D-8FD3BB25711B}" type="slidenum">
+            <a:fld id="{EFDB38AB-CDB7-4528-B6B1-FB7BE4098451}" type="slidenum">
               <a:t>&lt;#&gt;</a:t>
             </a:fld>
           </a:p>
@@ -4511,7 +4516,7 @@
         <p:txBody>
           <a:bodyPr/>
           <a:p>
-            <a:fld id="{CCD56149-F3E7-4C28-A4F1-79BE54781B51}" type="slidenum">
+            <a:fld id="{ECA7F4D4-03CD-40B6-88D6-06877E68B8EA}" type="slidenum">
               <a:t>&lt;#&gt;</a:t>
             </a:fld>
           </a:p>
@@ -4763,7 +4768,7 @@
         <p:txBody>
           <a:bodyPr/>
           <a:p>
-            <a:fld id="{AD0EF4F5-645B-4FED-9CC5-13ACB8E36E0C}" type="slidenum">
+            <a:fld id="{4BDEC060-C9D8-4B54-A824-5133C9A81594}" type="slidenum">
               <a:t>&lt;#&gt;</a:t>
             </a:fld>
           </a:p>
@@ -5035,7 +5040,7 @@
                 <a:tab algn="l" pos="0"/>
               </a:tabLst>
             </a:pPr>
-            <a:fld id="{CE03C117-9AE9-4770-80B1-4FEA3465DCB0}" type="slidenum">
+            <a:fld id="{872D9A3F-6B35-4640-B552-1B9CE7E80159}" type="slidenum">
               <a:rPr b="1" lang="en-GB" sz="1800" spc="-1" strike="noStrike">
                 <a:solidFill>
                   <a:srgbClr val="ffffff"/>
@@ -5603,7 +5608,7 @@
                 <a:spcPct val="100000"/>
               </a:lnSpc>
             </a:pPr>
-            <a:fld id="{8219431F-EE77-4E50-96D7-2292A6EC71A9}" type="slidenum">
+            <a:fld id="{94F93165-EAAA-4D38-A48F-F50B7AAD9792}" type="slidenum">
               <a:rPr b="1" lang="en-GB" sz="1800" spc="-1" strike="noStrike">
                 <a:solidFill>
                   <a:srgbClr val="ffffff"/>
@@ -6230,7 +6235,7 @@
       </p:grpSpPr>
       <p:sp>
         <p:nvSpPr>
-          <p:cNvPr id="128" name="PlaceHolder 1"/>
+          <p:cNvPr id="125" name="PlaceHolder 1"/>
           <p:cNvSpPr>
             <a:spLocks noGrp="1"/>
           </p:cNvSpPr>
@@ -6272,7 +6277,7 @@
                 </a:solidFill>
                 <a:latin typeface="Source Sans Pro Black"/>
               </a:rPr>
-              <a:t>Technical Implementation</a:t>
+              <a:t>MatLab Psychtoolbox Simulation Integration</a:t>
             </a:r>
             <a:endParaRPr b="0" lang="en-GB" sz="2700" spc="-1" strike="noStrike">
               <a:solidFill>
@@ -6285,7 +6290,7 @@
       </p:sp>
       <p:sp>
         <p:nvSpPr>
-          <p:cNvPr id="129" name="PlaceHolder 2"/>
+          <p:cNvPr id="126" name="PlaceHolder 2"/>
           <p:cNvSpPr>
             <a:spLocks noGrp="1"/>
           </p:cNvSpPr>
@@ -6296,7 +6301,7 @@
         <p:spPr>
           <a:xfrm>
             <a:off x="360000" y="1485000"/>
-            <a:ext cx="9358920" cy="3778920"/>
+            <a:ext cx="5579280" cy="1934280"/>
           </a:xfrm>
           <a:prstGeom prst="rect">
             <a:avLst/>
@@ -6326,15 +6331,15 @@
               <a:buChar char=""/>
             </a:pPr>
             <a:r>
-              <a:rPr b="1" lang="en-GB" sz="2400" spc="-1" strike="noStrike">
+              <a:rPr b="1" lang="en-GB" sz="1600" spc="-1" strike="noStrike">
                 <a:solidFill>
                   <a:srgbClr val="2c3e50"/>
                 </a:solidFill>
                 <a:latin typeface="Source Sans Pro Semibold"/>
               </a:rPr>
-              <a:t>Frontend is a Typescript Angular SPA</a:t>
-            </a:r>
-            <a:endParaRPr b="0" lang="en-GB" sz="2400" spc="-1" strike="noStrike">
+              <a:t>Aim is to integrate the NeuroRecovery app with a MatLab Psychtoolbox Simulation</a:t>
+            </a:r>
+            <a:endParaRPr b="0" lang="en-GB" sz="1600" spc="-1" strike="noStrike">
               <a:solidFill>
                 <a:srgbClr val="000000"/>
               </a:solidFill>
@@ -6357,85 +6362,92 @@
               <a:buChar char=""/>
             </a:pPr>
             <a:r>
-              <a:rPr b="1" lang="en-GB" sz="2400" spc="-1" strike="noStrike">
+              <a:rPr b="1" lang="en-GB" sz="1600" spc="-1" strike="noStrike">
                 <a:solidFill>
                   <a:srgbClr val="2c3e50"/>
                 </a:solidFill>
                 <a:latin typeface="Source Sans Pro Semibold"/>
               </a:rPr>
-              <a:t>Backend is a Rust Axum server </a:t>
-            </a:r>
-            <a:endParaRPr b="0" lang="en-GB" sz="2400" spc="-1" strike="noStrike">
-              <a:solidFill>
-                <a:srgbClr val="000000"/>
-              </a:solidFill>
-              <a:latin typeface="Arial"/>
-            </a:endParaRPr>
-          </a:p>
-          <a:p>
-            <a:pPr marL="432000" indent="-324000">
-              <a:lnSpc>
-                <a:spcPct val="100000"/>
-              </a:lnSpc>
-              <a:spcAft>
-                <a:spcPts val="1057"/>
-              </a:spcAft>
-              <a:buClr>
-                <a:srgbClr val="2c3e50"/>
-              </a:buClr>
-              <a:buSzPct val="45000"/>
-              <a:buFont typeface="Wingdings" charset="2"/>
-              <a:buChar char=""/>
-            </a:pPr>
-            <a:r>
-              <a:rPr b="1" lang="en-GB" sz="2400" spc="-1" strike="noStrike">
-                <a:solidFill>
-                  <a:srgbClr val="2c3e50"/>
-                </a:solidFill>
-                <a:latin typeface="Source Sans Pro Semibold"/>
-              </a:rPr>
-              <a:t>MongoDB NoSQL database</a:t>
-            </a:r>
-            <a:endParaRPr b="0" lang="en-GB" sz="2400" spc="-1" strike="noStrike">
-              <a:solidFill>
-                <a:srgbClr val="000000"/>
-              </a:solidFill>
-              <a:latin typeface="Arial"/>
-            </a:endParaRPr>
-          </a:p>
-          <a:p>
-            <a:pPr marL="432000" indent="-324000">
-              <a:lnSpc>
-                <a:spcPct val="100000"/>
-              </a:lnSpc>
-              <a:spcAft>
-                <a:spcPts val="1057"/>
-              </a:spcAft>
-              <a:buClr>
-                <a:srgbClr val="2c3e50"/>
-              </a:buClr>
-              <a:buSzPct val="45000"/>
-              <a:buFont typeface="Wingdings" charset="2"/>
-              <a:buChar char=""/>
-            </a:pPr>
-            <a:r>
-              <a:rPr b="1" lang="en-GB" sz="2400" spc="-1" strike="noStrike">
-                <a:solidFill>
-                  <a:srgbClr val="2c3e50"/>
-                </a:solidFill>
-                <a:latin typeface="Source Sans Pro Semibold"/>
-              </a:rPr>
-              <a:t>Hosted in a Kubernetes Cluster(K3s) running in an Azure RHEL Virtual Machine</a:t>
-            </a:r>
-            <a:endParaRPr b="0" lang="en-GB" sz="2400" spc="-1" strike="noStrike">
-              <a:solidFill>
-                <a:srgbClr val="000000"/>
-              </a:solidFill>
-              <a:latin typeface="Arial"/>
-            </a:endParaRPr>
-          </a:p>
-        </p:txBody>
-      </p:sp>
+              <a:t>Local Python server on client triggers RDP or Local Matlab program for Psychtoolbox Simulation</a:t>
+            </a:r>
+            <a:endParaRPr b="0" lang="en-GB" sz="1600" spc="-1" strike="noStrike">
+              <a:solidFill>
+                <a:srgbClr val="000000"/>
+              </a:solidFill>
+              <a:latin typeface="Arial"/>
+            </a:endParaRPr>
+          </a:p>
+        </p:txBody>
+      </p:sp>
+      <p:pic>
+        <p:nvPicPr>
+          <p:cNvPr id="127" name="" descr=""/>
+          <p:cNvPicPr/>
+          <p:nvPr/>
+        </p:nvPicPr>
+        <p:blipFill>
+          <a:blip r:embed="rId1"/>
+          <a:stretch/>
+        </p:blipFill>
+        <p:spPr>
+          <a:xfrm>
+            <a:off x="213480" y="3391560"/>
+            <a:ext cx="5365800" cy="1647720"/>
+          </a:xfrm>
+          <a:prstGeom prst="rect">
+            <a:avLst/>
+          </a:prstGeom>
+          <a:ln w="10800">
+            <a:noFill/>
+          </a:ln>
+        </p:spPr>
+      </p:pic>
+      <p:pic>
+        <p:nvPicPr>
+          <p:cNvPr id="128" name="" descr=""/>
+          <p:cNvPicPr/>
+          <p:nvPr/>
+        </p:nvPicPr>
+        <p:blipFill>
+          <a:blip r:embed="rId2"/>
+          <a:stretch/>
+        </p:blipFill>
+        <p:spPr>
+          <a:xfrm>
+            <a:off x="5724720" y="3420000"/>
+            <a:ext cx="3814560" cy="1951200"/>
+          </a:xfrm>
+          <a:prstGeom prst="rect">
+            <a:avLst/>
+          </a:prstGeom>
+          <a:ln w="0">
+            <a:noFill/>
+          </a:ln>
+        </p:spPr>
+      </p:pic>
+      <p:pic>
+        <p:nvPicPr>
+          <p:cNvPr id="129" name="" descr=""/>
+          <p:cNvPicPr/>
+          <p:nvPr/>
+        </p:nvPicPr>
+        <p:blipFill>
+          <a:blip r:embed="rId3"/>
+          <a:stretch/>
+        </p:blipFill>
+        <p:spPr>
+          <a:xfrm>
+            <a:off x="6889680" y="1260000"/>
+            <a:ext cx="2649600" cy="2134800"/>
+          </a:xfrm>
+          <a:prstGeom prst="rect">
+            <a:avLst/>
+          </a:prstGeom>
+          <a:ln w="0">
+            <a:noFill/>
+          </a:ln>
+        </p:spPr>
+      </p:pic>
     </p:spTree>
   </p:cSld>
   <mc:AlternateContent>
@@ -6494,10 +6506,25 @@
             <a:noAutofit/>
           </a:bodyPr>
           <a:p>
-            <a:pPr indent="0" algn="ctr">
+            <a:pPr indent="0">
+              <a:lnSpc>
+                <a:spcPct val="100000"/>
+              </a:lnSpc>
               <a:buNone/>
-            </a:pPr>
-            <a:endParaRPr b="0" lang="en-GB" sz="1800" spc="-1" strike="noStrike">
+              <a:tabLst>
+                <a:tab algn="l" pos="0"/>
+              </a:tabLst>
+            </a:pPr>
+            <a:r>
+              <a:rPr b="1" lang="en-GB" sz="2700" spc="-1" strike="noStrike">
+                <a:solidFill>
+                  <a:srgbClr val="ffffff"/>
+                </a:solidFill>
+                <a:latin typeface="Source Sans Pro Black"/>
+              </a:rPr>
+              <a:t>Technical Implementation</a:t>
+            </a:r>
+            <a:endParaRPr b="0" lang="en-GB" sz="2700" spc="-1" strike="noStrike">
               <a:solidFill>
                 <a:srgbClr val="000000"/>
               </a:solidFill>
@@ -6555,7 +6582,7 @@
                 </a:solidFill>
                 <a:latin typeface="Source Sans Pro Semibold"/>
               </a:rPr>
-              <a:t>Frontend is a Typescript Angular SPA</a:t>
+              <a:t>TypeScript Angular SPA Frontend</a:t>
             </a:r>
             <a:endParaRPr b="0" lang="en-GB" sz="2400" spc="-1" strike="noStrike">
               <a:solidFill>
@@ -6586,7 +6613,7 @@
                 </a:solidFill>
                 <a:latin typeface="Source Sans Pro Semibold"/>
               </a:rPr>
-              <a:t>Backend is a Rust Axum server </a:t>
+              <a:t>Rust Axum Backend </a:t>
             </a:r>
             <a:endParaRPr b="0" lang="en-GB" sz="2400" spc="-1" strike="noStrike">
               <a:solidFill>
@@ -6648,7 +6675,25 @@
                 </a:solidFill>
                 <a:latin typeface="Source Sans Pro Semibold"/>
               </a:rPr>
-              <a:t>Hosted in a Kubernetes Cluster(K3s) running in an Azure RHEL Virtual Machine</a:t>
+              <a:t>Hosted in a Kubernetes Cluster(K3s) </a:t>
+            </a:r>
+            <a:r>
+              <a:rPr b="1" lang="en-GB" sz="2400" spc="-1" strike="noStrike">
+                <a:solidFill>
+                  <a:srgbClr val="2c3e50"/>
+                </a:solidFill>
+                <a:latin typeface="Source Sans Pro Semibold"/>
+              </a:rPr>
+              <a:t>running in an Azure RHEL Virtual </a:t>
+            </a:r>
+            <a:r>
+              <a:rPr b="1" lang="en-GB" sz="2400" spc="-1" strike="noStrike">
+                <a:solidFill>
+                  <a:srgbClr val="2c3e50"/>
+                </a:solidFill>
+                <a:latin typeface="Source Sans Pro Semibold"/>
+              </a:rPr>
+              <a:t>Machine</a:t>
             </a:r>
             <a:endParaRPr b="0" lang="en-GB" sz="2400" spc="-1" strike="noStrike">
               <a:solidFill>
@@ -6657,8 +6702,1481 @@
               <a:latin typeface="Arial"/>
             </a:endParaRPr>
           </a:p>
-        </p:txBody>
-      </p:sp>
+          <a:p>
+            <a:pPr marL="432000" indent="-324000">
+              <a:lnSpc>
+                <a:spcPct val="100000"/>
+              </a:lnSpc>
+              <a:spcAft>
+                <a:spcPts val="1057"/>
+              </a:spcAft>
+              <a:buClr>
+                <a:srgbClr val="2c3e50"/>
+              </a:buClr>
+              <a:buSzPct val="45000"/>
+              <a:buFont typeface="Wingdings" charset="2"/>
+              <a:buChar char=""/>
+            </a:pPr>
+            <a:r>
+              <a:rPr b="1" lang="en-GB" sz="2400" spc="-1" strike="noStrike">
+                <a:solidFill>
+                  <a:srgbClr val="2c3e50"/>
+                </a:solidFill>
+                <a:latin typeface="Source Sans Pro Semibold"/>
+              </a:rPr>
+              <a:t>Tilt CI/CD is ran in the VM to provision </a:t>
+            </a:r>
+            <a:r>
+              <a:rPr b="1" lang="en-GB" sz="2400" spc="-1" strike="noStrike">
+                <a:solidFill>
+                  <a:srgbClr val="2c3e50"/>
+                </a:solidFill>
+                <a:latin typeface="Source Sans Pro Semibold"/>
+              </a:rPr>
+              <a:t>the full app</a:t>
+            </a:r>
+            <a:endParaRPr b="0" lang="en-GB" sz="2400" spc="-1" strike="noStrike">
+              <a:solidFill>
+                <a:srgbClr val="000000"/>
+              </a:solidFill>
+              <a:latin typeface="Arial"/>
+            </a:endParaRPr>
+          </a:p>
+        </p:txBody>
+      </p:sp>
+    </p:spTree>
+  </p:cSld>
+  <mc:AlternateContent>
+    <mc:Choice Requires="p14">
+      <p:transition spd="slow" p14:dur="2000"/>
+    </mc:Choice>
+    <mc:Fallback>
+      <p:transition spd="slow"/>
+    </mc:Fallback>
+  </mc:AlternateContent>
+</p:sld>
+</file>
+
+<file path=ppt/slides/slide12.xml><?xml version="1.0" encoding="utf-8"?>
+<p:sld xmlns:a="http://schemas.openxmlformats.org/drawingml/2006/main" xmlns:p="http://schemas.openxmlformats.org/presentationml/2006/main" xmlns:r="http://schemas.openxmlformats.org/officeDocument/2006/relationships" xmlns:p14="http://schemas.microsoft.com/office/powerpoint/2010/main" xmlns:p15="http://schemas.microsoft.com/office/powerpoint/2012/main" xmlns:mc="http://schemas.openxmlformats.org/markup-compatibility/2006">
+  <p:cSld>
+    <p:spTree>
+      <p:nvGrpSpPr>
+        <p:cNvPr id="1" name=""/>
+        <p:cNvGrpSpPr/>
+        <p:nvPr/>
+      </p:nvGrpSpPr>
+      <p:grpSpPr>
+        <a:xfrm>
+          <a:off x="0" y="0"/>
+          <a:ext cx="0" cy="0"/>
+          <a:chOff x="0" y="0"/>
+          <a:chExt cx="0" cy="0"/>
+        </a:xfrm>
+      </p:grpSpPr>
+      <p:sp>
+        <p:nvSpPr>
+          <p:cNvPr id="132" name="PlaceHolder 1"/>
+          <p:cNvSpPr>
+            <a:spLocks noGrp="1"/>
+          </p:cNvSpPr>
+          <p:nvPr>
+            <p:ph type="title"/>
+          </p:nvPr>
+        </p:nvSpPr>
+        <p:spPr>
+          <a:xfrm>
+            <a:off x="360000" y="225720"/>
+            <a:ext cx="9358920" cy="717840"/>
+          </a:xfrm>
+          <a:prstGeom prst="rect">
+            <a:avLst/>
+          </a:prstGeom>
+          <a:noFill/>
+          <a:ln w="0">
+            <a:noFill/>
+          </a:ln>
+        </p:spPr>
+        <p:txBody>
+          <a:bodyPr lIns="0" rIns="0" tIns="0" bIns="0" anchor="ctr">
+            <a:noAutofit/>
+          </a:bodyPr>
+          <a:p>
+            <a:pPr indent="0">
+              <a:lnSpc>
+                <a:spcPct val="100000"/>
+              </a:lnSpc>
+              <a:buNone/>
+              <a:tabLst>
+                <a:tab algn="l" pos="0"/>
+              </a:tabLst>
+            </a:pPr>
+            <a:r>
+              <a:rPr b="1" lang="en-GB" sz="2700" spc="-1" strike="noStrike">
+                <a:solidFill>
+                  <a:srgbClr val="ffffff"/>
+                </a:solidFill>
+                <a:latin typeface="Source Sans Pro Black"/>
+              </a:rPr>
+              <a:t>TypeScript Angular SPA Frontend</a:t>
+            </a:r>
+            <a:endParaRPr b="0" lang="en-GB" sz="2700" spc="-1" strike="noStrike">
+              <a:solidFill>
+                <a:srgbClr val="000000"/>
+              </a:solidFill>
+              <a:latin typeface="Arial"/>
+            </a:endParaRPr>
+          </a:p>
+        </p:txBody>
+      </p:sp>
+      <p:sp>
+        <p:nvSpPr>
+          <p:cNvPr id="133" name="PlaceHolder 2"/>
+          <p:cNvSpPr>
+            <a:spLocks noGrp="1"/>
+          </p:cNvSpPr>
+          <p:nvPr>
+            <p:ph/>
+          </p:nvPr>
+        </p:nvSpPr>
+        <p:spPr>
+          <a:xfrm>
+            <a:off x="360000" y="1485000"/>
+            <a:ext cx="5220000" cy="3735000"/>
+          </a:xfrm>
+          <a:prstGeom prst="rect">
+            <a:avLst/>
+          </a:prstGeom>
+          <a:noFill/>
+          <a:ln w="0">
+            <a:noFill/>
+          </a:ln>
+        </p:spPr>
+        <p:txBody>
+          <a:bodyPr lIns="0" rIns="0" tIns="0" bIns="0" anchor="t">
+            <a:normAutofit/>
+          </a:bodyPr>
+          <a:p>
+            <a:pPr marL="432000" indent="-324000">
+              <a:lnSpc>
+                <a:spcPct val="100000"/>
+              </a:lnSpc>
+              <a:spcAft>
+                <a:spcPts val="1057"/>
+              </a:spcAft>
+              <a:buClr>
+                <a:srgbClr val="2c3e50"/>
+              </a:buClr>
+              <a:buSzPct val="45000"/>
+              <a:buFont typeface="Wingdings" charset="2"/>
+              <a:buChar char=""/>
+            </a:pPr>
+            <a:r>
+              <a:rPr b="1" lang="en-GB" sz="1600" spc="-1" strike="noStrike">
+                <a:solidFill>
+                  <a:srgbClr val="2c3e50"/>
+                </a:solidFill>
+                <a:latin typeface="Source Sans Pro Semibold"/>
+              </a:rPr>
+              <a:t>Single Page Application(SPA) returns a HTML, CSS and JavaScript bundle to user’s browser</a:t>
+            </a:r>
+            <a:endParaRPr b="0" lang="en-GB" sz="1600" spc="-1" strike="noStrike">
+              <a:solidFill>
+                <a:srgbClr val="000000"/>
+              </a:solidFill>
+              <a:latin typeface="Arial"/>
+            </a:endParaRPr>
+          </a:p>
+          <a:p>
+            <a:pPr marL="432000" indent="-324000">
+              <a:lnSpc>
+                <a:spcPct val="100000"/>
+              </a:lnSpc>
+              <a:spcAft>
+                <a:spcPts val="1057"/>
+              </a:spcAft>
+              <a:buClr>
+                <a:srgbClr val="2c3e50"/>
+              </a:buClr>
+              <a:buSzPct val="45000"/>
+              <a:buFont typeface="Wingdings" charset="2"/>
+              <a:buChar char=""/>
+            </a:pPr>
+            <a:r>
+              <a:rPr b="1" lang="en-GB" sz="1600" spc="-1" strike="noStrike">
+                <a:solidFill>
+                  <a:srgbClr val="2c3e50"/>
+                </a:solidFill>
+                <a:latin typeface="Source Sans Pro Semibold"/>
+              </a:rPr>
+              <a:t>Instantaneous page switches when no backend interaction is required</a:t>
+            </a:r>
+            <a:endParaRPr b="0" lang="en-GB" sz="1600" spc="-1" strike="noStrike">
+              <a:solidFill>
+                <a:srgbClr val="000000"/>
+              </a:solidFill>
+              <a:latin typeface="Arial"/>
+            </a:endParaRPr>
+          </a:p>
+          <a:p>
+            <a:pPr marL="432000" indent="-324000">
+              <a:lnSpc>
+                <a:spcPct val="100000"/>
+              </a:lnSpc>
+              <a:spcAft>
+                <a:spcPts val="1057"/>
+              </a:spcAft>
+              <a:buClr>
+                <a:srgbClr val="2c3e50"/>
+              </a:buClr>
+              <a:buSzPct val="45000"/>
+              <a:buFont typeface="Wingdings" charset="2"/>
+              <a:buChar char=""/>
+            </a:pPr>
+            <a:r>
+              <a:rPr b="1" lang="en-GB" sz="1600" spc="-1" strike="noStrike">
+                <a:solidFill>
+                  <a:srgbClr val="2c3e50"/>
+                </a:solidFill>
+                <a:latin typeface="Source Sans Pro Semibold"/>
+              </a:rPr>
+              <a:t>Backend interaction requires requests to be made from the user’s browser using the JavaScript fetch API</a:t>
+            </a:r>
+            <a:endParaRPr b="0" lang="en-GB" sz="1600" spc="-1" strike="noStrike">
+              <a:solidFill>
+                <a:srgbClr val="000000"/>
+              </a:solidFill>
+              <a:latin typeface="Arial"/>
+            </a:endParaRPr>
+          </a:p>
+          <a:p>
+            <a:pPr marL="432000" indent="-324000">
+              <a:lnSpc>
+                <a:spcPct val="100000"/>
+              </a:lnSpc>
+              <a:spcAft>
+                <a:spcPts val="1057"/>
+              </a:spcAft>
+              <a:buClr>
+                <a:srgbClr val="2c3e50"/>
+              </a:buClr>
+              <a:buSzPct val="45000"/>
+              <a:buFont typeface="Wingdings" charset="2"/>
+              <a:buChar char=""/>
+            </a:pPr>
+            <a:r>
+              <a:rPr b="1" lang="en-GB" sz="1600" spc="-1" strike="noStrike">
+                <a:solidFill>
+                  <a:srgbClr val="2c3e50"/>
+                </a:solidFill>
+                <a:latin typeface="Source Sans Pro Semibold"/>
+              </a:rPr>
+              <a:t>Component-based frontend development, each page in the app is a separate component</a:t>
+            </a:r>
+            <a:endParaRPr b="0" lang="en-GB" sz="1600" spc="-1" strike="noStrike">
+              <a:solidFill>
+                <a:srgbClr val="000000"/>
+              </a:solidFill>
+              <a:latin typeface="Arial"/>
+            </a:endParaRPr>
+          </a:p>
+        </p:txBody>
+      </p:sp>
+      <p:pic>
+        <p:nvPicPr>
+          <p:cNvPr id="134" name="" descr=""/>
+          <p:cNvPicPr/>
+          <p:nvPr/>
+        </p:nvPicPr>
+        <p:blipFill>
+          <a:blip r:embed="rId1"/>
+          <a:stretch/>
+        </p:blipFill>
+        <p:spPr>
+          <a:xfrm>
+            <a:off x="6120000" y="217080"/>
+            <a:ext cx="1800000" cy="2842920"/>
+          </a:xfrm>
+          <a:prstGeom prst="rect">
+            <a:avLst/>
+          </a:prstGeom>
+          <a:ln w="0">
+            <a:noFill/>
+          </a:ln>
+        </p:spPr>
+      </p:pic>
+      <p:pic>
+        <p:nvPicPr>
+          <p:cNvPr id="135" name="" descr=""/>
+          <p:cNvPicPr/>
+          <p:nvPr/>
+        </p:nvPicPr>
+        <p:blipFill>
+          <a:blip r:embed="rId2"/>
+          <a:stretch/>
+        </p:blipFill>
+        <p:spPr>
+          <a:xfrm>
+            <a:off x="5682240" y="3157560"/>
+            <a:ext cx="3467880" cy="2422440"/>
+          </a:xfrm>
+          <a:prstGeom prst="rect">
+            <a:avLst/>
+          </a:prstGeom>
+          <a:ln w="0">
+            <a:noFill/>
+          </a:ln>
+        </p:spPr>
+      </p:pic>
+    </p:spTree>
+  </p:cSld>
+  <mc:AlternateContent>
+    <mc:Choice Requires="p14">
+      <p:transition spd="slow" p14:dur="2000"/>
+    </mc:Choice>
+    <mc:Fallback>
+      <p:transition spd="slow"/>
+    </mc:Fallback>
+  </mc:AlternateContent>
+</p:sld>
+</file>
+
+<file path=ppt/slides/slide13.xml><?xml version="1.0" encoding="utf-8"?>
+<p:sld xmlns:a="http://schemas.openxmlformats.org/drawingml/2006/main" xmlns:p="http://schemas.openxmlformats.org/presentationml/2006/main" xmlns:r="http://schemas.openxmlformats.org/officeDocument/2006/relationships" xmlns:p14="http://schemas.microsoft.com/office/powerpoint/2010/main" xmlns:p15="http://schemas.microsoft.com/office/powerpoint/2012/main" xmlns:mc="http://schemas.openxmlformats.org/markup-compatibility/2006">
+  <p:cSld>
+    <p:spTree>
+      <p:nvGrpSpPr>
+        <p:cNvPr id="1" name=""/>
+        <p:cNvGrpSpPr/>
+        <p:nvPr/>
+      </p:nvGrpSpPr>
+      <p:grpSpPr>
+        <a:xfrm>
+          <a:off x="0" y="0"/>
+          <a:ext cx="0" cy="0"/>
+          <a:chOff x="0" y="0"/>
+          <a:chExt cx="0" cy="0"/>
+        </a:xfrm>
+      </p:grpSpPr>
+      <p:sp>
+        <p:nvSpPr>
+          <p:cNvPr id="136" name="PlaceHolder 1"/>
+          <p:cNvSpPr>
+            <a:spLocks noGrp="1"/>
+          </p:cNvSpPr>
+          <p:nvPr>
+            <p:ph type="title"/>
+          </p:nvPr>
+        </p:nvSpPr>
+        <p:spPr>
+          <a:xfrm>
+            <a:off x="360000" y="225720"/>
+            <a:ext cx="9358920" cy="717840"/>
+          </a:xfrm>
+          <a:prstGeom prst="rect">
+            <a:avLst/>
+          </a:prstGeom>
+          <a:noFill/>
+          <a:ln w="0">
+            <a:noFill/>
+          </a:ln>
+        </p:spPr>
+        <p:txBody>
+          <a:bodyPr lIns="0" rIns="0" tIns="0" bIns="0" anchor="ctr">
+            <a:noAutofit/>
+          </a:bodyPr>
+          <a:p>
+            <a:pPr indent="0">
+              <a:lnSpc>
+                <a:spcPct val="100000"/>
+              </a:lnSpc>
+              <a:buNone/>
+              <a:tabLst>
+                <a:tab algn="l" pos="0"/>
+              </a:tabLst>
+            </a:pPr>
+            <a:r>
+              <a:rPr b="1" lang="en-GB" sz="2700" spc="-1" strike="noStrike">
+                <a:solidFill>
+                  <a:srgbClr val="ffffff"/>
+                </a:solidFill>
+                <a:latin typeface="Source Sans Pro Black"/>
+              </a:rPr>
+              <a:t>Rust Axum Backend</a:t>
+            </a:r>
+            <a:endParaRPr b="0" lang="en-GB" sz="2700" spc="-1" strike="noStrike">
+              <a:solidFill>
+                <a:srgbClr val="000000"/>
+              </a:solidFill>
+              <a:latin typeface="Arial"/>
+            </a:endParaRPr>
+          </a:p>
+        </p:txBody>
+      </p:sp>
+      <p:sp>
+        <p:nvSpPr>
+          <p:cNvPr id="137" name="PlaceHolder 2"/>
+          <p:cNvSpPr>
+            <a:spLocks noGrp="1"/>
+          </p:cNvSpPr>
+          <p:nvPr>
+            <p:ph/>
+          </p:nvPr>
+        </p:nvSpPr>
+        <p:spPr>
+          <a:xfrm>
+            <a:off x="360000" y="1485000"/>
+            <a:ext cx="4860000" cy="3735000"/>
+          </a:xfrm>
+          <a:prstGeom prst="rect">
+            <a:avLst/>
+          </a:prstGeom>
+          <a:noFill/>
+          <a:ln w="0">
+            <a:noFill/>
+          </a:ln>
+        </p:spPr>
+        <p:txBody>
+          <a:bodyPr lIns="0" rIns="0" tIns="0" bIns="0" anchor="t">
+            <a:normAutofit/>
+          </a:bodyPr>
+          <a:p>
+            <a:pPr marL="432000" indent="-324000">
+              <a:lnSpc>
+                <a:spcPct val="100000"/>
+              </a:lnSpc>
+              <a:spcAft>
+                <a:spcPts val="1057"/>
+              </a:spcAft>
+              <a:buClr>
+                <a:srgbClr val="2c3e50"/>
+              </a:buClr>
+              <a:buSzPct val="45000"/>
+              <a:buFont typeface="Wingdings" charset="2"/>
+              <a:buChar char=""/>
+            </a:pPr>
+            <a:r>
+              <a:rPr b="1" lang="en-GB" sz="1600" spc="-1" strike="noStrike">
+                <a:solidFill>
+                  <a:srgbClr val="2c3e50"/>
+                </a:solidFill>
+                <a:latin typeface="Source Sans Pro Semibold"/>
+              </a:rPr>
+              <a:t>Rust HTTP API developed with Axum framework</a:t>
+            </a:r>
+            <a:endParaRPr b="0" lang="en-GB" sz="1600" spc="-1" strike="noStrike">
+              <a:solidFill>
+                <a:srgbClr val="000000"/>
+              </a:solidFill>
+              <a:latin typeface="Arial"/>
+            </a:endParaRPr>
+          </a:p>
+          <a:p>
+            <a:pPr marL="432000" indent="-324000">
+              <a:lnSpc>
+                <a:spcPct val="100000"/>
+              </a:lnSpc>
+              <a:spcAft>
+                <a:spcPts val="1057"/>
+              </a:spcAft>
+              <a:buClr>
+                <a:srgbClr val="2c3e50"/>
+              </a:buClr>
+              <a:buSzPct val="45000"/>
+              <a:buFont typeface="Wingdings" charset="2"/>
+              <a:buChar char=""/>
+            </a:pPr>
+            <a:r>
+              <a:rPr b="1" lang="en-GB" sz="1600" spc="-1" strike="noStrike">
+                <a:solidFill>
+                  <a:srgbClr val="2c3e50"/>
+                </a:solidFill>
+                <a:latin typeface="Source Sans Pro Semibold"/>
+              </a:rPr>
+              <a:t>Structs dictate request and response data, which </a:t>
+            </a:r>
+            <a:r>
+              <a:rPr b="1" lang="en-GB" sz="1600" spc="-1" strike="noStrike">
+                <a:solidFill>
+                  <a:srgbClr val="2c3e50"/>
+                </a:solidFill>
+                <a:latin typeface="Source Sans Pro Semibold"/>
+              </a:rPr>
+              <a:t>is serialised and deserialised as JSON</a:t>
+            </a:r>
+            <a:endParaRPr b="0" lang="en-GB" sz="1600" spc="-1" strike="noStrike">
+              <a:solidFill>
+                <a:srgbClr val="000000"/>
+              </a:solidFill>
+              <a:latin typeface="Arial"/>
+            </a:endParaRPr>
+          </a:p>
+          <a:p>
+            <a:pPr marL="432000" indent="-324000">
+              <a:lnSpc>
+                <a:spcPct val="100000"/>
+              </a:lnSpc>
+              <a:spcAft>
+                <a:spcPts val="1057"/>
+              </a:spcAft>
+              <a:buClr>
+                <a:srgbClr val="2c3e50"/>
+              </a:buClr>
+              <a:buSzPct val="45000"/>
+              <a:buFont typeface="Wingdings" charset="2"/>
+              <a:buChar char=""/>
+            </a:pPr>
+            <a:r>
+              <a:rPr b="1" lang="en-GB" sz="1600" spc="-1" strike="noStrike">
+                <a:solidFill>
+                  <a:srgbClr val="2c3e50"/>
+                </a:solidFill>
+                <a:latin typeface="Source Sans Pro Semibold"/>
+              </a:rPr>
+              <a:t>Uses mongodb Rust crate for database </a:t>
+            </a:r>
+            <a:r>
+              <a:rPr b="1" lang="en-GB" sz="1600" spc="-1" strike="noStrike">
+                <a:solidFill>
+                  <a:srgbClr val="2c3e50"/>
+                </a:solidFill>
+                <a:latin typeface="Source Sans Pro Semibold"/>
+              </a:rPr>
+              <a:t>interaction</a:t>
+            </a:r>
+            <a:endParaRPr b="0" lang="en-GB" sz="1600" spc="-1" strike="noStrike">
+              <a:solidFill>
+                <a:srgbClr val="000000"/>
+              </a:solidFill>
+              <a:latin typeface="Arial"/>
+            </a:endParaRPr>
+          </a:p>
+          <a:p>
+            <a:pPr marL="432000" indent="-324000">
+              <a:lnSpc>
+                <a:spcPct val="100000"/>
+              </a:lnSpc>
+              <a:spcAft>
+                <a:spcPts val="1057"/>
+              </a:spcAft>
+              <a:buClr>
+                <a:srgbClr val="2c3e50"/>
+              </a:buClr>
+              <a:buSzPct val="45000"/>
+              <a:buFont typeface="Wingdings" charset="2"/>
+              <a:buChar char=""/>
+            </a:pPr>
+            <a:r>
+              <a:rPr b="1" lang="en-GB" sz="1600" spc="-1" strike="noStrike">
+                <a:solidFill>
+                  <a:srgbClr val="2c3e50"/>
+                </a:solidFill>
+                <a:latin typeface="Source Sans Pro Semibold"/>
+              </a:rPr>
+              <a:t>Frontend sends requests to the backend defined </a:t>
+            </a:r>
+            <a:r>
+              <a:rPr b="1" lang="en-GB" sz="1600" spc="-1" strike="noStrike">
+                <a:solidFill>
+                  <a:srgbClr val="2c3e50"/>
+                </a:solidFill>
+                <a:latin typeface="Source Sans Pro Semibold"/>
+              </a:rPr>
+              <a:t>HTTP endpoints</a:t>
+            </a:r>
+            <a:endParaRPr b="0" lang="en-GB" sz="1600" spc="-1" strike="noStrike">
+              <a:solidFill>
+                <a:srgbClr val="000000"/>
+              </a:solidFill>
+              <a:latin typeface="Arial"/>
+            </a:endParaRPr>
+          </a:p>
+        </p:txBody>
+      </p:sp>
+      <p:pic>
+        <p:nvPicPr>
+          <p:cNvPr id="138" name="" descr=""/>
+          <p:cNvPicPr/>
+          <p:nvPr/>
+        </p:nvPicPr>
+        <p:blipFill>
+          <a:blip r:embed="rId1"/>
+          <a:stretch/>
+        </p:blipFill>
+        <p:spPr>
+          <a:xfrm>
+            <a:off x="5580000" y="720000"/>
+            <a:ext cx="3426120" cy="4261680"/>
+          </a:xfrm>
+          <a:prstGeom prst="rect">
+            <a:avLst/>
+          </a:prstGeom>
+          <a:ln w="0">
+            <a:noFill/>
+          </a:ln>
+        </p:spPr>
+      </p:pic>
+    </p:spTree>
+  </p:cSld>
+  <mc:AlternateContent>
+    <mc:Choice Requires="p14">
+      <p:transition spd="slow" p14:dur="2000"/>
+    </mc:Choice>
+    <mc:Fallback>
+      <p:transition spd="slow"/>
+    </mc:Fallback>
+  </mc:AlternateContent>
+</p:sld>
+</file>
+
+<file path=ppt/slides/slide14.xml><?xml version="1.0" encoding="utf-8"?>
+<p:sld xmlns:a="http://schemas.openxmlformats.org/drawingml/2006/main" xmlns:p="http://schemas.openxmlformats.org/presentationml/2006/main" xmlns:r="http://schemas.openxmlformats.org/officeDocument/2006/relationships" xmlns:p14="http://schemas.microsoft.com/office/powerpoint/2010/main" xmlns:p15="http://schemas.microsoft.com/office/powerpoint/2012/main" xmlns:mc="http://schemas.openxmlformats.org/markup-compatibility/2006">
+  <p:cSld>
+    <p:spTree>
+      <p:nvGrpSpPr>
+        <p:cNvPr id="1" name=""/>
+        <p:cNvGrpSpPr/>
+        <p:nvPr/>
+      </p:nvGrpSpPr>
+      <p:grpSpPr>
+        <a:xfrm>
+          <a:off x="0" y="0"/>
+          <a:ext cx="0" cy="0"/>
+          <a:chOff x="0" y="0"/>
+          <a:chExt cx="0" cy="0"/>
+        </a:xfrm>
+      </p:grpSpPr>
+      <p:sp>
+        <p:nvSpPr>
+          <p:cNvPr id="139" name="PlaceHolder 1"/>
+          <p:cNvSpPr>
+            <a:spLocks noGrp="1"/>
+          </p:cNvSpPr>
+          <p:nvPr>
+            <p:ph type="title"/>
+          </p:nvPr>
+        </p:nvSpPr>
+        <p:spPr>
+          <a:xfrm>
+            <a:off x="360000" y="225720"/>
+            <a:ext cx="9358920" cy="717840"/>
+          </a:xfrm>
+          <a:prstGeom prst="rect">
+            <a:avLst/>
+          </a:prstGeom>
+          <a:noFill/>
+          <a:ln w="0">
+            <a:noFill/>
+          </a:ln>
+        </p:spPr>
+        <p:txBody>
+          <a:bodyPr lIns="0" rIns="0" tIns="0" bIns="0" anchor="ctr">
+            <a:noAutofit/>
+          </a:bodyPr>
+          <a:p>
+            <a:pPr indent="0">
+              <a:lnSpc>
+                <a:spcPct val="100000"/>
+              </a:lnSpc>
+              <a:buNone/>
+              <a:tabLst>
+                <a:tab algn="l" pos="0"/>
+              </a:tabLst>
+            </a:pPr>
+            <a:r>
+              <a:rPr b="1" lang="en-GB" sz="2700" spc="-1" strike="noStrike">
+                <a:solidFill>
+                  <a:srgbClr val="ffffff"/>
+                </a:solidFill>
+                <a:latin typeface="Source Sans Pro Black"/>
+              </a:rPr>
+              <a:t>MongoDB NoSQL Database </a:t>
+            </a:r>
+            <a:endParaRPr b="0" lang="en-GB" sz="2700" spc="-1" strike="noStrike">
+              <a:solidFill>
+                <a:srgbClr val="000000"/>
+              </a:solidFill>
+              <a:latin typeface="Arial"/>
+            </a:endParaRPr>
+          </a:p>
+        </p:txBody>
+      </p:sp>
+      <p:sp>
+        <p:nvSpPr>
+          <p:cNvPr id="140" name="PlaceHolder 2"/>
+          <p:cNvSpPr>
+            <a:spLocks noGrp="1"/>
+          </p:cNvSpPr>
+          <p:nvPr>
+            <p:ph/>
+          </p:nvPr>
+        </p:nvSpPr>
+        <p:spPr>
+          <a:xfrm>
+            <a:off x="360000" y="1485000"/>
+            <a:ext cx="4860000" cy="3735000"/>
+          </a:xfrm>
+          <a:prstGeom prst="rect">
+            <a:avLst/>
+          </a:prstGeom>
+          <a:noFill/>
+          <a:ln w="0">
+            <a:noFill/>
+          </a:ln>
+        </p:spPr>
+        <p:txBody>
+          <a:bodyPr lIns="0" rIns="0" tIns="0" bIns="0" anchor="t">
+            <a:normAutofit/>
+          </a:bodyPr>
+          <a:p>
+            <a:pPr marL="432000" indent="-324000">
+              <a:lnSpc>
+                <a:spcPct val="100000"/>
+              </a:lnSpc>
+              <a:spcAft>
+                <a:spcPts val="1057"/>
+              </a:spcAft>
+              <a:buClr>
+                <a:srgbClr val="2c3e50"/>
+              </a:buClr>
+              <a:buSzPct val="45000"/>
+              <a:buFont typeface="Wingdings" charset="2"/>
+              <a:buChar char=""/>
+            </a:pPr>
+            <a:r>
+              <a:rPr b="1" lang="en-GB" sz="1600" spc="-1" strike="noStrike">
+                <a:solidFill>
+                  <a:srgbClr val="2c3e50"/>
+                </a:solidFill>
+                <a:latin typeface="Source Sans Pro Semibold"/>
+              </a:rPr>
+              <a:t>No explicit database schema is required as </a:t>
+            </a:r>
+            <a:r>
+              <a:rPr b="1" lang="en-GB" sz="1600" spc="-1" strike="noStrike">
+                <a:solidFill>
+                  <a:srgbClr val="2c3e50"/>
+                </a:solidFill>
+                <a:latin typeface="Source Sans Pro Semibold"/>
+              </a:rPr>
+              <a:t>MongoDB is a NoSQL database</a:t>
+            </a:r>
+            <a:endParaRPr b="0" lang="en-GB" sz="1600" spc="-1" strike="noStrike">
+              <a:solidFill>
+                <a:srgbClr val="000000"/>
+              </a:solidFill>
+              <a:latin typeface="Arial"/>
+            </a:endParaRPr>
+          </a:p>
+          <a:p>
+            <a:pPr marL="432000" indent="-324000">
+              <a:lnSpc>
+                <a:spcPct val="100000"/>
+              </a:lnSpc>
+              <a:spcAft>
+                <a:spcPts val="1057"/>
+              </a:spcAft>
+              <a:buClr>
+                <a:srgbClr val="2c3e50"/>
+              </a:buClr>
+              <a:buSzPct val="45000"/>
+              <a:buFont typeface="Wingdings" charset="2"/>
+              <a:buChar char=""/>
+            </a:pPr>
+            <a:r>
+              <a:rPr b="1" lang="en-GB" sz="1600" spc="-1" strike="noStrike">
+                <a:solidFill>
+                  <a:srgbClr val="2c3e50"/>
+                </a:solidFill>
+                <a:latin typeface="Source Sans Pro Semibold"/>
+              </a:rPr>
+              <a:t>Rust structs define the data structures that </a:t>
+            </a:r>
+            <a:r>
+              <a:rPr b="1" lang="en-GB" sz="1600" spc="-1" strike="noStrike">
+                <a:solidFill>
+                  <a:srgbClr val="2c3e50"/>
+                </a:solidFill>
+                <a:latin typeface="Source Sans Pro Semibold"/>
+              </a:rPr>
+              <a:t>are stored in the database</a:t>
+            </a:r>
+            <a:endParaRPr b="0" lang="en-GB" sz="1600" spc="-1" strike="noStrike">
+              <a:solidFill>
+                <a:srgbClr val="000000"/>
+              </a:solidFill>
+              <a:latin typeface="Arial"/>
+            </a:endParaRPr>
+          </a:p>
+          <a:p>
+            <a:pPr marL="432000" indent="-324000">
+              <a:lnSpc>
+                <a:spcPct val="100000"/>
+              </a:lnSpc>
+              <a:spcAft>
+                <a:spcPts val="1057"/>
+              </a:spcAft>
+              <a:buClr>
+                <a:srgbClr val="2c3e50"/>
+              </a:buClr>
+              <a:buSzPct val="45000"/>
+              <a:buFont typeface="Wingdings" charset="2"/>
+              <a:buChar char=""/>
+            </a:pPr>
+            <a:r>
+              <a:rPr b="1" lang="en-GB" sz="1600" spc="-1" strike="noStrike">
+                <a:solidFill>
+                  <a:srgbClr val="2c3e50"/>
+                </a:solidFill>
+                <a:latin typeface="Source Sans Pro Semibold"/>
+              </a:rPr>
+              <a:t>Only the backend server interacts with the </a:t>
+            </a:r>
+            <a:r>
+              <a:rPr b="1" lang="en-GB" sz="1600" spc="-1" strike="noStrike">
+                <a:solidFill>
+                  <a:srgbClr val="2c3e50"/>
+                </a:solidFill>
+                <a:latin typeface="Source Sans Pro Semibold"/>
+              </a:rPr>
+              <a:t>MongoDB database. It is not exposed to the </a:t>
+            </a:r>
+            <a:r>
+              <a:rPr b="1" lang="en-GB" sz="1600" spc="-1" strike="noStrike">
+                <a:solidFill>
+                  <a:srgbClr val="2c3e50"/>
+                </a:solidFill>
+                <a:latin typeface="Source Sans Pro Semibold"/>
+              </a:rPr>
+              <a:t>internet and is only accessible from within the </a:t>
+            </a:r>
+            <a:r>
+              <a:rPr b="1" lang="en-GB" sz="1600" spc="-1" strike="noStrike">
+                <a:solidFill>
+                  <a:srgbClr val="2c3e50"/>
+                </a:solidFill>
+                <a:latin typeface="Source Sans Pro Semibold"/>
+              </a:rPr>
+              <a:t>Kubernetes cluster</a:t>
+            </a:r>
+            <a:endParaRPr b="0" lang="en-GB" sz="1600" spc="-1" strike="noStrike">
+              <a:solidFill>
+                <a:srgbClr val="000000"/>
+              </a:solidFill>
+              <a:latin typeface="Arial"/>
+            </a:endParaRPr>
+          </a:p>
+        </p:txBody>
+      </p:sp>
+      <p:pic>
+        <p:nvPicPr>
+          <p:cNvPr id="141" name="" descr=""/>
+          <p:cNvPicPr/>
+          <p:nvPr/>
+        </p:nvPicPr>
+        <p:blipFill>
+          <a:blip r:embed="rId1"/>
+          <a:stretch/>
+        </p:blipFill>
+        <p:spPr>
+          <a:xfrm>
+            <a:off x="5400000" y="360000"/>
+            <a:ext cx="4495680" cy="3171960"/>
+          </a:xfrm>
+          <a:prstGeom prst="rect">
+            <a:avLst/>
+          </a:prstGeom>
+          <a:ln w="0">
+            <a:noFill/>
+          </a:ln>
+        </p:spPr>
+      </p:pic>
+      <p:pic>
+        <p:nvPicPr>
+          <p:cNvPr id="142" name="" descr=""/>
+          <p:cNvPicPr/>
+          <p:nvPr/>
+        </p:nvPicPr>
+        <p:blipFill>
+          <a:blip r:embed="rId2"/>
+          <a:stretch/>
+        </p:blipFill>
+        <p:spPr>
+          <a:xfrm>
+            <a:off x="5445360" y="3600000"/>
+            <a:ext cx="2294640" cy="1925640"/>
+          </a:xfrm>
+          <a:prstGeom prst="rect">
+            <a:avLst/>
+          </a:prstGeom>
+          <a:ln w="0">
+            <a:noFill/>
+          </a:ln>
+        </p:spPr>
+      </p:pic>
+    </p:spTree>
+  </p:cSld>
+  <mc:AlternateContent>
+    <mc:Choice Requires="p14">
+      <p:transition spd="slow" p14:dur="2000"/>
+    </mc:Choice>
+    <mc:Fallback>
+      <p:transition spd="slow"/>
+    </mc:Fallback>
+  </mc:AlternateContent>
+</p:sld>
+</file>
+
+<file path=ppt/slides/slide15.xml><?xml version="1.0" encoding="utf-8"?>
+<p:sld xmlns:a="http://schemas.openxmlformats.org/drawingml/2006/main" xmlns:p="http://schemas.openxmlformats.org/presentationml/2006/main" xmlns:r="http://schemas.openxmlformats.org/officeDocument/2006/relationships" xmlns:p14="http://schemas.microsoft.com/office/powerpoint/2010/main" xmlns:p15="http://schemas.microsoft.com/office/powerpoint/2012/main" xmlns:mc="http://schemas.openxmlformats.org/markup-compatibility/2006">
+  <p:cSld>
+    <p:spTree>
+      <p:nvGrpSpPr>
+        <p:cNvPr id="1" name=""/>
+        <p:cNvGrpSpPr/>
+        <p:nvPr/>
+      </p:nvGrpSpPr>
+      <p:grpSpPr>
+        <a:xfrm>
+          <a:off x="0" y="0"/>
+          <a:ext cx="0" cy="0"/>
+          <a:chOff x="0" y="0"/>
+          <a:chExt cx="0" cy="0"/>
+        </a:xfrm>
+      </p:grpSpPr>
+      <p:sp>
+        <p:nvSpPr>
+          <p:cNvPr id="143" name="PlaceHolder 1"/>
+          <p:cNvSpPr>
+            <a:spLocks noGrp="1"/>
+          </p:cNvSpPr>
+          <p:nvPr>
+            <p:ph type="title"/>
+          </p:nvPr>
+        </p:nvSpPr>
+        <p:spPr>
+          <a:xfrm>
+            <a:off x="360000" y="225720"/>
+            <a:ext cx="9358920" cy="717840"/>
+          </a:xfrm>
+          <a:prstGeom prst="rect">
+            <a:avLst/>
+          </a:prstGeom>
+          <a:noFill/>
+          <a:ln w="0">
+            <a:noFill/>
+          </a:ln>
+        </p:spPr>
+        <p:txBody>
+          <a:bodyPr lIns="0" rIns="0" tIns="0" bIns="0" anchor="ctr">
+            <a:noAutofit/>
+          </a:bodyPr>
+          <a:p>
+            <a:pPr indent="0">
+              <a:lnSpc>
+                <a:spcPct val="100000"/>
+              </a:lnSpc>
+              <a:buNone/>
+              <a:tabLst>
+                <a:tab algn="l" pos="0"/>
+              </a:tabLst>
+            </a:pPr>
+            <a:r>
+              <a:rPr b="1" lang="en-GB" sz="2700" spc="-1" strike="noStrike">
+                <a:solidFill>
+                  <a:srgbClr val="ffffff"/>
+                </a:solidFill>
+                <a:latin typeface="Source Sans Pro Black"/>
+              </a:rPr>
+              <a:t>Kubernetes Cluster in Azure VM </a:t>
+            </a:r>
+            <a:endParaRPr b="0" lang="en-GB" sz="2700" spc="-1" strike="noStrike">
+              <a:solidFill>
+                <a:srgbClr val="000000"/>
+              </a:solidFill>
+              <a:latin typeface="Arial"/>
+            </a:endParaRPr>
+          </a:p>
+        </p:txBody>
+      </p:sp>
+      <p:sp>
+        <p:nvSpPr>
+          <p:cNvPr id="144" name="PlaceHolder 2"/>
+          <p:cNvSpPr>
+            <a:spLocks noGrp="1"/>
+          </p:cNvSpPr>
+          <p:nvPr>
+            <p:ph/>
+          </p:nvPr>
+        </p:nvSpPr>
+        <p:spPr>
+          <a:xfrm>
+            <a:off x="360000" y="1485000"/>
+            <a:ext cx="4860000" cy="3735000"/>
+          </a:xfrm>
+          <a:prstGeom prst="rect">
+            <a:avLst/>
+          </a:prstGeom>
+          <a:noFill/>
+          <a:ln w="0">
+            <a:noFill/>
+          </a:ln>
+        </p:spPr>
+        <p:txBody>
+          <a:bodyPr lIns="0" rIns="0" tIns="0" bIns="0" anchor="t">
+            <a:normAutofit/>
+          </a:bodyPr>
+          <a:p>
+            <a:pPr marL="432000" indent="-324000">
+              <a:lnSpc>
+                <a:spcPct val="100000"/>
+              </a:lnSpc>
+              <a:spcAft>
+                <a:spcPts val="1057"/>
+              </a:spcAft>
+              <a:buClr>
+                <a:srgbClr val="2c3e50"/>
+              </a:buClr>
+              <a:buSzPct val="45000"/>
+              <a:buFont typeface="Wingdings" charset="2"/>
+              <a:buChar char=""/>
+            </a:pPr>
+            <a:r>
+              <a:rPr b="1" lang="en-GB" sz="1600" spc="-1" strike="noStrike">
+                <a:solidFill>
+                  <a:srgbClr val="2c3e50"/>
+                </a:solidFill>
+                <a:latin typeface="Source Sans Pro Semibold"/>
+              </a:rPr>
+              <a:t>Runs in K3s, a lightweight Kubernetes cluster distribution. Hosted in an Azure RHEL VM.</a:t>
+            </a:r>
+            <a:endParaRPr b="0" lang="en-GB" sz="1600" spc="-1" strike="noStrike">
+              <a:solidFill>
+                <a:srgbClr val="000000"/>
+              </a:solidFill>
+              <a:latin typeface="Arial"/>
+            </a:endParaRPr>
+          </a:p>
+          <a:p>
+            <a:pPr marL="432000" indent="-324000">
+              <a:lnSpc>
+                <a:spcPct val="100000"/>
+              </a:lnSpc>
+              <a:spcAft>
+                <a:spcPts val="1057"/>
+              </a:spcAft>
+              <a:buClr>
+                <a:srgbClr val="2c3e50"/>
+              </a:buClr>
+              <a:buSzPct val="45000"/>
+              <a:buFont typeface="Wingdings" charset="2"/>
+              <a:buChar char=""/>
+            </a:pPr>
+            <a:r>
+              <a:rPr b="1" lang="en-GB" sz="1600" spc="-1" strike="noStrike">
+                <a:solidFill>
+                  <a:srgbClr val="2c3e50"/>
+                </a:solidFill>
+                <a:latin typeface="Source Sans Pro Semibold"/>
+              </a:rPr>
+              <a:t>Angular Frontend, Axum Backend, MongoDB all run in separate Docker containers</a:t>
+            </a:r>
+            <a:endParaRPr b="0" lang="en-GB" sz="1600" spc="-1" strike="noStrike">
+              <a:solidFill>
+                <a:srgbClr val="000000"/>
+              </a:solidFill>
+              <a:latin typeface="Arial"/>
+            </a:endParaRPr>
+          </a:p>
+          <a:p>
+            <a:pPr marL="432000" indent="-324000">
+              <a:lnSpc>
+                <a:spcPct val="100000"/>
+              </a:lnSpc>
+              <a:spcAft>
+                <a:spcPts val="1057"/>
+              </a:spcAft>
+              <a:buClr>
+                <a:srgbClr val="2c3e50"/>
+              </a:buClr>
+              <a:buSzPct val="45000"/>
+              <a:buFont typeface="Wingdings" charset="2"/>
+              <a:buChar char=""/>
+            </a:pPr>
+            <a:r>
+              <a:rPr b="1" lang="en-GB" sz="1600" spc="-1" strike="noStrike">
+                <a:solidFill>
+                  <a:srgbClr val="2c3e50"/>
+                </a:solidFill>
+                <a:latin typeface="Source Sans Pro Semibold"/>
+              </a:rPr>
+              <a:t>Docker containers allow for consistent and reproducible deployments of software that won’t be affected by changes on the host machine</a:t>
+            </a:r>
+            <a:endParaRPr b="0" lang="en-GB" sz="1600" spc="-1" strike="noStrike">
+              <a:solidFill>
+                <a:srgbClr val="000000"/>
+              </a:solidFill>
+              <a:latin typeface="Arial"/>
+            </a:endParaRPr>
+          </a:p>
+          <a:p>
+            <a:pPr marL="432000" indent="-324000">
+              <a:lnSpc>
+                <a:spcPct val="100000"/>
+              </a:lnSpc>
+              <a:spcAft>
+                <a:spcPts val="1057"/>
+              </a:spcAft>
+              <a:buClr>
+                <a:srgbClr val="2c3e50"/>
+              </a:buClr>
+              <a:buSzPct val="45000"/>
+              <a:buFont typeface="Wingdings" charset="2"/>
+              <a:buChar char=""/>
+            </a:pPr>
+            <a:r>
+              <a:rPr b="1" lang="en-GB" sz="1600" spc="-1" strike="noStrike">
+                <a:solidFill>
+                  <a:srgbClr val="2c3e50"/>
+                </a:solidFill>
+                <a:latin typeface="Source Sans Pro Semibold"/>
+              </a:rPr>
+              <a:t>Kubernetes is a Container Orchestrator, which provides solutions such as automatic container restarts on failure to create resilient deployments </a:t>
+            </a:r>
+            <a:endParaRPr b="0" lang="en-GB" sz="1600" spc="-1" strike="noStrike">
+              <a:solidFill>
+                <a:srgbClr val="000000"/>
+              </a:solidFill>
+              <a:latin typeface="Arial"/>
+            </a:endParaRPr>
+          </a:p>
+        </p:txBody>
+      </p:sp>
+      <p:pic>
+        <p:nvPicPr>
+          <p:cNvPr id="145" name="" descr=""/>
+          <p:cNvPicPr/>
+          <p:nvPr/>
+        </p:nvPicPr>
+        <p:blipFill>
+          <a:blip r:embed="rId1"/>
+          <a:stretch/>
+        </p:blipFill>
+        <p:spPr>
+          <a:xfrm>
+            <a:off x="5580000" y="943560"/>
+            <a:ext cx="4319280" cy="1454040"/>
+          </a:xfrm>
+          <a:prstGeom prst="rect">
+            <a:avLst/>
+          </a:prstGeom>
+          <a:ln w="0">
+            <a:noFill/>
+          </a:ln>
+        </p:spPr>
+      </p:pic>
+      <p:pic>
+        <p:nvPicPr>
+          <p:cNvPr id="146" name="" descr=""/>
+          <p:cNvPicPr/>
+          <p:nvPr/>
+        </p:nvPicPr>
+        <p:blipFill>
+          <a:blip r:embed="rId2"/>
+          <a:stretch/>
+        </p:blipFill>
+        <p:spPr>
+          <a:xfrm>
+            <a:off x="5220000" y="2700000"/>
+            <a:ext cx="4811040" cy="2340000"/>
+          </a:xfrm>
+          <a:prstGeom prst="rect">
+            <a:avLst/>
+          </a:prstGeom>
+          <a:ln w="0">
+            <a:noFill/>
+          </a:ln>
+        </p:spPr>
+      </p:pic>
+    </p:spTree>
+  </p:cSld>
+  <mc:AlternateContent>
+    <mc:Choice Requires="p14">
+      <p:transition spd="slow" p14:dur="2000"/>
+    </mc:Choice>
+    <mc:Fallback>
+      <p:transition spd="slow"/>
+    </mc:Fallback>
+  </mc:AlternateContent>
+</p:sld>
+</file>
+
+<file path=ppt/slides/slide16.xml><?xml version="1.0" encoding="utf-8"?>
+<p:sld xmlns:a="http://schemas.openxmlformats.org/drawingml/2006/main" xmlns:p="http://schemas.openxmlformats.org/presentationml/2006/main" xmlns:r="http://schemas.openxmlformats.org/officeDocument/2006/relationships" xmlns:p14="http://schemas.microsoft.com/office/powerpoint/2010/main" xmlns:p15="http://schemas.microsoft.com/office/powerpoint/2012/main" xmlns:mc="http://schemas.openxmlformats.org/markup-compatibility/2006">
+  <p:cSld>
+    <p:spTree>
+      <p:nvGrpSpPr>
+        <p:cNvPr id="1" name=""/>
+        <p:cNvGrpSpPr/>
+        <p:nvPr/>
+      </p:nvGrpSpPr>
+      <p:grpSpPr>
+        <a:xfrm>
+          <a:off x="0" y="0"/>
+          <a:ext cx="0" cy="0"/>
+          <a:chOff x="0" y="0"/>
+          <a:chExt cx="0" cy="0"/>
+        </a:xfrm>
+      </p:grpSpPr>
+      <p:sp>
+        <p:nvSpPr>
+          <p:cNvPr id="147" name="PlaceHolder 1"/>
+          <p:cNvSpPr>
+            <a:spLocks noGrp="1"/>
+          </p:cNvSpPr>
+          <p:nvPr>
+            <p:ph type="title"/>
+          </p:nvPr>
+        </p:nvSpPr>
+        <p:spPr>
+          <a:xfrm>
+            <a:off x="360000" y="225720"/>
+            <a:ext cx="9358920" cy="717840"/>
+          </a:xfrm>
+          <a:prstGeom prst="rect">
+            <a:avLst/>
+          </a:prstGeom>
+          <a:noFill/>
+          <a:ln w="0">
+            <a:noFill/>
+          </a:ln>
+        </p:spPr>
+        <p:txBody>
+          <a:bodyPr lIns="0" rIns="0" tIns="0" bIns="0" anchor="ctr">
+            <a:noAutofit/>
+          </a:bodyPr>
+          <a:p>
+            <a:pPr indent="0">
+              <a:lnSpc>
+                <a:spcPct val="100000"/>
+              </a:lnSpc>
+              <a:buNone/>
+              <a:tabLst>
+                <a:tab algn="l" pos="0"/>
+              </a:tabLst>
+            </a:pPr>
+            <a:r>
+              <a:rPr b="1" lang="en-GB" sz="2700" spc="-1" strike="noStrike">
+                <a:solidFill>
+                  <a:srgbClr val="ffffff"/>
+                </a:solidFill>
+                <a:latin typeface="Source Sans Pro Black"/>
+              </a:rPr>
+              <a:t>Tilt CI/CD</a:t>
+            </a:r>
+            <a:endParaRPr b="0" lang="en-GB" sz="2700" spc="-1" strike="noStrike">
+              <a:solidFill>
+                <a:srgbClr val="000000"/>
+              </a:solidFill>
+              <a:latin typeface="Arial"/>
+            </a:endParaRPr>
+          </a:p>
+        </p:txBody>
+      </p:sp>
+      <p:sp>
+        <p:nvSpPr>
+          <p:cNvPr id="148" name="PlaceHolder 2"/>
+          <p:cNvSpPr>
+            <a:spLocks noGrp="1"/>
+          </p:cNvSpPr>
+          <p:nvPr>
+            <p:ph/>
+          </p:nvPr>
+        </p:nvSpPr>
+        <p:spPr>
+          <a:xfrm>
+            <a:off x="360000" y="1485000"/>
+            <a:ext cx="4860000" cy="3735000"/>
+          </a:xfrm>
+          <a:prstGeom prst="rect">
+            <a:avLst/>
+          </a:prstGeom>
+          <a:noFill/>
+          <a:ln w="0">
+            <a:noFill/>
+          </a:ln>
+        </p:spPr>
+        <p:txBody>
+          <a:bodyPr lIns="0" rIns="0" tIns="0" bIns="0" anchor="t">
+            <a:normAutofit fontScale="96000"/>
+          </a:bodyPr>
+          <a:p>
+            <a:pPr marL="414720" indent="-311040">
+              <a:lnSpc>
+                <a:spcPct val="100000"/>
+              </a:lnSpc>
+              <a:spcAft>
+                <a:spcPts val="1057"/>
+              </a:spcAft>
+              <a:buClr>
+                <a:srgbClr val="2c3e50"/>
+              </a:buClr>
+              <a:buSzPct val="45000"/>
+              <a:buFont typeface="Wingdings" charset="2"/>
+              <a:buChar char=""/>
+            </a:pPr>
+            <a:r>
+              <a:rPr b="1" lang="en-GB" sz="1600" spc="-1" strike="noStrike">
+                <a:solidFill>
+                  <a:srgbClr val="2c3e50"/>
+                </a:solidFill>
+                <a:latin typeface="Source Sans Pro Semibold"/>
+              </a:rPr>
+              <a:t>While Kubernetes and containers provide a solution for running a resilient app deployment, </a:t>
+            </a:r>
+            <a:r>
+              <a:rPr b="1" lang="en-GB" sz="1600" spc="-1" strike="noStrike">
+                <a:solidFill>
+                  <a:srgbClr val="2c3e50"/>
+                </a:solidFill>
+                <a:latin typeface="Source Sans Pro Semibold"/>
+              </a:rPr>
+              <a:t>they do not provide a way to boot all of it up automatically</a:t>
+            </a:r>
+            <a:endParaRPr b="0" lang="en-GB" sz="1600" spc="-1" strike="noStrike">
+              <a:solidFill>
+                <a:srgbClr val="000000"/>
+              </a:solidFill>
+              <a:latin typeface="Arial"/>
+            </a:endParaRPr>
+          </a:p>
+          <a:p>
+            <a:pPr marL="414720" indent="-311040">
+              <a:lnSpc>
+                <a:spcPct val="100000"/>
+              </a:lnSpc>
+              <a:spcAft>
+                <a:spcPts val="1057"/>
+              </a:spcAft>
+              <a:buClr>
+                <a:srgbClr val="2c3e50"/>
+              </a:buClr>
+              <a:buSzPct val="45000"/>
+              <a:buFont typeface="Wingdings" charset="2"/>
+              <a:buChar char=""/>
+            </a:pPr>
+            <a:r>
+              <a:rPr b="1" lang="en-GB" sz="1600" spc="-1" strike="noStrike">
+                <a:solidFill>
+                  <a:srgbClr val="2c3e50"/>
+                </a:solidFill>
+                <a:latin typeface="Source Sans Pro Semibold"/>
+              </a:rPr>
+              <a:t>Tilt CI/CD can deploy the entire NeuroRecovery webapp with a single command: “tilt up”</a:t>
+            </a:r>
+            <a:endParaRPr b="0" lang="en-GB" sz="1600" spc="-1" strike="noStrike">
+              <a:solidFill>
+                <a:srgbClr val="000000"/>
+              </a:solidFill>
+              <a:latin typeface="Arial"/>
+            </a:endParaRPr>
+          </a:p>
+          <a:p>
+            <a:pPr marL="414720" indent="-311040">
+              <a:lnSpc>
+                <a:spcPct val="100000"/>
+              </a:lnSpc>
+              <a:spcAft>
+                <a:spcPts val="1057"/>
+              </a:spcAft>
+              <a:buClr>
+                <a:srgbClr val="2c3e50"/>
+              </a:buClr>
+              <a:buSzPct val="45000"/>
+              <a:buFont typeface="Wingdings" charset="2"/>
+              <a:buChar char=""/>
+            </a:pPr>
+            <a:r>
+              <a:rPr b="1" lang="en-GB" sz="1600" spc="-1" strike="noStrike">
+                <a:solidFill>
+                  <a:srgbClr val="2c3e50"/>
+                </a:solidFill>
+                <a:latin typeface="Source Sans Pro Semibold"/>
+              </a:rPr>
+              <a:t>Once running, an admin accessing the Tilt CI/CD dashboard can rebuild each microservice </a:t>
+            </a:r>
+            <a:r>
+              <a:rPr b="1" lang="en-GB" sz="1600" spc="-1" strike="noStrike">
+                <a:solidFill>
+                  <a:srgbClr val="2c3e50"/>
+                </a:solidFill>
+                <a:latin typeface="Source Sans Pro Semibold"/>
+              </a:rPr>
+              <a:t>with a click. This allows for fast developer feedback after making code changes.</a:t>
+            </a:r>
+            <a:endParaRPr b="0" lang="en-GB" sz="1600" spc="-1" strike="noStrike">
+              <a:solidFill>
+                <a:srgbClr val="000000"/>
+              </a:solidFill>
+              <a:latin typeface="Arial"/>
+            </a:endParaRPr>
+          </a:p>
+          <a:p>
+            <a:pPr marL="414720" indent="-311040">
+              <a:lnSpc>
+                <a:spcPct val="100000"/>
+              </a:lnSpc>
+              <a:spcAft>
+                <a:spcPts val="1057"/>
+              </a:spcAft>
+              <a:buClr>
+                <a:srgbClr val="2c3e50"/>
+              </a:buClr>
+              <a:buSzPct val="45000"/>
+              <a:buFont typeface="Wingdings" charset="2"/>
+              <a:buChar char=""/>
+            </a:pPr>
+            <a:r>
+              <a:rPr b="1" lang="en-GB" sz="1600" spc="-1" strike="noStrike">
+                <a:solidFill>
+                  <a:srgbClr val="2c3e50"/>
+                </a:solidFill>
+                <a:latin typeface="Source Sans Pro Semibold"/>
+              </a:rPr>
+              <a:t>Automatically runs the Rust Axum backend tests, providing confidence that the code works </a:t>
+            </a:r>
+            <a:endParaRPr b="0" lang="en-GB" sz="1600" spc="-1" strike="noStrike">
+              <a:solidFill>
+                <a:srgbClr val="000000"/>
+              </a:solidFill>
+              <a:latin typeface="Arial"/>
+            </a:endParaRPr>
+          </a:p>
+        </p:txBody>
+      </p:sp>
+      <p:pic>
+        <p:nvPicPr>
+          <p:cNvPr id="149" name="" descr=""/>
+          <p:cNvPicPr/>
+          <p:nvPr/>
+        </p:nvPicPr>
+        <p:blipFill>
+          <a:blip r:embed="rId1"/>
+          <a:stretch/>
+        </p:blipFill>
+        <p:spPr>
+          <a:xfrm>
+            <a:off x="5760000" y="704880"/>
+            <a:ext cx="3939480" cy="4335120"/>
+          </a:xfrm>
+          <a:prstGeom prst="rect">
+            <a:avLst/>
+          </a:prstGeom>
+          <a:ln w="0">
+            <a:noFill/>
+          </a:ln>
+        </p:spPr>
+      </p:pic>
     </p:spTree>
   </p:cSld>
   <mc:AlternateContent>
@@ -6702,7 +8220,7 @@
         <p:spPr>
           <a:xfrm>
             <a:off x="360000" y="225720"/>
-            <a:ext cx="9358920" cy="718920"/>
+            <a:ext cx="9358920" cy="717840"/>
           </a:xfrm>
           <a:prstGeom prst="rect">
             <a:avLst/>
@@ -6733,7 +8251,7 @@
                 </a:solidFill>
                 <a:latin typeface="Source Sans Pro Black"/>
               </a:rPr>
-              <a:t>Login/Register System</a:t>
+              <a:t>Core Features</a:t>
             </a:r>
             <a:endParaRPr b="0" lang="en-GB" sz="2700" spc="-1" strike="noStrike">
               <a:solidFill>
@@ -6756,8 +8274,8 @@
         </p:nvSpPr>
         <p:spPr>
           <a:xfrm>
-            <a:off x="180000" y="1485000"/>
-            <a:ext cx="6479280" cy="1394280"/>
+            <a:off x="360000" y="1485000"/>
+            <a:ext cx="9358920" cy="3778920"/>
           </a:xfrm>
           <a:prstGeom prst="rect">
             <a:avLst/>
@@ -6769,10 +8287,10 @@
         </p:spPr>
         <p:txBody>
           <a:bodyPr lIns="0" rIns="0" tIns="0" bIns="0" anchor="t">
-            <a:normAutofit fontScale="88000"/>
-          </a:bodyPr>
-          <a:p>
-            <a:pPr marL="380160" indent="-285120">
+            <a:normAutofit fontScale="97000"/>
+          </a:bodyPr>
+          <a:p>
+            <a:pPr marL="419040" indent="-314280">
               <a:lnSpc>
                 <a:spcPct val="100000"/>
               </a:lnSpc>
@@ -6787,23 +8305,32 @@
               <a:buChar char=""/>
             </a:pPr>
             <a:r>
-              <a:rPr b="1" lang="en-GB" sz="2000" spc="-1" strike="noStrike">
+              <a:rPr b="1" lang="en-GB" sz="2400" spc="-1" strike="noStrike">
                 <a:solidFill>
                   <a:srgbClr val="2c3e50"/>
                 </a:solidFill>
                 <a:latin typeface="Source Sans Pro Semibold"/>
               </a:rPr>
-              <a:t>Email/Password based authentication</a:t>
-            </a:r>
-            <a:endParaRPr b="0" lang="en-GB" sz="2000" spc="-1" strike="noStrike">
-              <a:solidFill>
-                <a:srgbClr val="000000"/>
-              </a:solidFill>
-              <a:latin typeface="Arial"/>
-            </a:endParaRPr>
-          </a:p>
-          <a:p>
-            <a:pPr marL="380160" indent="-285120">
+              <a:t>Login/Register system with </a:t>
+            </a:r>
+            <a:r>
+              <a:rPr b="1" lang="en-GB" sz="2400" spc="-1" strike="noStrike">
+                <a:solidFill>
+                  <a:srgbClr val="2c3e50"/>
+                </a:solidFill>
+                <a:latin typeface="Source Sans Pro Semibold"/>
+              </a:rPr>
+              <a:t>password hashing</a:t>
+            </a:r>
+            <a:endParaRPr b="0" lang="en-GB" sz="2400" spc="-1" strike="noStrike">
+              <a:solidFill>
+                <a:srgbClr val="000000"/>
+              </a:solidFill>
+              <a:latin typeface="Arial"/>
+            </a:endParaRPr>
+          </a:p>
+          <a:p>
+            <a:pPr marL="419040" indent="-314280">
               <a:lnSpc>
                 <a:spcPct val="100000"/>
               </a:lnSpc>
@@ -6818,23 +8345,23 @@
               <a:buChar char=""/>
             </a:pPr>
             <a:r>
-              <a:rPr b="1" lang="en-GB" sz="2000" spc="-1" strike="noStrike">
+              <a:rPr b="1" lang="en-GB" sz="2400" spc="-1" strike="noStrike">
                 <a:solidFill>
                   <a:srgbClr val="2c3e50"/>
                 </a:solidFill>
                 <a:latin typeface="Source Sans Pro Semibold"/>
               </a:rPr>
-              <a:t>Passwords are stored as Argon2id hashes for security</a:t>
-            </a:r>
-            <a:endParaRPr b="0" lang="en-GB" sz="2000" spc="-1" strike="noStrike">
-              <a:solidFill>
-                <a:srgbClr val="000000"/>
-              </a:solidFill>
-              <a:latin typeface="Arial"/>
-            </a:endParaRPr>
-          </a:p>
-          <a:p>
-            <a:pPr marL="380160" indent="-285120">
+              <a:t>Instant exercise sessions</a:t>
+            </a:r>
+            <a:endParaRPr b="0" lang="en-GB" sz="2400" spc="-1" strike="noStrike">
+              <a:solidFill>
+                <a:srgbClr val="000000"/>
+              </a:solidFill>
+              <a:latin typeface="Arial"/>
+            </a:endParaRPr>
+          </a:p>
+          <a:p>
+            <a:pPr marL="419040" indent="-314280">
               <a:lnSpc>
                 <a:spcPct val="100000"/>
               </a:lnSpc>
@@ -6849,69 +8376,205 @@
               <a:buChar char=""/>
             </a:pPr>
             <a:r>
-              <a:rPr b="1" lang="en-GB" sz="2000" spc="-1" strike="noStrike">
+              <a:rPr b="1" lang="en-GB" sz="2400" spc="-1" strike="noStrike">
                 <a:solidFill>
                   <a:srgbClr val="2c3e50"/>
                 </a:solidFill>
                 <a:latin typeface="Source Sans Pro Semibold"/>
               </a:rPr>
-              <a:t>Secure Session ID is stored in browsers localStorage</a:t>
-            </a:r>
-            <a:endParaRPr b="0" lang="en-GB" sz="2000" spc="-1" strike="noStrike">
-              <a:solidFill>
-                <a:srgbClr val="000000"/>
-              </a:solidFill>
-              <a:latin typeface="Arial"/>
-            </a:endParaRPr>
-          </a:p>
-        </p:txBody>
-      </p:sp>
-      <p:pic>
-        <p:nvPicPr>
-          <p:cNvPr id="92" name="" descr=""/>
-          <p:cNvPicPr/>
-          <p:nvPr/>
-        </p:nvPicPr>
-        <p:blipFill>
-          <a:blip r:embed="rId1"/>
-          <a:stretch/>
-        </p:blipFill>
-        <p:spPr>
-          <a:xfrm>
-            <a:off x="543600" y="2700000"/>
-            <a:ext cx="5395320" cy="2519280"/>
-          </a:xfrm>
-          <a:prstGeom prst="rect">
-            <a:avLst/>
-          </a:prstGeom>
-          <a:ln w="10800">
-            <a:noFill/>
-          </a:ln>
-        </p:spPr>
-      </p:pic>
-      <p:pic>
-        <p:nvPicPr>
-          <p:cNvPr id="93" name="" descr=""/>
-          <p:cNvPicPr/>
-          <p:nvPr/>
-        </p:nvPicPr>
-        <p:blipFill>
-          <a:blip r:embed="rId2"/>
-          <a:stretch/>
-        </p:blipFill>
-        <p:spPr>
-          <a:xfrm>
-            <a:off x="6480000" y="900000"/>
-            <a:ext cx="3419280" cy="4221000"/>
-          </a:xfrm>
-          <a:prstGeom prst="rect">
-            <a:avLst/>
-          </a:prstGeom>
-          <a:ln w="0">
-            <a:noFill/>
-          </a:ln>
-        </p:spPr>
-      </p:pic>
+              <a:t>Scheduled exercise sessions</a:t>
+            </a:r>
+            <a:endParaRPr b="0" lang="en-GB" sz="2400" spc="-1" strike="noStrike">
+              <a:solidFill>
+                <a:srgbClr val="000000"/>
+              </a:solidFill>
+              <a:latin typeface="Arial"/>
+            </a:endParaRPr>
+          </a:p>
+          <a:p>
+            <a:pPr marL="419040" indent="-314280">
+              <a:lnSpc>
+                <a:spcPct val="100000"/>
+              </a:lnSpc>
+              <a:spcAft>
+                <a:spcPts val="1057"/>
+              </a:spcAft>
+              <a:buClr>
+                <a:srgbClr val="2c3e50"/>
+              </a:buClr>
+              <a:buSzPct val="45000"/>
+              <a:buFont typeface="Wingdings" charset="2"/>
+              <a:buChar char=""/>
+            </a:pPr>
+            <a:r>
+              <a:rPr b="1" lang="en-GB" sz="2400" spc="-1" strike="noStrike">
+                <a:solidFill>
+                  <a:srgbClr val="2c3e50"/>
+                </a:solidFill>
+                <a:latin typeface="Source Sans Pro Semibold"/>
+              </a:rPr>
+              <a:t>Patient and therapist user </a:t>
+            </a:r>
+            <a:r>
+              <a:rPr b="1" lang="en-GB" sz="2400" spc="-1" strike="noStrike">
+                <a:solidFill>
+                  <a:srgbClr val="2c3e50"/>
+                </a:solidFill>
+                <a:latin typeface="Source Sans Pro Semibold"/>
+              </a:rPr>
+              <a:t>data forms</a:t>
+            </a:r>
+            <a:endParaRPr b="0" lang="en-GB" sz="2400" spc="-1" strike="noStrike">
+              <a:solidFill>
+                <a:srgbClr val="000000"/>
+              </a:solidFill>
+              <a:latin typeface="Arial"/>
+            </a:endParaRPr>
+          </a:p>
+          <a:p>
+            <a:pPr marL="419040" indent="-314280">
+              <a:lnSpc>
+                <a:spcPct val="100000"/>
+              </a:lnSpc>
+              <a:spcAft>
+                <a:spcPts val="1057"/>
+              </a:spcAft>
+              <a:buClr>
+                <a:srgbClr val="2c3e50"/>
+              </a:buClr>
+              <a:buSzPct val="45000"/>
+              <a:buFont typeface="Wingdings" charset="2"/>
+              <a:buChar char=""/>
+            </a:pPr>
+            <a:r>
+              <a:rPr b="1" lang="en-GB" sz="2400" spc="-1" strike="noStrike">
+                <a:solidFill>
+                  <a:srgbClr val="2c3e50"/>
+                </a:solidFill>
+                <a:latin typeface="Source Sans Pro Semibold"/>
+              </a:rPr>
+              <a:t>User exercise statistics</a:t>
+            </a:r>
+            <a:endParaRPr b="0" lang="en-GB" sz="2400" spc="-1" strike="noStrike">
+              <a:solidFill>
+                <a:srgbClr val="000000"/>
+              </a:solidFill>
+              <a:latin typeface="Arial"/>
+            </a:endParaRPr>
+          </a:p>
+          <a:p>
+            <a:pPr marL="419040" indent="-314280">
+              <a:lnSpc>
+                <a:spcPct val="100000"/>
+              </a:lnSpc>
+              <a:spcAft>
+                <a:spcPts val="1057"/>
+              </a:spcAft>
+              <a:buClr>
+                <a:srgbClr val="2c3e50"/>
+              </a:buClr>
+              <a:buSzPct val="45000"/>
+              <a:buFont typeface="Wingdings" charset="2"/>
+              <a:buChar char=""/>
+            </a:pPr>
+            <a:r>
+              <a:rPr b="1" lang="en-GB" sz="2400" spc="-1" strike="noStrike">
+                <a:solidFill>
+                  <a:srgbClr val="2c3e50"/>
+                </a:solidFill>
+                <a:latin typeface="Source Sans Pro Semibold"/>
+              </a:rPr>
+              <a:t>Exercise recommendations </a:t>
+            </a:r>
+            <a:r>
+              <a:rPr b="1" lang="en-GB" sz="2400" spc="-1" strike="noStrike">
+                <a:solidFill>
+                  <a:srgbClr val="2c3e50"/>
+                </a:solidFill>
+                <a:latin typeface="Source Sans Pro Semibold"/>
+              </a:rPr>
+              <a:t>based on user data</a:t>
+            </a:r>
+            <a:endParaRPr b="0" lang="en-GB" sz="2400" spc="-1" strike="noStrike">
+              <a:solidFill>
+                <a:srgbClr val="000000"/>
+              </a:solidFill>
+              <a:latin typeface="Arial"/>
+            </a:endParaRPr>
+          </a:p>
+          <a:p>
+            <a:pPr marL="419040" indent="-314280">
+              <a:lnSpc>
+                <a:spcPct val="100000"/>
+              </a:lnSpc>
+              <a:spcAft>
+                <a:spcPts val="1057"/>
+              </a:spcAft>
+              <a:buClr>
+                <a:srgbClr val="2c3e50"/>
+              </a:buClr>
+              <a:buSzPct val="45000"/>
+              <a:buFont typeface="Wingdings" charset="2"/>
+              <a:buChar char=""/>
+            </a:pPr>
+            <a:r>
+              <a:rPr b="1" lang="en-GB" sz="2400" spc="-1" strike="noStrike">
+                <a:solidFill>
+                  <a:srgbClr val="2c3e50"/>
+                </a:solidFill>
+                <a:latin typeface="Source Sans Pro Semibold"/>
+              </a:rPr>
+              <a:t>Therapist-Patient link</a:t>
+            </a:r>
+            <a:endParaRPr b="0" lang="en-GB" sz="2400" spc="-1" strike="noStrike">
+              <a:solidFill>
+                <a:srgbClr val="000000"/>
+              </a:solidFill>
+              <a:latin typeface="Arial"/>
+            </a:endParaRPr>
+          </a:p>
+          <a:p>
+            <a:pPr marL="419040" indent="-314280">
+              <a:lnSpc>
+                <a:spcPct val="100000"/>
+              </a:lnSpc>
+              <a:spcAft>
+                <a:spcPts val="1057"/>
+              </a:spcAft>
+              <a:buClr>
+                <a:srgbClr val="2c3e50"/>
+              </a:buClr>
+              <a:buSzPct val="45000"/>
+              <a:buFont typeface="Wingdings" charset="2"/>
+              <a:buChar char=""/>
+            </a:pPr>
+            <a:r>
+              <a:rPr b="1" lang="en-GB" sz="2400" spc="-1" strike="noStrike">
+                <a:solidFill>
+                  <a:srgbClr val="2c3e50"/>
+                </a:solidFill>
+                <a:latin typeface="Source Sans Pro Semibold"/>
+              </a:rPr>
+              <a:t>Matlab Psychtoolbox </a:t>
+            </a:r>
+            <a:r>
+              <a:rPr b="1" lang="en-GB" sz="2400" spc="-1" strike="noStrike">
+                <a:solidFill>
+                  <a:srgbClr val="2c3e50"/>
+                </a:solidFill>
+                <a:latin typeface="Source Sans Pro Semibold"/>
+              </a:rPr>
+              <a:t>simulation connection</a:t>
+            </a:r>
+            <a:endParaRPr b="0" lang="en-GB" sz="2400" spc="-1" strike="noStrike">
+              <a:solidFill>
+                <a:srgbClr val="000000"/>
+              </a:solidFill>
+              <a:latin typeface="Arial"/>
+            </a:endParaRPr>
+          </a:p>
+        </p:txBody>
+      </p:sp>
     </p:spTree>
   </p:cSld>
   <mc:AlternateContent>
@@ -6944,7 +8607,7 @@
       </p:grpSpPr>
       <p:sp>
         <p:nvSpPr>
-          <p:cNvPr id="94" name="PlaceHolder 1"/>
+          <p:cNvPr id="92" name="PlaceHolder 1"/>
           <p:cNvSpPr>
             <a:spLocks noGrp="1"/>
           </p:cNvSpPr>
@@ -6955,7 +8618,7 @@
         <p:spPr>
           <a:xfrm>
             <a:off x="360000" y="225720"/>
-            <a:ext cx="9358920" cy="717840"/>
+            <a:ext cx="9358920" cy="718920"/>
           </a:xfrm>
           <a:prstGeom prst="rect">
             <a:avLst/>
@@ -6986,7 +8649,7 @@
                 </a:solidFill>
                 <a:latin typeface="Source Sans Pro Black"/>
               </a:rPr>
-              <a:t>Instant Exercise Sessions</a:t>
+              <a:t>Login/Register System</a:t>
             </a:r>
             <a:endParaRPr b="0" lang="en-GB" sz="2700" spc="-1" strike="noStrike">
               <a:solidFill>
@@ -6999,7 +8662,7 @@
       </p:sp>
       <p:sp>
         <p:nvSpPr>
-          <p:cNvPr id="95" name="PlaceHolder 2"/>
+          <p:cNvPr id="93" name="PlaceHolder 2"/>
           <p:cNvSpPr>
             <a:spLocks noGrp="1"/>
           </p:cNvSpPr>
@@ -7009,8 +8672,8 @@
         </p:nvSpPr>
         <p:spPr>
           <a:xfrm>
-            <a:off x="360000" y="1485000"/>
-            <a:ext cx="5939280" cy="1214280"/>
+            <a:off x="180000" y="1485000"/>
+            <a:ext cx="6479280" cy="1394280"/>
           </a:xfrm>
           <a:prstGeom prst="rect">
             <a:avLst/>
@@ -7022,10 +8685,10 @@
         </p:spPr>
         <p:txBody>
           <a:bodyPr lIns="0" rIns="0" tIns="0" bIns="0" anchor="t">
-            <a:normAutofit fontScale="71000"/>
-          </a:bodyPr>
-          <a:p>
-            <a:pPr marL="306720" indent="-230040">
+            <a:normAutofit fontScale="88000"/>
+          </a:bodyPr>
+          <a:p>
+            <a:pPr marL="380160" indent="-285120">
               <a:lnSpc>
                 <a:spcPct val="100000"/>
               </a:lnSpc>
@@ -7046,7 +8709,7 @@
                 </a:solidFill>
                 <a:latin typeface="Source Sans Pro Semibold"/>
               </a:rPr>
-              <a:t>Looped video clips of the exercise being demonstrated</a:t>
+              <a:t>Email/Password based authentication</a:t>
             </a:r>
             <a:endParaRPr b="0" lang="en-GB" sz="2000" spc="-1" strike="noStrike">
               <a:solidFill>
@@ -7056,7 +8719,7 @@
             </a:endParaRPr>
           </a:p>
           <a:p>
-            <a:pPr marL="306720" indent="-230040">
+            <a:pPr marL="380160" indent="-285120">
               <a:lnSpc>
                 <a:spcPct val="100000"/>
               </a:lnSpc>
@@ -7077,7 +8740,7 @@
                 </a:solidFill>
                 <a:latin typeface="Source Sans Pro Semibold"/>
               </a:rPr>
-              <a:t>Countdown timer on each exercise before “Next Exercise” can be clicked</a:t>
+              <a:t>Passwords are stored as Argon2id hashes for security</a:t>
             </a:r>
             <a:endParaRPr b="0" lang="en-GB" sz="2000" spc="-1" strike="noStrike">
               <a:solidFill>
@@ -7087,7 +8750,7 @@
             </a:endParaRPr>
           </a:p>
           <a:p>
-            <a:pPr marL="306720" indent="-230040">
+            <a:pPr marL="380160" indent="-285120">
               <a:lnSpc>
                 <a:spcPct val="100000"/>
               </a:lnSpc>
@@ -7108,7 +8771,7 @@
                 </a:solidFill>
                 <a:latin typeface="Source Sans Pro Semibold"/>
               </a:rPr>
-              <a:t>Easy to add new videos with an mp4 file and an array of TimeSets</a:t>
+              <a:t>Secure Session ID is stored in browsers localStorage</a:t>
             </a:r>
             <a:endParaRPr b="0" lang="en-GB" sz="2000" spc="-1" strike="noStrike">
               <a:solidFill>
@@ -7121,7 +8784,7 @@
       </p:sp>
       <p:pic>
         <p:nvPicPr>
-          <p:cNvPr id="96" name="" descr=""/>
+          <p:cNvPr id="94" name="" descr=""/>
           <p:cNvPicPr/>
           <p:nvPr/>
         </p:nvPicPr>
@@ -7131,8 +8794,8 @@
         </p:blipFill>
         <p:spPr>
           <a:xfrm>
-            <a:off x="720360" y="2734920"/>
-            <a:ext cx="3958920" cy="2484360"/>
+            <a:off x="543600" y="2700000"/>
+            <a:ext cx="5395320" cy="2519280"/>
           </a:xfrm>
           <a:prstGeom prst="rect">
             <a:avLst/>
@@ -7144,7 +8807,7 @@
       </p:pic>
       <p:pic>
         <p:nvPicPr>
-          <p:cNvPr id="97" name="" descr=""/>
+          <p:cNvPr id="95" name="" descr=""/>
           <p:cNvPicPr/>
           <p:nvPr/>
         </p:nvPicPr>
@@ -7154,31 +8817,8 @@
         </p:blipFill>
         <p:spPr>
           <a:xfrm>
-            <a:off x="6480000" y="943920"/>
-            <a:ext cx="3253320" cy="1545120"/>
-          </a:xfrm>
-          <a:prstGeom prst="rect">
-            <a:avLst/>
-          </a:prstGeom>
-          <a:ln w="0">
-            <a:noFill/>
-          </a:ln>
-        </p:spPr>
-      </p:pic>
-      <p:pic>
-        <p:nvPicPr>
-          <p:cNvPr id="98" name="" descr=""/>
-          <p:cNvPicPr/>
-          <p:nvPr/>
-        </p:nvPicPr>
-        <p:blipFill>
-          <a:blip r:embed="rId3"/>
-          <a:stretch/>
-        </p:blipFill>
-        <p:spPr>
-          <a:xfrm>
-            <a:off x="5940000" y="2700000"/>
-            <a:ext cx="4091400" cy="2444040"/>
+            <a:off x="6480000" y="900000"/>
+            <a:ext cx="3419280" cy="4221000"/>
           </a:xfrm>
           <a:prstGeom prst="rect">
             <a:avLst/>
@@ -7220,7 +8860,7 @@
       </p:grpSpPr>
       <p:sp>
         <p:nvSpPr>
-          <p:cNvPr id="99" name="PlaceHolder 1"/>
+          <p:cNvPr id="96" name="PlaceHolder 1"/>
           <p:cNvSpPr>
             <a:spLocks noGrp="1"/>
           </p:cNvSpPr>
@@ -7262,7 +8902,7 @@
                 </a:solidFill>
                 <a:latin typeface="Source Sans Pro Black"/>
               </a:rPr>
-              <a:t>Scheduled Exercise Sessions</a:t>
+              <a:t>Instant Exercise Sessions</a:t>
             </a:r>
             <a:endParaRPr b="0" lang="en-GB" sz="2700" spc="-1" strike="noStrike">
               <a:solidFill>
@@ -7275,7 +8915,7 @@
       </p:sp>
       <p:sp>
         <p:nvSpPr>
-          <p:cNvPr id="100" name="PlaceHolder 2"/>
+          <p:cNvPr id="97" name="PlaceHolder 2"/>
           <p:cNvSpPr>
             <a:spLocks noGrp="1"/>
           </p:cNvSpPr>
@@ -7286,7 +8926,7 @@
         <p:spPr>
           <a:xfrm>
             <a:off x="360000" y="1485000"/>
-            <a:ext cx="5039280" cy="1394280"/>
+            <a:ext cx="5939280" cy="1214280"/>
           </a:xfrm>
           <a:prstGeom prst="rect">
             <a:avLst/>
@@ -7298,10 +8938,10 @@
         </p:spPr>
         <p:txBody>
           <a:bodyPr lIns="0" rIns="0" tIns="0" bIns="0" anchor="t">
-            <a:normAutofit fontScale="87000"/>
-          </a:bodyPr>
-          <a:p>
-            <a:pPr marL="375840" indent="-281880">
+            <a:normAutofit fontScale="71000"/>
+          </a:bodyPr>
+          <a:p>
+            <a:pPr marL="306720" indent="-230040">
               <a:lnSpc>
                 <a:spcPct val="100000"/>
               </a:lnSpc>
@@ -7316,23 +8956,32 @@
               <a:buChar char=""/>
             </a:pPr>
             <a:r>
-              <a:rPr b="1" lang="en-GB" sz="2400" spc="-1" strike="noStrike">
+              <a:rPr b="1" lang="en-GB" sz="2000" spc="-1" strike="noStrike">
                 <a:solidFill>
                   <a:srgbClr val="2c3e50"/>
                 </a:solidFill>
                 <a:latin typeface="Source Sans Pro Semibold"/>
               </a:rPr>
-              <a:t>Form to enter email of meeting attendee and datetime</a:t>
-            </a:r>
-            <a:endParaRPr b="0" lang="en-GB" sz="2400" spc="-1" strike="noStrike">
-              <a:solidFill>
-                <a:srgbClr val="000000"/>
-              </a:solidFill>
-              <a:latin typeface="Arial"/>
-            </a:endParaRPr>
-          </a:p>
-          <a:p>
-            <a:pPr marL="375840" indent="-281880">
+              <a:t>Looped video clips of the exercise </a:t>
+            </a:r>
+            <a:r>
+              <a:rPr b="1" lang="en-GB" sz="2000" spc="-1" strike="noStrike">
+                <a:solidFill>
+                  <a:srgbClr val="2c3e50"/>
+                </a:solidFill>
+                <a:latin typeface="Source Sans Pro Semibold"/>
+              </a:rPr>
+              <a:t>being demonstrated</a:t>
+            </a:r>
+            <a:endParaRPr b="0" lang="en-GB" sz="2000" spc="-1" strike="noStrike">
+              <a:solidFill>
+                <a:srgbClr val="000000"/>
+              </a:solidFill>
+              <a:latin typeface="Arial"/>
+            </a:endParaRPr>
+          </a:p>
+          <a:p>
+            <a:pPr marL="306720" indent="-230040">
               <a:lnSpc>
                 <a:spcPct val="100000"/>
               </a:lnSpc>
@@ -7347,15 +8996,73 @@
               <a:buChar char=""/>
             </a:pPr>
             <a:r>
-              <a:rPr b="1" lang="en-GB" sz="2400" spc="-1" strike="noStrike">
+              <a:rPr b="1" lang="en-GB" sz="2000" spc="-1" strike="noStrike">
                 <a:solidFill>
                   <a:srgbClr val="2c3e50"/>
                 </a:solidFill>
                 <a:latin typeface="Source Sans Pro Semibold"/>
               </a:rPr>
-              <a:t>Generates ICS calendar file and emails it to both parties</a:t>
-            </a:r>
-            <a:endParaRPr b="0" lang="en-GB" sz="2400" spc="-1" strike="noStrike">
+              <a:t>Countdown timer on each exercise </a:t>
+            </a:r>
+            <a:r>
+              <a:rPr b="1" lang="en-GB" sz="2000" spc="-1" strike="noStrike">
+                <a:solidFill>
+                  <a:srgbClr val="2c3e50"/>
+                </a:solidFill>
+                <a:latin typeface="Source Sans Pro Semibold"/>
+              </a:rPr>
+              <a:t>before “Next Exercise” can be </a:t>
+            </a:r>
+            <a:r>
+              <a:rPr b="1" lang="en-GB" sz="2000" spc="-1" strike="noStrike">
+                <a:solidFill>
+                  <a:srgbClr val="2c3e50"/>
+                </a:solidFill>
+                <a:latin typeface="Source Sans Pro Semibold"/>
+              </a:rPr>
+              <a:t>clicked</a:t>
+            </a:r>
+            <a:endParaRPr b="0" lang="en-GB" sz="2000" spc="-1" strike="noStrike">
+              <a:solidFill>
+                <a:srgbClr val="000000"/>
+              </a:solidFill>
+              <a:latin typeface="Arial"/>
+            </a:endParaRPr>
+          </a:p>
+          <a:p>
+            <a:pPr marL="306720" indent="-230040">
+              <a:lnSpc>
+                <a:spcPct val="100000"/>
+              </a:lnSpc>
+              <a:spcAft>
+                <a:spcPts val="1057"/>
+              </a:spcAft>
+              <a:buClr>
+                <a:srgbClr val="2c3e50"/>
+              </a:buClr>
+              <a:buSzPct val="45000"/>
+              <a:buFont typeface="Wingdings" charset="2"/>
+              <a:buChar char=""/>
+            </a:pPr>
+            <a:r>
+              <a:rPr b="1" lang="en-GB" sz="2000" spc="-1" strike="noStrike">
+                <a:solidFill>
+                  <a:srgbClr val="2c3e50"/>
+                </a:solidFill>
+                <a:latin typeface="Source Sans Pro Semibold"/>
+              </a:rPr>
+              <a:t>Easy to add new videos with an </a:t>
+            </a:r>
+            <a:r>
+              <a:rPr b="1" lang="en-GB" sz="2000" spc="-1" strike="noStrike">
+                <a:solidFill>
+                  <a:srgbClr val="2c3e50"/>
+                </a:solidFill>
+                <a:latin typeface="Source Sans Pro Semibold"/>
+              </a:rPr>
+              <a:t>mp4 file and an array of TimeSets</a:t>
+            </a:r>
+            <a:endParaRPr b="0" lang="en-GB" sz="2000" spc="-1" strike="noStrike">
               <a:solidFill>
                 <a:srgbClr val="000000"/>
               </a:solidFill>
@@ -7366,7 +9073,7 @@
       </p:sp>
       <p:pic>
         <p:nvPicPr>
-          <p:cNvPr id="101" name="" descr=""/>
+          <p:cNvPr id="98" name="" descr=""/>
           <p:cNvPicPr/>
           <p:nvPr/>
         </p:nvPicPr>
@@ -7376,8 +9083,8 @@
         </p:blipFill>
         <p:spPr>
           <a:xfrm>
-            <a:off x="720360" y="3190320"/>
-            <a:ext cx="4678920" cy="1848960"/>
+            <a:off x="720360" y="2734920"/>
+            <a:ext cx="3958920" cy="2484360"/>
           </a:xfrm>
           <a:prstGeom prst="rect">
             <a:avLst/>
@@ -7389,7 +9096,7 @@
       </p:pic>
       <p:pic>
         <p:nvPicPr>
-          <p:cNvPr id="102" name="" descr=""/>
+          <p:cNvPr id="99" name="" descr=""/>
           <p:cNvPicPr/>
           <p:nvPr/>
         </p:nvPicPr>
@@ -7399,8 +9106,8 @@
         </p:blipFill>
         <p:spPr>
           <a:xfrm>
-            <a:off x="5760000" y="540000"/>
-            <a:ext cx="3959280" cy="1815480"/>
+            <a:off x="6480000" y="943920"/>
+            <a:ext cx="3253320" cy="1545120"/>
           </a:xfrm>
           <a:prstGeom prst="rect">
             <a:avLst/>
@@ -7412,7 +9119,7 @@
       </p:pic>
       <p:pic>
         <p:nvPicPr>
-          <p:cNvPr id="103" name="" descr=""/>
+          <p:cNvPr id="100" name="" descr=""/>
           <p:cNvPicPr/>
           <p:nvPr/>
         </p:nvPicPr>
@@ -7422,8 +9129,8 @@
         </p:blipFill>
         <p:spPr>
           <a:xfrm>
-            <a:off x="5803200" y="2700000"/>
-            <a:ext cx="3736440" cy="2419560"/>
+            <a:off x="5940000" y="2700000"/>
+            <a:ext cx="4091400" cy="2444040"/>
           </a:xfrm>
           <a:prstGeom prst="rect">
             <a:avLst/>
@@ -7465,7 +9172,7 @@
       </p:grpSpPr>
       <p:sp>
         <p:nvSpPr>
-          <p:cNvPr id="104" name="PlaceHolder 1"/>
+          <p:cNvPr id="101" name="PlaceHolder 1"/>
           <p:cNvSpPr>
             <a:spLocks noGrp="1"/>
           </p:cNvSpPr>
@@ -7507,7 +9214,7 @@
                 </a:solidFill>
                 <a:latin typeface="Source Sans Pro Black"/>
               </a:rPr>
-              <a:t>Patient and Therapist User Data Form</a:t>
+              <a:t>Scheduled Exercise Sessions</a:t>
             </a:r>
             <a:endParaRPr b="0" lang="en-GB" sz="2700" spc="-1" strike="noStrike">
               <a:solidFill>
@@ -7520,7 +9227,7 @@
       </p:sp>
       <p:sp>
         <p:nvSpPr>
-          <p:cNvPr id="105" name="PlaceHolder 2"/>
+          <p:cNvPr id="102" name="PlaceHolder 2"/>
           <p:cNvSpPr>
             <a:spLocks noGrp="1"/>
           </p:cNvSpPr>
@@ -7531,7 +9238,7 @@
         <p:spPr>
           <a:xfrm>
             <a:off x="360000" y="1485000"/>
-            <a:ext cx="4860000" cy="1035000"/>
+            <a:ext cx="5039280" cy="1394280"/>
           </a:xfrm>
           <a:prstGeom prst="rect">
             <a:avLst/>
@@ -7543,10 +9250,10 @@
         </p:spPr>
         <p:txBody>
           <a:bodyPr lIns="0" rIns="0" tIns="0" bIns="0" anchor="t">
-            <a:normAutofit/>
-          </a:bodyPr>
-          <a:p>
-            <a:pPr marL="432000" indent="-324000">
+            <a:normAutofit fontScale="87000"/>
+          </a:bodyPr>
+          <a:p>
+            <a:pPr marL="375840" indent="-281880">
               <a:lnSpc>
                 <a:spcPct val="100000"/>
               </a:lnSpc>
@@ -7567,7 +9274,38 @@
                 </a:solidFill>
                 <a:latin typeface="Source Sans Pro Semibold"/>
               </a:rPr>
-              <a:t>Form to submit data on Patient/Therapist information</a:t>
+              <a:t>Form to enter email of meeting attendee and datetime</a:t>
+            </a:r>
+            <a:endParaRPr b="0" lang="en-GB" sz="2400" spc="-1" strike="noStrike">
+              <a:solidFill>
+                <a:srgbClr val="000000"/>
+              </a:solidFill>
+              <a:latin typeface="Arial"/>
+            </a:endParaRPr>
+          </a:p>
+          <a:p>
+            <a:pPr marL="375840" indent="-281880">
+              <a:lnSpc>
+                <a:spcPct val="100000"/>
+              </a:lnSpc>
+              <a:spcAft>
+                <a:spcPts val="1057"/>
+              </a:spcAft>
+              <a:buClr>
+                <a:srgbClr val="2c3e50"/>
+              </a:buClr>
+              <a:buSzPct val="45000"/>
+              <a:buFont typeface="Wingdings" charset="2"/>
+              <a:buChar char=""/>
+            </a:pPr>
+            <a:r>
+              <a:rPr b="1" lang="en-GB" sz="2400" spc="-1" strike="noStrike">
+                <a:solidFill>
+                  <a:srgbClr val="2c3e50"/>
+                </a:solidFill>
+                <a:latin typeface="Source Sans Pro Semibold"/>
+              </a:rPr>
+              <a:t>Generates ICS calendar file and emails it to both parties</a:t>
             </a:r>
             <a:endParaRPr b="0" lang="en-GB" sz="2400" spc="-1" strike="noStrike">
               <a:solidFill>
@@ -7580,7 +9318,7 @@
       </p:sp>
       <p:pic>
         <p:nvPicPr>
-          <p:cNvPr id="106" name="" descr=""/>
+          <p:cNvPr id="103" name="" descr=""/>
           <p:cNvPicPr/>
           <p:nvPr/>
         </p:nvPicPr>
@@ -7590,20 +9328,20 @@
         </p:blipFill>
         <p:spPr>
           <a:xfrm>
-            <a:off x="5400000" y="1620000"/>
-            <a:ext cx="4499280" cy="3248640"/>
-          </a:xfrm>
-          <a:prstGeom prst="rect">
-            <a:avLst/>
-          </a:prstGeom>
-          <a:ln w="0">
+            <a:off x="720360" y="3190320"/>
+            <a:ext cx="4678920" cy="1848960"/>
+          </a:xfrm>
+          <a:prstGeom prst="rect">
+            <a:avLst/>
+          </a:prstGeom>
+          <a:ln w="10800">
             <a:noFill/>
           </a:ln>
         </p:spPr>
       </p:pic>
       <p:pic>
         <p:nvPicPr>
-          <p:cNvPr id="107" name="" descr=""/>
+          <p:cNvPr id="104" name="" descr=""/>
           <p:cNvPicPr/>
           <p:nvPr/>
         </p:nvPicPr>
@@ -7613,8 +9351,31 @@
         </p:blipFill>
         <p:spPr>
           <a:xfrm>
-            <a:off x="987840" y="2340000"/>
-            <a:ext cx="3512160" cy="2880000"/>
+            <a:off x="5760000" y="540000"/>
+            <a:ext cx="3959280" cy="1815480"/>
+          </a:xfrm>
+          <a:prstGeom prst="rect">
+            <a:avLst/>
+          </a:prstGeom>
+          <a:ln w="0">
+            <a:noFill/>
+          </a:ln>
+        </p:spPr>
+      </p:pic>
+      <p:pic>
+        <p:nvPicPr>
+          <p:cNvPr id="105" name="" descr=""/>
+          <p:cNvPicPr/>
+          <p:nvPr/>
+        </p:nvPicPr>
+        <p:blipFill>
+          <a:blip r:embed="rId3"/>
+          <a:stretch/>
+        </p:blipFill>
+        <p:spPr>
+          <a:xfrm>
+            <a:off x="5803200" y="2700000"/>
+            <a:ext cx="3736440" cy="2419560"/>
           </a:xfrm>
           <a:prstGeom prst="rect">
             <a:avLst/>
@@ -7656,7 +9417,7 @@
       </p:grpSpPr>
       <p:sp>
         <p:nvSpPr>
-          <p:cNvPr id="108" name="PlaceHolder 1"/>
+          <p:cNvPr id="106" name="PlaceHolder 1"/>
           <p:cNvSpPr>
             <a:spLocks noGrp="1"/>
           </p:cNvSpPr>
@@ -7698,7 +9459,7 @@
                 </a:solidFill>
                 <a:latin typeface="Source Sans Pro Black"/>
               </a:rPr>
-              <a:t>User Statistics</a:t>
+              <a:t>Patient and Therapist User Data Form</a:t>
             </a:r>
             <a:endParaRPr b="0" lang="en-GB" sz="2700" spc="-1" strike="noStrike">
               <a:solidFill>
@@ -7711,7 +9472,7 @@
       </p:sp>
       <p:sp>
         <p:nvSpPr>
-          <p:cNvPr id="109" name="PlaceHolder 2"/>
+          <p:cNvPr id="107" name="PlaceHolder 2"/>
           <p:cNvSpPr>
             <a:spLocks noGrp="1"/>
           </p:cNvSpPr>
@@ -7722,7 +9483,7 @@
         <p:spPr>
           <a:xfrm>
             <a:off x="360000" y="1485000"/>
-            <a:ext cx="4679280" cy="1214280"/>
+            <a:ext cx="4860000" cy="1035000"/>
           </a:xfrm>
           <a:prstGeom prst="rect">
             <a:avLst/>
@@ -7734,10 +9495,10 @@
         </p:spPr>
         <p:txBody>
           <a:bodyPr lIns="0" rIns="0" tIns="0" bIns="0" anchor="t">
-            <a:normAutofit fontScale="78000"/>
-          </a:bodyPr>
-          <a:p>
-            <a:pPr marL="336960" indent="-252720">
+            <a:normAutofit/>
+          </a:bodyPr>
+          <a:p>
+            <a:pPr marL="432000" indent="-324000">
               <a:lnSpc>
                 <a:spcPct val="100000"/>
               </a:lnSpc>
@@ -7752,46 +9513,15 @@
               <a:buChar char=""/>
             </a:pPr>
             <a:r>
-              <a:rPr b="1" lang="en-GB" sz="2000" spc="-1" strike="noStrike">
+              <a:rPr b="1" lang="en-GB" sz="2400" spc="-1" strike="noStrike">
                 <a:solidFill>
                   <a:srgbClr val="2c3e50"/>
                 </a:solidFill>
                 <a:latin typeface="Source Sans Pro Semibold"/>
               </a:rPr>
-              <a:t>Submitted form information is displayed on user stats page</a:t>
-            </a:r>
-            <a:endParaRPr b="0" lang="en-GB" sz="2000" spc="-1" strike="noStrike">
-              <a:solidFill>
-                <a:srgbClr val="000000"/>
-              </a:solidFill>
-              <a:latin typeface="Arial"/>
-            </a:endParaRPr>
-          </a:p>
-          <a:p>
-            <a:pPr marL="336960" indent="-252720">
-              <a:lnSpc>
-                <a:spcPct val="100000"/>
-              </a:lnSpc>
-              <a:spcAft>
-                <a:spcPts val="1057"/>
-              </a:spcAft>
-              <a:buClr>
-                <a:srgbClr val="2c3e50"/>
-              </a:buClr>
-              <a:buSzPct val="45000"/>
-              <a:buFont typeface="Wingdings" charset="2"/>
-              <a:buChar char=""/>
-            </a:pPr>
-            <a:r>
-              <a:rPr b="1" lang="en-GB" sz="2000" spc="-1" strike="noStrike">
-                <a:solidFill>
-                  <a:srgbClr val="2c3e50"/>
-                </a:solidFill>
-                <a:latin typeface="Source Sans Pro Semibold"/>
-              </a:rPr>
-              <a:t>Exercise session statistics, including total time spent exercising and sessions completed</a:t>
-            </a:r>
-            <a:endParaRPr b="0" lang="en-GB" sz="2000" spc="-1" strike="noStrike">
+              <a:t>Form to submit data on Patient/Therapist information</a:t>
+            </a:r>
+            <a:endParaRPr b="0" lang="en-GB" sz="2400" spc="-1" strike="noStrike">
               <a:solidFill>
                 <a:srgbClr val="000000"/>
               </a:solidFill>
@@ -7802,7 +9532,7 @@
       </p:sp>
       <p:pic>
         <p:nvPicPr>
-          <p:cNvPr id="110" name="" descr=""/>
+          <p:cNvPr id="108" name="" descr=""/>
           <p:cNvPicPr/>
           <p:nvPr/>
         </p:nvPicPr>
@@ -7812,20 +9542,20 @@
         </p:blipFill>
         <p:spPr>
           <a:xfrm>
-            <a:off x="720000" y="2819880"/>
-            <a:ext cx="3689640" cy="2454840"/>
-          </a:xfrm>
-          <a:prstGeom prst="rect">
-            <a:avLst/>
-          </a:prstGeom>
-          <a:ln w="10800">
+            <a:off x="5400000" y="1620000"/>
+            <a:ext cx="4499280" cy="3248640"/>
+          </a:xfrm>
+          <a:prstGeom prst="rect">
+            <a:avLst/>
+          </a:prstGeom>
+          <a:ln w="0">
             <a:noFill/>
           </a:ln>
         </p:spPr>
       </p:pic>
       <p:pic>
         <p:nvPicPr>
-          <p:cNvPr id="111" name="" descr=""/>
+          <p:cNvPr id="109" name="" descr=""/>
           <p:cNvPicPr/>
           <p:nvPr/>
         </p:nvPicPr>
@@ -7835,31 +9565,8 @@
         </p:blipFill>
         <p:spPr>
           <a:xfrm>
-            <a:off x="5220000" y="828720"/>
-            <a:ext cx="4679640" cy="1870920"/>
-          </a:xfrm>
-          <a:prstGeom prst="rect">
-            <a:avLst/>
-          </a:prstGeom>
-          <a:ln w="0">
-            <a:noFill/>
-          </a:ln>
-        </p:spPr>
-      </p:pic>
-      <p:pic>
-        <p:nvPicPr>
-          <p:cNvPr id="112" name="" descr=""/>
-          <p:cNvPicPr/>
-          <p:nvPr/>
-        </p:nvPicPr>
-        <p:blipFill>
-          <a:blip r:embed="rId3"/>
-          <a:stretch/>
-        </p:blipFill>
-        <p:spPr>
-          <a:xfrm>
-            <a:off x="5220000" y="2864160"/>
-            <a:ext cx="3678480" cy="2355120"/>
+            <a:off x="987840" y="2340000"/>
+            <a:ext cx="3512160" cy="2880000"/>
           </a:xfrm>
           <a:prstGeom prst="rect">
             <a:avLst/>
@@ -7901,7 +9608,7 @@
       </p:grpSpPr>
       <p:sp>
         <p:nvSpPr>
-          <p:cNvPr id="113" name="PlaceHolder 1"/>
+          <p:cNvPr id="110" name="PlaceHolder 1"/>
           <p:cNvSpPr>
             <a:spLocks noGrp="1"/>
           </p:cNvSpPr>
@@ -7943,7 +9650,7 @@
                 </a:solidFill>
                 <a:latin typeface="Source Sans Pro Black"/>
               </a:rPr>
-              <a:t>Recommendations</a:t>
+              <a:t>User Statistics</a:t>
             </a:r>
             <a:endParaRPr b="0" lang="en-GB" sz="2700" spc="-1" strike="noStrike">
               <a:solidFill>
@@ -7954,60 +9661,35 @@
           </a:p>
         </p:txBody>
       </p:sp>
-      <p:pic>
-        <p:nvPicPr>
-          <p:cNvPr id="114" name="" descr=""/>
-          <p:cNvPicPr/>
-          <p:nvPr/>
-        </p:nvPicPr>
-        <p:blipFill>
-          <a:blip r:embed="rId1"/>
-          <a:stretch/>
-        </p:blipFill>
-        <p:spPr>
-          <a:xfrm>
-            <a:off x="301680" y="3013560"/>
-            <a:ext cx="5457960" cy="2026080"/>
-          </a:xfrm>
-          <a:prstGeom prst="rect">
-            <a:avLst/>
-          </a:prstGeom>
-          <a:ln w="0">
-            <a:noFill/>
-          </a:ln>
-        </p:spPr>
-      </p:pic>
-      <p:sp>
-        <p:nvSpPr>
-          <p:cNvPr id="115" name="PlaceHolder 6"/>
-          <p:cNvSpPr/>
-          <p:nvPr/>
-        </p:nvSpPr>
-        <p:spPr>
-          <a:xfrm>
-            <a:off x="360360" y="1485000"/>
-            <a:ext cx="5399280" cy="854640"/>
-          </a:xfrm>
-          <a:prstGeom prst="rect">
-            <a:avLst/>
-          </a:prstGeom>
-          <a:noFill/>
-          <a:ln w="0">
-            <a:noFill/>
-          </a:ln>
-        </p:spPr>
-        <p:style>
-          <a:lnRef idx="0"/>
-          <a:fillRef idx="0"/>
-          <a:effectRef idx="0"/>
-          <a:fontRef idx="minor"/>
-        </p:style>
+      <p:sp>
+        <p:nvSpPr>
+          <p:cNvPr id="111" name="PlaceHolder 2"/>
+          <p:cNvSpPr>
+            <a:spLocks noGrp="1"/>
+          </p:cNvSpPr>
+          <p:nvPr>
+            <p:ph/>
+          </p:nvPr>
+        </p:nvSpPr>
+        <p:spPr>
+          <a:xfrm>
+            <a:off x="360000" y="1485000"/>
+            <a:ext cx="4679280" cy="1214280"/>
+          </a:xfrm>
+          <a:prstGeom prst="rect">
+            <a:avLst/>
+          </a:prstGeom>
+          <a:noFill/>
+          <a:ln w="0">
+            <a:noFill/>
+          </a:ln>
+        </p:spPr>
         <p:txBody>
           <a:bodyPr lIns="0" rIns="0" tIns="0" bIns="0" anchor="t">
-            <a:normAutofit/>
-          </a:bodyPr>
-          <a:p>
-            <a:pPr marL="432000" indent="-324000">
+            <a:normAutofit fontScale="78000"/>
+          </a:bodyPr>
+          <a:p>
+            <a:pPr marL="336960" indent="-252720">
               <a:lnSpc>
                 <a:spcPct val="100000"/>
               </a:lnSpc>
@@ -8028,7 +9710,65 @@
                 </a:solidFill>
                 <a:latin typeface="Source Sans Pro Semibold"/>
               </a:rPr>
-              <a:t>Patient’s form information is used to provide exercise recommendations</a:t>
+              <a:t>Submitted form information is </a:t>
+            </a:r>
+            <a:r>
+              <a:rPr b="1" lang="en-GB" sz="2000" spc="-1" strike="noStrike">
+                <a:solidFill>
+                  <a:srgbClr val="2c3e50"/>
+                </a:solidFill>
+                <a:latin typeface="Source Sans Pro Semibold"/>
+              </a:rPr>
+              <a:t>displayed on user stats page</a:t>
+            </a:r>
+            <a:endParaRPr b="0" lang="en-GB" sz="2000" spc="-1" strike="noStrike">
+              <a:solidFill>
+                <a:srgbClr val="000000"/>
+              </a:solidFill>
+              <a:latin typeface="Arial"/>
+            </a:endParaRPr>
+          </a:p>
+          <a:p>
+            <a:pPr marL="336960" indent="-252720">
+              <a:lnSpc>
+                <a:spcPct val="100000"/>
+              </a:lnSpc>
+              <a:spcAft>
+                <a:spcPts val="1057"/>
+              </a:spcAft>
+              <a:buClr>
+                <a:srgbClr val="2c3e50"/>
+              </a:buClr>
+              <a:buSzPct val="45000"/>
+              <a:buFont typeface="Wingdings" charset="2"/>
+              <a:buChar char=""/>
+            </a:pPr>
+            <a:r>
+              <a:rPr b="1" lang="en-GB" sz="2000" spc="-1" strike="noStrike">
+                <a:solidFill>
+                  <a:srgbClr val="2c3e50"/>
+                </a:solidFill>
+                <a:latin typeface="Source Sans Pro Semibold"/>
+              </a:rPr>
+              <a:t>Exercise session statistics, including </a:t>
+            </a:r>
+            <a:r>
+              <a:rPr b="1" lang="en-GB" sz="2000" spc="-1" strike="noStrike">
+                <a:solidFill>
+                  <a:srgbClr val="2c3e50"/>
+                </a:solidFill>
+                <a:latin typeface="Source Sans Pro Semibold"/>
+              </a:rPr>
+              <a:t>total time spent exercising and </a:t>
+            </a:r>
+            <a:r>
+              <a:rPr b="1" lang="en-GB" sz="2000" spc="-1" strike="noStrike">
+                <a:solidFill>
+                  <a:srgbClr val="2c3e50"/>
+                </a:solidFill>
+                <a:latin typeface="Source Sans Pro Semibold"/>
+              </a:rPr>
+              <a:t>sessions completed</a:t>
             </a:r>
             <a:endParaRPr b="0" lang="en-GB" sz="2000" spc="-1" strike="noStrike">
               <a:solidFill>
@@ -8041,7 +9781,30 @@
       </p:sp>
       <p:pic>
         <p:nvPicPr>
-          <p:cNvPr id="116" name="" descr=""/>
+          <p:cNvPr id="112" name="" descr=""/>
+          <p:cNvPicPr/>
+          <p:nvPr/>
+        </p:nvPicPr>
+        <p:blipFill>
+          <a:blip r:embed="rId1"/>
+          <a:stretch/>
+        </p:blipFill>
+        <p:spPr>
+          <a:xfrm>
+            <a:off x="5220000" y="828720"/>
+            <a:ext cx="4679640" cy="1870920"/>
+          </a:xfrm>
+          <a:prstGeom prst="rect">
+            <a:avLst/>
+          </a:prstGeom>
+          <a:ln w="0">
+            <a:noFill/>
+          </a:ln>
+        </p:spPr>
+      </p:pic>
+      <p:pic>
+        <p:nvPicPr>
+          <p:cNvPr id="113" name="" descr=""/>
           <p:cNvPicPr/>
           <p:nvPr/>
         </p:nvPicPr>
@@ -8051,8 +9814,8 @@
         </p:blipFill>
         <p:spPr>
           <a:xfrm>
-            <a:off x="5402160" y="1260000"/>
-            <a:ext cx="4497480" cy="1259640"/>
+            <a:off x="5220000" y="2864160"/>
+            <a:ext cx="3678480" cy="2355120"/>
           </a:xfrm>
           <a:prstGeom prst="rect">
             <a:avLst/>
@@ -8064,7 +9827,7 @@
       </p:pic>
       <p:pic>
         <p:nvPicPr>
-          <p:cNvPr id="117" name="" descr=""/>
+          <p:cNvPr id="114" name="" descr=""/>
           <p:cNvPicPr/>
           <p:nvPr/>
         </p:nvPicPr>
@@ -8074,8 +9837,8 @@
         </p:blipFill>
         <p:spPr>
           <a:xfrm>
-            <a:off x="5985000" y="2880000"/>
-            <a:ext cx="3757680" cy="2007360"/>
+            <a:off x="720000" y="2699280"/>
+            <a:ext cx="3685680" cy="2593440"/>
           </a:xfrm>
           <a:prstGeom prst="rect">
             <a:avLst/>
@@ -8117,7 +9880,7 @@
       </p:grpSpPr>
       <p:sp>
         <p:nvSpPr>
-          <p:cNvPr id="118" name="PlaceHolder 1"/>
+          <p:cNvPr id="115" name="PlaceHolder 1"/>
           <p:cNvSpPr>
             <a:spLocks noGrp="1"/>
           </p:cNvSpPr>
@@ -8159,7 +9922,7 @@
                 </a:solidFill>
                 <a:latin typeface="Source Sans Pro Black"/>
               </a:rPr>
-              <a:t>Therapist-Patient Link</a:t>
+              <a:t>Exercise Recommendations</a:t>
             </a:r>
             <a:endParaRPr b="0" lang="en-GB" sz="2700" spc="-1" strike="noStrike">
               <a:solidFill>
@@ -8170,9 +9933,32 @@
           </a:p>
         </p:txBody>
       </p:sp>
-      <p:sp>
-        <p:nvSpPr>
-          <p:cNvPr id="119" name="PlaceHolder 8"/>
+      <p:pic>
+        <p:nvPicPr>
+          <p:cNvPr id="116" name="" descr=""/>
+          <p:cNvPicPr/>
+          <p:nvPr/>
+        </p:nvPicPr>
+        <p:blipFill>
+          <a:blip r:embed="rId1"/>
+          <a:stretch/>
+        </p:blipFill>
+        <p:spPr>
+          <a:xfrm>
+            <a:off x="301680" y="3013560"/>
+            <a:ext cx="5457960" cy="2026080"/>
+          </a:xfrm>
+          <a:prstGeom prst="rect">
+            <a:avLst/>
+          </a:prstGeom>
+          <a:ln w="0">
+            <a:noFill/>
+          </a:ln>
+        </p:spPr>
+      </p:pic>
+      <p:sp>
+        <p:nvSpPr>
+          <p:cNvPr id="117" name="PlaceHolder 6"/>
           <p:cNvSpPr/>
           <p:nvPr/>
         </p:nvSpPr>
@@ -8197,10 +9983,10 @@
         </p:style>
         <p:txBody>
           <a:bodyPr lIns="0" rIns="0" tIns="0" bIns="0" anchor="t">
-            <a:normAutofit fontScale="81000"/>
-          </a:bodyPr>
-          <a:p>
-            <a:pPr marL="349920" indent="-262440">
+            <a:normAutofit/>
+          </a:bodyPr>
+          <a:p>
+            <a:pPr marL="432000" indent="-324000">
               <a:lnSpc>
                 <a:spcPct val="100000"/>
               </a:lnSpc>
@@ -8221,38 +10007,7 @@
                 </a:solidFill>
                 <a:latin typeface="Source Sans Pro Semibold"/>
               </a:rPr>
-              <a:t>Therapist can search patients by email</a:t>
-            </a:r>
-            <a:endParaRPr b="0" lang="en-GB" sz="2000" spc="-1" strike="noStrike">
-              <a:solidFill>
-                <a:srgbClr val="000000"/>
-              </a:solidFill>
-              <a:latin typeface="Arial"/>
-            </a:endParaRPr>
-          </a:p>
-          <a:p>
-            <a:pPr marL="349920" indent="-262440">
-              <a:lnSpc>
-                <a:spcPct val="100000"/>
-              </a:lnSpc>
-              <a:spcAft>
-                <a:spcPts val="1057"/>
-              </a:spcAft>
-              <a:buClr>
-                <a:srgbClr val="2c3e50"/>
-              </a:buClr>
-              <a:buSzPct val="45000"/>
-              <a:buFont typeface="Wingdings" charset="2"/>
-              <a:buChar char=""/>
-            </a:pPr>
-            <a:r>
-              <a:rPr b="1" lang="en-GB" sz="2000" spc="-1" strike="noStrike">
-                <a:solidFill>
-                  <a:srgbClr val="2c3e50"/>
-                </a:solidFill>
-                <a:latin typeface="Source Sans Pro Semibold"/>
-              </a:rPr>
-              <a:t>Therapist can add patients and view their statistics</a:t>
+              <a:t>Patient’s form information is used to provide exercise recommendations</a:t>
             </a:r>
             <a:endParaRPr b="0" lang="en-GB" sz="2000" spc="-1" strike="noStrike">
               <a:solidFill>
@@ -8265,30 +10020,7 @@
       </p:sp>
       <p:pic>
         <p:nvPicPr>
-          <p:cNvPr id="120" name="" descr=""/>
-          <p:cNvPicPr/>
-          <p:nvPr/>
-        </p:nvPicPr>
-        <p:blipFill>
-          <a:blip r:embed="rId1"/>
-          <a:stretch/>
-        </p:blipFill>
-        <p:spPr>
-          <a:xfrm>
-            <a:off x="540000" y="2520000"/>
-            <a:ext cx="4793040" cy="2699640"/>
-          </a:xfrm>
-          <a:prstGeom prst="rect">
-            <a:avLst/>
-          </a:prstGeom>
-          <a:ln w="0">
-            <a:noFill/>
-          </a:ln>
-        </p:spPr>
-      </p:pic>
-      <p:pic>
-        <p:nvPicPr>
-          <p:cNvPr id="121" name="" descr=""/>
+          <p:cNvPr id="118" name="" descr=""/>
           <p:cNvPicPr/>
           <p:nvPr/>
         </p:nvPicPr>
@@ -8298,8 +10030,8 @@
         </p:blipFill>
         <p:spPr>
           <a:xfrm>
-            <a:off x="6300000" y="360000"/>
-            <a:ext cx="3059640" cy="3052800"/>
+            <a:off x="5402160" y="1260000"/>
+            <a:ext cx="4497480" cy="1259640"/>
           </a:xfrm>
           <a:prstGeom prst="rect">
             <a:avLst/>
@@ -8311,7 +10043,7 @@
       </p:pic>
       <p:pic>
         <p:nvPicPr>
-          <p:cNvPr id="122" name="" descr=""/>
+          <p:cNvPr id="119" name="" descr=""/>
           <p:cNvPicPr/>
           <p:nvPr/>
         </p:nvPicPr>
@@ -8321,8 +10053,8 @@
         </p:blipFill>
         <p:spPr>
           <a:xfrm>
-            <a:off x="6300000" y="3600000"/>
-            <a:ext cx="2808720" cy="1893600"/>
+            <a:off x="5985000" y="2880000"/>
+            <a:ext cx="3757680" cy="2007360"/>
           </a:xfrm>
           <a:prstGeom prst="rect">
             <a:avLst/>
@@ -8364,7 +10096,7 @@
       </p:grpSpPr>
       <p:sp>
         <p:nvSpPr>
-          <p:cNvPr id="123" name="PlaceHolder 1"/>
+          <p:cNvPr id="120" name="PlaceHolder 1"/>
           <p:cNvSpPr>
             <a:spLocks noGrp="1"/>
           </p:cNvSpPr>
@@ -8406,7 +10138,7 @@
                 </a:solidFill>
                 <a:latin typeface="Source Sans Pro Black"/>
               </a:rPr>
-              <a:t>MatLab Psychtoolbox Simulation Integration</a:t>
+              <a:t>Therapist-Patient Link</a:t>
             </a:r>
             <a:endParaRPr b="0" lang="en-GB" sz="2700" spc="-1" strike="noStrike">
               <a:solidFill>
@@ -8419,33 +10151,35 @@
       </p:sp>
       <p:sp>
         <p:nvSpPr>
-          <p:cNvPr id="124" name="PlaceHolder 2"/>
-          <p:cNvSpPr>
-            <a:spLocks noGrp="1"/>
-          </p:cNvSpPr>
-          <p:nvPr>
-            <p:ph/>
-          </p:nvPr>
-        </p:nvSpPr>
-        <p:spPr>
-          <a:xfrm>
-            <a:off x="360000" y="1485000"/>
-            <a:ext cx="5579280" cy="1934280"/>
-          </a:xfrm>
-          <a:prstGeom prst="rect">
-            <a:avLst/>
-          </a:prstGeom>
-          <a:noFill/>
-          <a:ln w="0">
-            <a:noFill/>
-          </a:ln>
-        </p:spPr>
+          <p:cNvPr id="121" name="PlaceHolder 8"/>
+          <p:cNvSpPr/>
+          <p:nvPr/>
+        </p:nvSpPr>
+        <p:spPr>
+          <a:xfrm>
+            <a:off x="360360" y="1485000"/>
+            <a:ext cx="5399280" cy="854640"/>
+          </a:xfrm>
+          <a:prstGeom prst="rect">
+            <a:avLst/>
+          </a:prstGeom>
+          <a:noFill/>
+          <a:ln w="0">
+            <a:noFill/>
+          </a:ln>
+        </p:spPr>
+        <p:style>
+          <a:lnRef idx="0"/>
+          <a:fillRef idx="0"/>
+          <a:effectRef idx="0"/>
+          <a:fontRef idx="minor"/>
+        </p:style>
         <p:txBody>
           <a:bodyPr lIns="0" rIns="0" tIns="0" bIns="0" anchor="t">
-            <a:normAutofit/>
-          </a:bodyPr>
-          <a:p>
-            <a:pPr marL="432000" indent="-324000">
+            <a:normAutofit fontScale="81000"/>
+          </a:bodyPr>
+          <a:p>
+            <a:pPr marL="349920" indent="-262440">
               <a:lnSpc>
                 <a:spcPct val="100000"/>
               </a:lnSpc>
@@ -8460,23 +10194,23 @@
               <a:buChar char=""/>
             </a:pPr>
             <a:r>
-              <a:rPr b="1" lang="en-GB" sz="1600" spc="-1" strike="noStrike">
+              <a:rPr b="1" lang="en-GB" sz="2000" spc="-1" strike="noStrike">
                 <a:solidFill>
                   <a:srgbClr val="2c3e50"/>
                 </a:solidFill>
                 <a:latin typeface="Source Sans Pro Semibold"/>
               </a:rPr>
-              <a:t>Aim is to integrate the NeuroRecovery app with a MatLab Psychtoolbox Simulation</a:t>
-            </a:r>
-            <a:endParaRPr b="0" lang="en-GB" sz="1600" spc="-1" strike="noStrike">
-              <a:solidFill>
-                <a:srgbClr val="000000"/>
-              </a:solidFill>
-              <a:latin typeface="Arial"/>
-            </a:endParaRPr>
-          </a:p>
-          <a:p>
-            <a:pPr marL="432000" indent="-324000">
+              <a:t>Therapist can search patients by email</a:t>
+            </a:r>
+            <a:endParaRPr b="0" lang="en-GB" sz="2000" spc="-1" strike="noStrike">
+              <a:solidFill>
+                <a:srgbClr val="000000"/>
+              </a:solidFill>
+              <a:latin typeface="Arial"/>
+            </a:endParaRPr>
+          </a:p>
+          <a:p>
+            <a:pPr marL="349920" indent="-262440">
               <a:lnSpc>
                 <a:spcPct val="100000"/>
               </a:lnSpc>
@@ -8491,15 +10225,15 @@
               <a:buChar char=""/>
             </a:pPr>
             <a:r>
-              <a:rPr b="1" lang="en-GB" sz="1600" spc="-1" strike="noStrike">
+              <a:rPr b="1" lang="en-GB" sz="2000" spc="-1" strike="noStrike">
                 <a:solidFill>
                   <a:srgbClr val="2c3e50"/>
                 </a:solidFill>
                 <a:latin typeface="Source Sans Pro Semibold"/>
               </a:rPr>
-              <a:t>Local Python server on client triggers RDP or Local Matlab program for Psychtoolbox Simulation</a:t>
-            </a:r>
-            <a:endParaRPr b="0" lang="en-GB" sz="1600" spc="-1" strike="noStrike">
+              <a:t>Therapist can add patients and view their statistics</a:t>
+            </a:r>
+            <a:endParaRPr b="0" lang="en-GB" sz="2000" spc="-1" strike="noStrike">
               <a:solidFill>
                 <a:srgbClr val="000000"/>
               </a:solidFill>
@@ -8510,7 +10244,7 @@
       </p:sp>
       <p:pic>
         <p:nvPicPr>
-          <p:cNvPr id="125" name="" descr=""/>
+          <p:cNvPr id="122" name="" descr=""/>
           <p:cNvPicPr/>
           <p:nvPr/>
         </p:nvPicPr>
@@ -8520,20 +10254,20 @@
         </p:blipFill>
         <p:spPr>
           <a:xfrm>
-            <a:off x="213480" y="3391560"/>
-            <a:ext cx="5365800" cy="1647720"/>
-          </a:xfrm>
-          <a:prstGeom prst="rect">
-            <a:avLst/>
-          </a:prstGeom>
-          <a:ln w="10800">
+            <a:off x="540000" y="2520000"/>
+            <a:ext cx="4793040" cy="2699640"/>
+          </a:xfrm>
+          <a:prstGeom prst="rect">
+            <a:avLst/>
+          </a:prstGeom>
+          <a:ln w="0">
             <a:noFill/>
           </a:ln>
         </p:spPr>
       </p:pic>
       <p:pic>
         <p:nvPicPr>
-          <p:cNvPr id="126" name="" descr=""/>
+          <p:cNvPr id="123" name="" descr=""/>
           <p:cNvPicPr/>
           <p:nvPr/>
         </p:nvPicPr>
@@ -8543,8 +10277,8 @@
         </p:blipFill>
         <p:spPr>
           <a:xfrm>
-            <a:off x="5724720" y="3420000"/>
-            <a:ext cx="3814560" cy="1951200"/>
+            <a:off x="6300000" y="360000"/>
+            <a:ext cx="3059640" cy="3052800"/>
           </a:xfrm>
           <a:prstGeom prst="rect">
             <a:avLst/>
@@ -8556,7 +10290,7 @@
       </p:pic>
       <p:pic>
         <p:nvPicPr>
-          <p:cNvPr id="127" name="" descr=""/>
+          <p:cNvPr id="124" name="" descr=""/>
           <p:cNvPicPr/>
           <p:nvPr/>
         </p:nvPicPr>
@@ -8566,8 +10300,8 @@
         </p:blipFill>
         <p:spPr>
           <a:xfrm>
-            <a:off x="6889680" y="1260000"/>
-            <a:ext cx="2649600" cy="2134800"/>
+            <a:off x="6300000" y="3600000"/>
+            <a:ext cx="2808720" cy="1893600"/>
           </a:xfrm>
           <a:prstGeom prst="rect">
             <a:avLst/>

</xml_diff>

<commit_message>
refactor rdp launcher python
</commit_message>
<xml_diff>
--- a/report/neurorecovery_final_presentation.pptx
+++ b/report/neurorecovery_final_presentation.pptx
@@ -79,7 +79,7 @@
         <p:txBody>
           <a:bodyPr/>
           <a:p>
-            <a:fld id="{F90192C6-57B2-49B6-A247-C70792FE4DAA}" type="slidenum">
+            <a:fld id="{CCE8B087-4AAC-402D-8DC8-AE810940100E}" type="slidenum">
               <a:t>&lt;#&gt;</a:t>
             </a:fld>
           </a:p>
@@ -288,7 +288,7 @@
         <p:txBody>
           <a:bodyPr/>
           <a:p>
-            <a:fld id="{410DC0DF-6214-4CAA-8C8E-547B690E5319}" type="slidenum">
+            <a:fld id="{EB5E0EB2-9221-4553-96D9-844992779E13}" type="slidenum">
               <a:t>&lt;#&gt;</a:t>
             </a:fld>
           </a:p>
@@ -583,7 +583,7 @@
         <p:txBody>
           <a:bodyPr/>
           <a:p>
-            <a:fld id="{94F984B3-D8F8-4F38-8FAD-F9A8CBFFC30B}" type="slidenum">
+            <a:fld id="{F9A05430-DAE6-4CF5-BC88-2DC11F23A8F2}" type="slidenum">
               <a:t>&lt;#&gt;</a:t>
             </a:fld>
           </a:p>
@@ -964,7 +964,7 @@
         <p:txBody>
           <a:bodyPr/>
           <a:p>
-            <a:fld id="{C6E32D25-718B-4A60-B791-E7A627AFC53B}" type="slidenum">
+            <a:fld id="{35958C4C-2DAF-4CD5-8E58-886A20CD3E89}" type="slidenum">
               <a:t>&lt;#&gt;</a:t>
             </a:fld>
           </a:p>
@@ -2104,7 +2104,7 @@
         <p:txBody>
           <a:bodyPr/>
           <a:p>
-            <a:fld id="{232969BB-089D-492E-B3A8-2EE394CDBBFD}" type="slidenum">
+            <a:fld id="{D9EB1B93-9676-4DE3-A746-031351A16955}" type="slidenum">
               <a:t>&lt;#&gt;</a:t>
             </a:fld>
           </a:p>
@@ -3559,7 +3559,7 @@
         <p:txBody>
           <a:bodyPr/>
           <a:p>
-            <a:fld id="{2E8CC0F7-BFEC-4676-87B6-C89151760CB4}" type="slidenum">
+            <a:fld id="{B0FB0833-B7D4-48A3-9C29-7DAE82513DBC}" type="slidenum">
               <a:t>&lt;#&gt;</a:t>
             </a:fld>
           </a:p>
@@ -3768,7 +3768,7 @@
         <p:txBody>
           <a:bodyPr/>
           <a:p>
-            <a:fld id="{1823DC01-812B-4185-838F-4E855C25C5AA}" type="slidenum">
+            <a:fld id="{534FBD82-EA87-48FE-8C55-0F4073750901}" type="slidenum">
               <a:t>&lt;#&gt;</a:t>
             </a:fld>
           </a:p>
@@ -3891,7 +3891,7 @@
         <p:txBody>
           <a:bodyPr/>
           <a:p>
-            <a:fld id="{256C3DE0-5F15-46F0-8AF4-0315653F1468}" type="slidenum">
+            <a:fld id="{E019F88C-D8EB-49D6-8A68-7B4192A90C67}" type="slidenum">
               <a:t>&lt;#&gt;</a:t>
             </a:fld>
           </a:p>
@@ -4012,7 +4012,7 @@
         <p:txBody>
           <a:bodyPr/>
           <a:p>
-            <a:fld id="{76E162F9-EC7B-4AE7-82D6-723A586BDC14}" type="slidenum">
+            <a:fld id="{E7CE0AF3-9250-419A-AE77-6BA6EA5A1E35}" type="slidenum">
               <a:t>&lt;#&gt;</a:t>
             </a:fld>
           </a:p>
@@ -4264,7 +4264,7 @@
         <p:txBody>
           <a:bodyPr/>
           <a:p>
-            <a:fld id="{EFDB38AB-CDB7-4528-B6B1-FB7BE4098451}" type="slidenum">
+            <a:fld id="{F577A3B5-99A6-4D4C-8BFC-533C7A28307E}" type="slidenum">
               <a:t>&lt;#&gt;</a:t>
             </a:fld>
           </a:p>
@@ -4516,7 +4516,7 @@
         <p:txBody>
           <a:bodyPr/>
           <a:p>
-            <a:fld id="{ECA7F4D4-03CD-40B6-88D6-06877E68B8EA}" type="slidenum">
+            <a:fld id="{5A4A383A-12FD-46BC-8266-3FFA005B7822}" type="slidenum">
               <a:t>&lt;#&gt;</a:t>
             </a:fld>
           </a:p>
@@ -4768,7 +4768,7 @@
         <p:txBody>
           <a:bodyPr/>
           <a:p>
-            <a:fld id="{4BDEC060-C9D8-4B54-A824-5133C9A81594}" type="slidenum">
+            <a:fld id="{A9E34B7D-0E94-4A0C-B493-34790C4F6A2D}" type="slidenum">
               <a:t>&lt;#&gt;</a:t>
             </a:fld>
           </a:p>
@@ -4826,7 +4826,7 @@
         <p:spPr>
           <a:xfrm>
             <a:off x="0" y="0"/>
-            <a:ext cx="10078920" cy="5668920"/>
+            <a:ext cx="10078560" cy="5668560"/>
           </a:xfrm>
           <a:prstGeom prst="rect">
             <a:avLst/>
@@ -4873,7 +4873,7 @@
         <p:spPr>
           <a:xfrm>
             <a:off x="0" y="0"/>
-            <a:ext cx="10078920" cy="3778920"/>
+            <a:ext cx="10078560" cy="3778560"/>
           </a:xfrm>
           <a:prstGeom prst="rect">
             <a:avLst/>
@@ -4927,7 +4927,7 @@
         <p:spPr>
           <a:xfrm>
             <a:off x="3420000" y="5400000"/>
-            <a:ext cx="3238920" cy="268920"/>
+            <a:ext cx="3238560" cy="268560"/>
           </a:xfrm>
           <a:prstGeom prst="rect">
             <a:avLst/>
@@ -4999,7 +4999,7 @@
         <p:spPr>
           <a:xfrm>
             <a:off x="9180000" y="5130000"/>
-            <a:ext cx="718920" cy="538920"/>
+            <a:ext cx="718560" cy="538560"/>
           </a:xfrm>
           <a:prstGeom prst="rect">
             <a:avLst/>
@@ -5040,7 +5040,7 @@
                 <a:tab algn="l" pos="0"/>
               </a:tabLst>
             </a:pPr>
-            <a:fld id="{872D9A3F-6B35-4640-B552-1B9CE7E80159}" type="slidenum">
+            <a:fld id="{853B76FA-4814-4EB6-8F37-1F940B8EAF61}" type="slidenum">
               <a:rPr b="1" lang="en-GB" sz="1800" spc="-1" strike="noStrike">
                 <a:solidFill>
                   <a:srgbClr val="ffffff"/>
@@ -5071,7 +5071,7 @@
         <p:spPr>
           <a:xfrm>
             <a:off x="360000" y="5400000"/>
-            <a:ext cx="2878920" cy="268920"/>
+            <a:ext cx="2878560" cy="268560"/>
           </a:xfrm>
           <a:prstGeom prst="rect">
             <a:avLst/>
@@ -5156,7 +5156,16 @@
                 </a:solidFill>
                 <a:latin typeface="Arial"/>
               </a:rPr>
-              <a:t>Click to edit the title text format</a:t>
+              <a:t>Click to edit the title </a:t>
+            </a:r>
+            <a:r>
+              <a:rPr b="0" lang="en-GB" sz="4400" spc="-1" strike="noStrike">
+                <a:solidFill>
+                  <a:srgbClr val="000000"/>
+                </a:solidFill>
+                <a:latin typeface="Arial"/>
+              </a:rPr>
+              <a:t>text format</a:t>
             </a:r>
             <a:endParaRPr b="0" lang="en-GB" sz="4400" spc="-1" strike="noStrike">
               <a:solidFill>
@@ -5438,7 +5447,7 @@
         <p:spPr>
           <a:xfrm>
             <a:off x="0" y="5400000"/>
-            <a:ext cx="10078920" cy="268920"/>
+            <a:ext cx="10078560" cy="268560"/>
           </a:xfrm>
           <a:prstGeom prst="rect">
             <a:avLst/>
@@ -5485,7 +5494,7 @@
         <p:spPr>
           <a:xfrm>
             <a:off x="0" y="0"/>
-            <a:ext cx="10078920" cy="1213920"/>
+            <a:ext cx="10078560" cy="1213560"/>
           </a:xfrm>
           <a:prstGeom prst="rect">
             <a:avLst/>
@@ -5532,7 +5541,7 @@
         <p:spPr>
           <a:xfrm>
             <a:off x="9315000" y="5175000"/>
-            <a:ext cx="448920" cy="448920"/>
+            <a:ext cx="448560" cy="448560"/>
           </a:xfrm>
           <a:prstGeom prst="ellipse">
             <a:avLst/>
@@ -5582,7 +5591,7 @@
         <p:spPr>
           <a:xfrm>
             <a:off x="9180000" y="5130000"/>
-            <a:ext cx="718920" cy="538920"/>
+            <a:ext cx="718560" cy="538560"/>
           </a:xfrm>
           <a:prstGeom prst="rect">
             <a:avLst/>
@@ -5608,7 +5617,7 @@
                 <a:spcPct val="100000"/>
               </a:lnSpc>
             </a:pPr>
-            <a:fld id="{94F93165-EAAA-4D38-A48F-F50B7AAD9792}" type="slidenum">
+            <a:fld id="{5290640D-3AD4-4466-98CA-FB74FAB23BFF}" type="slidenum">
               <a:rPr b="1" lang="en-GB" sz="1800" spc="-1" strike="noStrike">
                 <a:solidFill>
                   <a:srgbClr val="ffffff"/>
@@ -5640,7 +5649,7 @@
         <p:spPr>
           <a:xfrm>
             <a:off x="3420000" y="5400000"/>
-            <a:ext cx="3238920" cy="268920"/>
+            <a:ext cx="3238560" cy="268560"/>
           </a:xfrm>
           <a:prstGeom prst="rect">
             <a:avLst/>
@@ -5712,7 +5721,7 @@
         <p:spPr>
           <a:xfrm>
             <a:off x="360000" y="5400000"/>
-            <a:ext cx="2878920" cy="268920"/>
+            <a:ext cx="2878560" cy="268560"/>
           </a:xfrm>
           <a:prstGeom prst="rect">
             <a:avLst/>
@@ -6083,7 +6092,7 @@
         <p:spPr>
           <a:xfrm>
             <a:off x="360000" y="2880000"/>
-            <a:ext cx="9358920" cy="717840"/>
+            <a:ext cx="9358560" cy="717480"/>
           </a:xfrm>
           <a:prstGeom prst="rect">
             <a:avLst/>
@@ -6138,7 +6147,7 @@
         <p:spPr>
           <a:xfrm>
             <a:off x="360000" y="3915000"/>
-            <a:ext cx="9358920" cy="1483920"/>
+            <a:ext cx="9358560" cy="1483560"/>
           </a:xfrm>
           <a:prstGeom prst="rect">
             <a:avLst/>
@@ -6169,7 +6178,16 @@
                 </a:solidFill>
                 <a:latin typeface="Source Sans Pro"/>
               </a:rPr>
-              <a:t>The NeuroRecovery App assists post-stroke patients with their recovery through a web application</a:t>
+              <a:t>The NeuroRecovery App assists post-stroke patients with their recovery </a:t>
+            </a:r>
+            <a:r>
+              <a:rPr b="0" lang="en-GB" sz="2200" spc="-1" strike="noStrike">
+                <a:solidFill>
+                  <a:srgbClr val="ffffff"/>
+                </a:solidFill>
+                <a:latin typeface="Source Sans Pro"/>
+              </a:rPr>
+              <a:t>through a web application</a:t>
             </a:r>
             <a:endParaRPr b="0" lang="en-GB" sz="2200" spc="-1" strike="noStrike">
               <a:solidFill>
@@ -6193,7 +6211,7 @@
         <p:spPr>
           <a:xfrm>
             <a:off x="2458440" y="118080"/>
-            <a:ext cx="5280480" cy="2940840"/>
+            <a:ext cx="5280120" cy="2940480"/>
           </a:xfrm>
           <a:prstGeom prst="rect">
             <a:avLst/>
@@ -6246,7 +6264,7 @@
         <p:spPr>
           <a:xfrm>
             <a:off x="360000" y="225720"/>
-            <a:ext cx="9358920" cy="717840"/>
+            <a:ext cx="9358560" cy="717480"/>
           </a:xfrm>
           <a:prstGeom prst="rect">
             <a:avLst/>
@@ -6301,7 +6319,7 @@
         <p:spPr>
           <a:xfrm>
             <a:off x="360000" y="1485000"/>
-            <a:ext cx="5579280" cy="1934280"/>
+            <a:ext cx="5578920" cy="1933920"/>
           </a:xfrm>
           <a:prstGeom prst="rect">
             <a:avLst/>
@@ -6337,7 +6355,7 @@
                 </a:solidFill>
                 <a:latin typeface="Source Sans Pro Semibold"/>
               </a:rPr>
-              <a:t>Aim is to integrate the NeuroRecovery app with a MatLab Psychtoolbox Simulation</a:t>
+              <a:t>NeuroRecovery app provides a frontend button to reach MatLab Psychtoolbox Simulation</a:t>
             </a:r>
             <a:endParaRPr b="0" lang="en-GB" sz="1600" spc="-1" strike="noStrike">
               <a:solidFill>
@@ -6368,7 +6386,7 @@
                 </a:solidFill>
                 <a:latin typeface="Source Sans Pro Semibold"/>
               </a:rPr>
-              <a:t>Local Python server on client triggers RDP or Local Matlab program for Psychtoolbox Simulation</a:t>
+              <a:t>Local Python server on client triggers QuickAssist, RDP or Local Matlab program for Psychtoolbox Simulation</a:t>
             </a:r>
             <a:endParaRPr b="0" lang="en-GB" sz="1600" spc="-1" strike="noStrike">
               <a:solidFill>
@@ -6391,13 +6409,13 @@
         </p:blipFill>
         <p:spPr>
           <a:xfrm>
-            <a:off x="213480" y="3391560"/>
-            <a:ext cx="5365800" cy="1647720"/>
-          </a:xfrm>
-          <a:prstGeom prst="rect">
-            <a:avLst/>
-          </a:prstGeom>
-          <a:ln w="10800">
+            <a:off x="7380000" y="745560"/>
+            <a:ext cx="2649240" cy="2134440"/>
+          </a:xfrm>
+          <a:prstGeom prst="rect">
+            <a:avLst/>
+          </a:prstGeom>
+          <a:ln w="0">
             <a:noFill/>
           </a:ln>
         </p:spPr>
@@ -6414,8 +6432,8 @@
         </p:blipFill>
         <p:spPr>
           <a:xfrm>
-            <a:off x="5724720" y="3420000"/>
-            <a:ext cx="3814560" cy="1951200"/>
+            <a:off x="720000" y="2933640"/>
+            <a:ext cx="3600000" cy="2646360"/>
           </a:xfrm>
           <a:prstGeom prst="rect">
             <a:avLst/>
@@ -6437,8 +6455,8 @@
         </p:blipFill>
         <p:spPr>
           <a:xfrm>
-            <a:off x="6889680" y="1260000"/>
-            <a:ext cx="2649600" cy="2134800"/>
+            <a:off x="6120000" y="2894400"/>
+            <a:ext cx="3785040" cy="2325600"/>
           </a:xfrm>
           <a:prstGeom prst="rect">
             <a:avLst/>
@@ -6491,7 +6509,7 @@
         <p:spPr>
           <a:xfrm>
             <a:off x="360000" y="225720"/>
-            <a:ext cx="9358920" cy="717840"/>
+            <a:ext cx="9358560" cy="717480"/>
           </a:xfrm>
           <a:prstGeom prst="rect">
             <a:avLst/>
@@ -6546,7 +6564,7 @@
         <p:spPr>
           <a:xfrm>
             <a:off x="360000" y="1485000"/>
-            <a:ext cx="9358920" cy="3778920"/>
+            <a:ext cx="9358560" cy="3778560"/>
           </a:xfrm>
           <a:prstGeom prst="rect">
             <a:avLst/>
@@ -6675,25 +6693,7 @@
                 </a:solidFill>
                 <a:latin typeface="Source Sans Pro Semibold"/>
               </a:rPr>
-              <a:t>Hosted in a Kubernetes Cluster(K3s) </a:t>
-            </a:r>
-            <a:r>
-              <a:rPr b="1" lang="en-GB" sz="2400" spc="-1" strike="noStrike">
-                <a:solidFill>
-                  <a:srgbClr val="2c3e50"/>
-                </a:solidFill>
-                <a:latin typeface="Source Sans Pro Semibold"/>
-              </a:rPr>
-              <a:t>running in an Azure RHEL Virtual </a:t>
-            </a:r>
-            <a:r>
-              <a:rPr b="1" lang="en-GB" sz="2400" spc="-1" strike="noStrike">
-                <a:solidFill>
-                  <a:srgbClr val="2c3e50"/>
-                </a:solidFill>
-                <a:latin typeface="Source Sans Pro Semibold"/>
-              </a:rPr>
-              <a:t>Machine</a:t>
+              <a:t>Hosted in a Kubernetes Cluster(K3s) running in an Azure RHEL Virtual Machine</a:t>
             </a:r>
             <a:endParaRPr b="0" lang="en-GB" sz="2400" spc="-1" strike="noStrike">
               <a:solidFill>
@@ -6724,16 +6724,7 @@
                 </a:solidFill>
                 <a:latin typeface="Source Sans Pro Semibold"/>
               </a:rPr>
-              <a:t>Tilt CI/CD is ran in the VM to provision </a:t>
-            </a:r>
-            <a:r>
-              <a:rPr b="1" lang="en-GB" sz="2400" spc="-1" strike="noStrike">
-                <a:solidFill>
-                  <a:srgbClr val="2c3e50"/>
-                </a:solidFill>
-                <a:latin typeface="Source Sans Pro Semibold"/>
-              </a:rPr>
-              <a:t>the full app</a:t>
+              <a:t>Tilt CI/CD is ran in the VM to provision the full app</a:t>
             </a:r>
             <a:endParaRPr b="0" lang="en-GB" sz="2400" spc="-1" strike="noStrike">
               <a:solidFill>
@@ -6787,7 +6778,7 @@
         <p:spPr>
           <a:xfrm>
             <a:off x="360000" y="225720"/>
-            <a:ext cx="9358920" cy="717840"/>
+            <a:ext cx="9358560" cy="717480"/>
           </a:xfrm>
           <a:prstGeom prst="rect">
             <a:avLst/>
@@ -6842,7 +6833,7 @@
         <p:spPr>
           <a:xfrm>
             <a:off x="360000" y="1485000"/>
-            <a:ext cx="5220000" cy="3735000"/>
+            <a:ext cx="5219640" cy="3734640"/>
           </a:xfrm>
           <a:prstGeom prst="rect">
             <a:avLst/>
@@ -6995,7 +6986,7 @@
         <p:spPr>
           <a:xfrm>
             <a:off x="6120000" y="217080"/>
-            <a:ext cx="1800000" cy="2842920"/>
+            <a:ext cx="1799640" cy="2842560"/>
           </a:xfrm>
           <a:prstGeom prst="rect">
             <a:avLst/>
@@ -7018,7 +7009,7 @@
         <p:spPr>
           <a:xfrm>
             <a:off x="5682240" y="3157560"/>
-            <a:ext cx="3467880" cy="2422440"/>
+            <a:ext cx="3467520" cy="2422080"/>
           </a:xfrm>
           <a:prstGeom prst="rect">
             <a:avLst/>
@@ -7071,7 +7062,7 @@
         <p:spPr>
           <a:xfrm>
             <a:off x="360000" y="225720"/>
-            <a:ext cx="9358920" cy="717840"/>
+            <a:ext cx="9358560" cy="717480"/>
           </a:xfrm>
           <a:prstGeom prst="rect">
             <a:avLst/>
@@ -7126,7 +7117,7 @@
         <p:spPr>
           <a:xfrm>
             <a:off x="360000" y="1485000"/>
-            <a:ext cx="4860000" cy="3735000"/>
+            <a:ext cx="4859640" cy="3734640"/>
           </a:xfrm>
           <a:prstGeom prst="rect">
             <a:avLst/>
@@ -7193,16 +7184,7 @@
                 </a:solidFill>
                 <a:latin typeface="Source Sans Pro Semibold"/>
               </a:rPr>
-              <a:t>Structs dictate request and response data, which </a:t>
-            </a:r>
-            <a:r>
-              <a:rPr b="1" lang="en-GB" sz="1600" spc="-1" strike="noStrike">
-                <a:solidFill>
-                  <a:srgbClr val="2c3e50"/>
-                </a:solidFill>
-                <a:latin typeface="Source Sans Pro Semibold"/>
-              </a:rPr>
-              <a:t>is serialised and deserialised as JSON</a:t>
+              <a:t>Structs dictate request and response data, which is serialised and deserialised as JSON</a:t>
             </a:r>
             <a:endParaRPr b="0" lang="en-GB" sz="1600" spc="-1" strike="noStrike">
               <a:solidFill>
@@ -7233,16 +7215,7 @@
                 </a:solidFill>
                 <a:latin typeface="Source Sans Pro Semibold"/>
               </a:rPr>
-              <a:t>Uses mongodb Rust crate for database </a:t>
-            </a:r>
-            <a:r>
-              <a:rPr b="1" lang="en-GB" sz="1600" spc="-1" strike="noStrike">
-                <a:solidFill>
-                  <a:srgbClr val="2c3e50"/>
-                </a:solidFill>
-                <a:latin typeface="Source Sans Pro Semibold"/>
-              </a:rPr>
-              <a:t>interaction</a:t>
+              <a:t>Uses mongodb Rust crate for database interaction</a:t>
             </a:r>
             <a:endParaRPr b="0" lang="en-GB" sz="1600" spc="-1" strike="noStrike">
               <a:solidFill>
@@ -7273,16 +7246,7 @@
                 </a:solidFill>
                 <a:latin typeface="Source Sans Pro Semibold"/>
               </a:rPr>
-              <a:t>Frontend sends requests to the backend defined </a:t>
-            </a:r>
-            <a:r>
-              <a:rPr b="1" lang="en-GB" sz="1600" spc="-1" strike="noStrike">
-                <a:solidFill>
-                  <a:srgbClr val="2c3e50"/>
-                </a:solidFill>
-                <a:latin typeface="Source Sans Pro Semibold"/>
-              </a:rPr>
-              <a:t>HTTP endpoints</a:t>
+              <a:t>Frontend sends requests to the backend defined HTTP endpoints</a:t>
             </a:r>
             <a:endParaRPr b="0" lang="en-GB" sz="1600" spc="-1" strike="noStrike">
               <a:solidFill>
@@ -7306,7 +7270,7 @@
         <p:spPr>
           <a:xfrm>
             <a:off x="5580000" y="720000"/>
-            <a:ext cx="3426120" cy="4261680"/>
+            <a:ext cx="3425760" cy="4261320"/>
           </a:xfrm>
           <a:prstGeom prst="rect">
             <a:avLst/>
@@ -7359,7 +7323,7 @@
         <p:spPr>
           <a:xfrm>
             <a:off x="360000" y="225720"/>
-            <a:ext cx="9358920" cy="717840"/>
+            <a:ext cx="9358560" cy="717480"/>
           </a:xfrm>
           <a:prstGeom prst="rect">
             <a:avLst/>
@@ -7414,7 +7378,7 @@
         <p:spPr>
           <a:xfrm>
             <a:off x="360000" y="1485000"/>
-            <a:ext cx="4860000" cy="3735000"/>
+            <a:ext cx="4859640" cy="3734640"/>
           </a:xfrm>
           <a:prstGeom prst="rect">
             <a:avLst/>
@@ -7450,16 +7414,7 @@
                 </a:solidFill>
                 <a:latin typeface="Source Sans Pro Semibold"/>
               </a:rPr>
-              <a:t>No explicit database schema is required as </a:t>
-            </a:r>
-            <a:r>
-              <a:rPr b="1" lang="en-GB" sz="1600" spc="-1" strike="noStrike">
-                <a:solidFill>
-                  <a:srgbClr val="2c3e50"/>
-                </a:solidFill>
-                <a:latin typeface="Source Sans Pro Semibold"/>
-              </a:rPr>
-              <a:t>MongoDB is a NoSQL database</a:t>
+              <a:t>No explicit database schema is required as MongoDB is a NoSQL database</a:t>
             </a:r>
             <a:endParaRPr b="0" lang="en-GB" sz="1600" spc="-1" strike="noStrike">
               <a:solidFill>
@@ -7490,16 +7445,7 @@
                 </a:solidFill>
                 <a:latin typeface="Source Sans Pro Semibold"/>
               </a:rPr>
-              <a:t>Rust structs define the data structures that </a:t>
-            </a:r>
-            <a:r>
-              <a:rPr b="1" lang="en-GB" sz="1600" spc="-1" strike="noStrike">
-                <a:solidFill>
-                  <a:srgbClr val="2c3e50"/>
-                </a:solidFill>
-                <a:latin typeface="Source Sans Pro Semibold"/>
-              </a:rPr>
-              <a:t>are stored in the database</a:t>
+              <a:t>Rust structs define the data structures that are stored in the database</a:t>
             </a:r>
             <a:endParaRPr b="0" lang="en-GB" sz="1600" spc="-1" strike="noStrike">
               <a:solidFill>
@@ -7530,34 +7476,7 @@
                 </a:solidFill>
                 <a:latin typeface="Source Sans Pro Semibold"/>
               </a:rPr>
-              <a:t>Only the backend server interacts with the </a:t>
-            </a:r>
-            <a:r>
-              <a:rPr b="1" lang="en-GB" sz="1600" spc="-1" strike="noStrike">
-                <a:solidFill>
-                  <a:srgbClr val="2c3e50"/>
-                </a:solidFill>
-                <a:latin typeface="Source Sans Pro Semibold"/>
-              </a:rPr>
-              <a:t>MongoDB database. It is not exposed to the </a:t>
-            </a:r>
-            <a:r>
-              <a:rPr b="1" lang="en-GB" sz="1600" spc="-1" strike="noStrike">
-                <a:solidFill>
-                  <a:srgbClr val="2c3e50"/>
-                </a:solidFill>
-                <a:latin typeface="Source Sans Pro Semibold"/>
-              </a:rPr>
-              <a:t>internet and is only accessible from within the </a:t>
-            </a:r>
-            <a:r>
-              <a:rPr b="1" lang="en-GB" sz="1600" spc="-1" strike="noStrike">
-                <a:solidFill>
-                  <a:srgbClr val="2c3e50"/>
-                </a:solidFill>
-                <a:latin typeface="Source Sans Pro Semibold"/>
-              </a:rPr>
-              <a:t>Kubernetes cluster</a:t>
+              <a:t>Only the backend server interacts with the MongoDB database. It is not exposed to the internet and is only accessible from within the Kubernetes cluster</a:t>
             </a:r>
             <a:endParaRPr b="0" lang="en-GB" sz="1600" spc="-1" strike="noStrike">
               <a:solidFill>
@@ -7581,7 +7500,7 @@
         <p:spPr>
           <a:xfrm>
             <a:off x="5400000" y="360000"/>
-            <a:ext cx="4495680" cy="3171960"/>
+            <a:ext cx="4495320" cy="3171600"/>
           </a:xfrm>
           <a:prstGeom prst="rect">
             <a:avLst/>
@@ -7604,7 +7523,7 @@
         <p:spPr>
           <a:xfrm>
             <a:off x="5445360" y="3600000"/>
-            <a:ext cx="2294640" cy="1925640"/>
+            <a:ext cx="2294280" cy="1925280"/>
           </a:xfrm>
           <a:prstGeom prst="rect">
             <a:avLst/>
@@ -7657,7 +7576,7 @@
         <p:spPr>
           <a:xfrm>
             <a:off x="360000" y="225720"/>
-            <a:ext cx="9358920" cy="717840"/>
+            <a:ext cx="9358560" cy="717480"/>
           </a:xfrm>
           <a:prstGeom prst="rect">
             <a:avLst/>
@@ -7712,7 +7631,7 @@
         <p:spPr>
           <a:xfrm>
             <a:off x="360000" y="1485000"/>
-            <a:ext cx="4860000" cy="3735000"/>
+            <a:ext cx="4859640" cy="3734640"/>
           </a:xfrm>
           <a:prstGeom prst="rect">
             <a:avLst/>
@@ -7865,7 +7784,7 @@
         <p:spPr>
           <a:xfrm>
             <a:off x="5580000" y="943560"/>
-            <a:ext cx="4319280" cy="1454040"/>
+            <a:ext cx="4318920" cy="1453680"/>
           </a:xfrm>
           <a:prstGeom prst="rect">
             <a:avLst/>
@@ -7888,7 +7807,7 @@
         <p:spPr>
           <a:xfrm>
             <a:off x="5220000" y="2700000"/>
-            <a:ext cx="4811040" cy="2340000"/>
+            <a:ext cx="4810680" cy="2339640"/>
           </a:xfrm>
           <a:prstGeom prst="rect">
             <a:avLst/>
@@ -7941,7 +7860,7 @@
         <p:spPr>
           <a:xfrm>
             <a:off x="360000" y="225720"/>
-            <a:ext cx="9358920" cy="717840"/>
+            <a:ext cx="9358560" cy="717480"/>
           </a:xfrm>
           <a:prstGeom prst="rect">
             <a:avLst/>
@@ -7996,7 +7915,7 @@
         <p:spPr>
           <a:xfrm>
             <a:off x="360000" y="1485000"/>
-            <a:ext cx="4860000" cy="3735000"/>
+            <a:ext cx="4859640" cy="3734640"/>
           </a:xfrm>
           <a:prstGeom prst="rect">
             <a:avLst/>
@@ -8032,16 +7951,7 @@
                 </a:solidFill>
                 <a:latin typeface="Source Sans Pro Semibold"/>
               </a:rPr>
-              <a:t>While Kubernetes and containers provide a solution for running a resilient app deployment, </a:t>
-            </a:r>
-            <a:r>
-              <a:rPr b="1" lang="en-GB" sz="1600" spc="-1" strike="noStrike">
-                <a:solidFill>
-                  <a:srgbClr val="2c3e50"/>
-                </a:solidFill>
-                <a:latin typeface="Source Sans Pro Semibold"/>
-              </a:rPr>
-              <a:t>they do not provide a way to boot all of it up automatically</a:t>
+              <a:t>While Kubernetes and containers provide a solution for running a resilient app deployment, they do not provide a way to boot all of it up automatically</a:t>
             </a:r>
             <a:endParaRPr b="0" lang="en-GB" sz="1600" spc="-1" strike="noStrike">
               <a:solidFill>
@@ -8103,16 +8013,7 @@
                 </a:solidFill>
                 <a:latin typeface="Source Sans Pro Semibold"/>
               </a:rPr>
-              <a:t>Once running, an admin accessing the Tilt CI/CD dashboard can rebuild each microservice </a:t>
-            </a:r>
-            <a:r>
-              <a:rPr b="1" lang="en-GB" sz="1600" spc="-1" strike="noStrike">
-                <a:solidFill>
-                  <a:srgbClr val="2c3e50"/>
-                </a:solidFill>
-                <a:latin typeface="Source Sans Pro Semibold"/>
-              </a:rPr>
-              <a:t>with a click. This allows for fast developer feedback after making code changes.</a:t>
+              <a:t>Once running, an admin accessing the Tilt CI/CD dashboard can rebuild each microservice with a click. This allows for fast developer feedback after making code changes.</a:t>
             </a:r>
             <a:endParaRPr b="0" lang="en-GB" sz="1600" spc="-1" strike="noStrike">
               <a:solidFill>
@@ -8167,7 +8068,7 @@
         <p:spPr>
           <a:xfrm>
             <a:off x="5760000" y="704880"/>
-            <a:ext cx="3939480" cy="4335120"/>
+            <a:ext cx="3939120" cy="4334760"/>
           </a:xfrm>
           <a:prstGeom prst="rect">
             <a:avLst/>
@@ -8220,7 +8121,7 @@
         <p:spPr>
           <a:xfrm>
             <a:off x="360000" y="225720"/>
-            <a:ext cx="9358920" cy="717840"/>
+            <a:ext cx="9358560" cy="717480"/>
           </a:xfrm>
           <a:prstGeom prst="rect">
             <a:avLst/>
@@ -8275,7 +8176,7 @@
         <p:spPr>
           <a:xfrm>
             <a:off x="360000" y="1485000"/>
-            <a:ext cx="9358920" cy="3778920"/>
+            <a:ext cx="9358560" cy="3778560"/>
           </a:xfrm>
           <a:prstGeom prst="rect">
             <a:avLst/>
@@ -8311,16 +8212,7 @@
                 </a:solidFill>
                 <a:latin typeface="Source Sans Pro Semibold"/>
               </a:rPr>
-              <a:t>Login/Register system with </a:t>
-            </a:r>
-            <a:r>
-              <a:rPr b="1" lang="en-GB" sz="2400" spc="-1" strike="noStrike">
-                <a:solidFill>
-                  <a:srgbClr val="2c3e50"/>
-                </a:solidFill>
-                <a:latin typeface="Source Sans Pro Semibold"/>
-              </a:rPr>
-              <a:t>password hashing</a:t>
+              <a:t>Login/Register system with password hashing</a:t>
             </a:r>
             <a:endParaRPr b="0" lang="en-GB" sz="2400" spc="-1" strike="noStrike">
               <a:solidFill>
@@ -8413,16 +8305,7 @@
                 </a:solidFill>
                 <a:latin typeface="Source Sans Pro Semibold"/>
               </a:rPr>
-              <a:t>Patient and therapist user </a:t>
-            </a:r>
-            <a:r>
-              <a:rPr b="1" lang="en-GB" sz="2400" spc="-1" strike="noStrike">
-                <a:solidFill>
-                  <a:srgbClr val="2c3e50"/>
-                </a:solidFill>
-                <a:latin typeface="Source Sans Pro Semibold"/>
-              </a:rPr>
-              <a:t>data forms</a:t>
+              <a:t>Patient and therapist user data forms</a:t>
             </a:r>
             <a:endParaRPr b="0" lang="en-GB" sz="2400" spc="-1" strike="noStrike">
               <a:solidFill>
@@ -8484,16 +8367,7 @@
                 </a:solidFill>
                 <a:latin typeface="Source Sans Pro Semibold"/>
               </a:rPr>
-              <a:t>Exercise recommendations </a:t>
-            </a:r>
-            <a:r>
-              <a:rPr b="1" lang="en-GB" sz="2400" spc="-1" strike="noStrike">
-                <a:solidFill>
-                  <a:srgbClr val="2c3e50"/>
-                </a:solidFill>
-                <a:latin typeface="Source Sans Pro Semibold"/>
-              </a:rPr>
-              <a:t>based on user data</a:t>
+              <a:t>Exercise recommendations based on user data</a:t>
             </a:r>
             <a:endParaRPr b="0" lang="en-GB" sz="2400" spc="-1" strike="noStrike">
               <a:solidFill>
@@ -8555,16 +8429,7 @@
                 </a:solidFill>
                 <a:latin typeface="Source Sans Pro Semibold"/>
               </a:rPr>
-              <a:t>Matlab Psychtoolbox </a:t>
-            </a:r>
-            <a:r>
-              <a:rPr b="1" lang="en-GB" sz="2400" spc="-1" strike="noStrike">
-                <a:solidFill>
-                  <a:srgbClr val="2c3e50"/>
-                </a:solidFill>
-                <a:latin typeface="Source Sans Pro Semibold"/>
-              </a:rPr>
-              <a:t>simulation connection</a:t>
+              <a:t>Matlab Psychtoolbox simulation connection</a:t>
             </a:r>
             <a:endParaRPr b="0" lang="en-GB" sz="2400" spc="-1" strike="noStrike">
               <a:solidFill>
@@ -8618,7 +8483,7 @@
         <p:spPr>
           <a:xfrm>
             <a:off x="360000" y="225720"/>
-            <a:ext cx="9358920" cy="718920"/>
+            <a:ext cx="9358560" cy="718560"/>
           </a:xfrm>
           <a:prstGeom prst="rect">
             <a:avLst/>
@@ -8673,7 +8538,7 @@
         <p:spPr>
           <a:xfrm>
             <a:off x="180000" y="1485000"/>
-            <a:ext cx="6479280" cy="1394280"/>
+            <a:ext cx="6478920" cy="1393920"/>
           </a:xfrm>
           <a:prstGeom prst="rect">
             <a:avLst/>
@@ -8795,7 +8660,7 @@
         <p:spPr>
           <a:xfrm>
             <a:off x="543600" y="2700000"/>
-            <a:ext cx="5395320" cy="2519280"/>
+            <a:ext cx="5394960" cy="2518920"/>
           </a:xfrm>
           <a:prstGeom prst="rect">
             <a:avLst/>
@@ -8818,7 +8683,7 @@
         <p:spPr>
           <a:xfrm>
             <a:off x="6480000" y="900000"/>
-            <a:ext cx="3419280" cy="4221000"/>
+            <a:ext cx="3418920" cy="4220640"/>
           </a:xfrm>
           <a:prstGeom prst="rect">
             <a:avLst/>
@@ -8871,7 +8736,7 @@
         <p:spPr>
           <a:xfrm>
             <a:off x="360000" y="225720"/>
-            <a:ext cx="9358920" cy="717840"/>
+            <a:ext cx="9358560" cy="717480"/>
           </a:xfrm>
           <a:prstGeom prst="rect">
             <a:avLst/>
@@ -8926,7 +8791,7 @@
         <p:spPr>
           <a:xfrm>
             <a:off x="360000" y="1485000"/>
-            <a:ext cx="5939280" cy="1214280"/>
+            <a:ext cx="5938920" cy="1213920"/>
           </a:xfrm>
           <a:prstGeom prst="rect">
             <a:avLst/>
@@ -8962,16 +8827,7 @@
                 </a:solidFill>
                 <a:latin typeface="Source Sans Pro Semibold"/>
               </a:rPr>
-              <a:t>Looped video clips of the exercise </a:t>
-            </a:r>
-            <a:r>
-              <a:rPr b="1" lang="en-GB" sz="2000" spc="-1" strike="noStrike">
-                <a:solidFill>
-                  <a:srgbClr val="2c3e50"/>
-                </a:solidFill>
-                <a:latin typeface="Source Sans Pro Semibold"/>
-              </a:rPr>
-              <a:t>being demonstrated</a:t>
+              <a:t>Looped video clips of the exercise being demonstrated</a:t>
             </a:r>
             <a:endParaRPr b="0" lang="en-GB" sz="2000" spc="-1" strike="noStrike">
               <a:solidFill>
@@ -9002,25 +8858,7 @@
                 </a:solidFill>
                 <a:latin typeface="Source Sans Pro Semibold"/>
               </a:rPr>
-              <a:t>Countdown timer on each exercise </a:t>
-            </a:r>
-            <a:r>
-              <a:rPr b="1" lang="en-GB" sz="2000" spc="-1" strike="noStrike">
-                <a:solidFill>
-                  <a:srgbClr val="2c3e50"/>
-                </a:solidFill>
-                <a:latin typeface="Source Sans Pro Semibold"/>
-              </a:rPr>
-              <a:t>before “Next Exercise” can be </a:t>
-            </a:r>
-            <a:r>
-              <a:rPr b="1" lang="en-GB" sz="2000" spc="-1" strike="noStrike">
-                <a:solidFill>
-                  <a:srgbClr val="2c3e50"/>
-                </a:solidFill>
-                <a:latin typeface="Source Sans Pro Semibold"/>
-              </a:rPr>
-              <a:t>clicked</a:t>
+              <a:t>Countdown timer on each exercise before “Next Exercise” can be clicked</a:t>
             </a:r>
             <a:endParaRPr b="0" lang="en-GB" sz="2000" spc="-1" strike="noStrike">
               <a:solidFill>
@@ -9051,16 +8889,7 @@
                 </a:solidFill>
                 <a:latin typeface="Source Sans Pro Semibold"/>
               </a:rPr>
-              <a:t>Easy to add new videos with an </a:t>
-            </a:r>
-            <a:r>
-              <a:rPr b="1" lang="en-GB" sz="2000" spc="-1" strike="noStrike">
-                <a:solidFill>
-                  <a:srgbClr val="2c3e50"/>
-                </a:solidFill>
-                <a:latin typeface="Source Sans Pro Semibold"/>
-              </a:rPr>
-              <a:t>mp4 file and an array of TimeSets</a:t>
+              <a:t>Easy to add new videos with an mp4 file and an array of TimeSets</a:t>
             </a:r>
             <a:endParaRPr b="0" lang="en-GB" sz="2000" spc="-1" strike="noStrike">
               <a:solidFill>
@@ -9084,7 +8913,7 @@
         <p:spPr>
           <a:xfrm>
             <a:off x="720360" y="2734920"/>
-            <a:ext cx="3958920" cy="2484360"/>
+            <a:ext cx="3958560" cy="2484000"/>
           </a:xfrm>
           <a:prstGeom prst="rect">
             <a:avLst/>
@@ -9107,7 +8936,7 @@
         <p:spPr>
           <a:xfrm>
             <a:off x="6480000" y="943920"/>
-            <a:ext cx="3253320" cy="1545120"/>
+            <a:ext cx="3252960" cy="1544760"/>
           </a:xfrm>
           <a:prstGeom prst="rect">
             <a:avLst/>
@@ -9130,7 +8959,7 @@
         <p:spPr>
           <a:xfrm>
             <a:off x="5940000" y="2700000"/>
-            <a:ext cx="4091400" cy="2444040"/>
+            <a:ext cx="4091040" cy="2443680"/>
           </a:xfrm>
           <a:prstGeom prst="rect">
             <a:avLst/>
@@ -9183,7 +9012,7 @@
         <p:spPr>
           <a:xfrm>
             <a:off x="360000" y="225720"/>
-            <a:ext cx="9358920" cy="717840"/>
+            <a:ext cx="9358560" cy="717480"/>
           </a:xfrm>
           <a:prstGeom prst="rect">
             <a:avLst/>
@@ -9238,7 +9067,7 @@
         <p:spPr>
           <a:xfrm>
             <a:off x="360000" y="1485000"/>
-            <a:ext cx="5039280" cy="1394280"/>
+            <a:ext cx="5038920" cy="1393920"/>
           </a:xfrm>
           <a:prstGeom prst="rect">
             <a:avLst/>
@@ -9274,7 +9103,16 @@
                 </a:solidFill>
                 <a:latin typeface="Source Sans Pro Semibold"/>
               </a:rPr>
-              <a:t>Form to enter email of meeting attendee and datetime</a:t>
+              <a:t>Form to enter email of meeting </a:t>
+            </a:r>
+            <a:r>
+              <a:rPr b="1" lang="en-GB" sz="2400" spc="-1" strike="noStrike">
+                <a:solidFill>
+                  <a:srgbClr val="2c3e50"/>
+                </a:solidFill>
+                <a:latin typeface="Source Sans Pro Semibold"/>
+              </a:rPr>
+              <a:t>attendee and datetime</a:t>
             </a:r>
             <a:endParaRPr b="0" lang="en-GB" sz="2400" spc="-1" strike="noStrike">
               <a:solidFill>
@@ -9305,7 +9143,16 @@
                 </a:solidFill>
                 <a:latin typeface="Source Sans Pro Semibold"/>
               </a:rPr>
-              <a:t>Generates ICS calendar file and emails it to both parties</a:t>
+              <a:t>Generates ICS calendar file and emails </a:t>
+            </a:r>
+            <a:r>
+              <a:rPr b="1" lang="en-GB" sz="2400" spc="-1" strike="noStrike">
+                <a:solidFill>
+                  <a:srgbClr val="2c3e50"/>
+                </a:solidFill>
+                <a:latin typeface="Source Sans Pro Semibold"/>
+              </a:rPr>
+              <a:t>it to both parties</a:t>
             </a:r>
             <a:endParaRPr b="0" lang="en-GB" sz="2400" spc="-1" strike="noStrike">
               <a:solidFill>
@@ -9329,7 +9176,7 @@
         <p:spPr>
           <a:xfrm>
             <a:off x="720360" y="3190320"/>
-            <a:ext cx="4678920" cy="1848960"/>
+            <a:ext cx="4678560" cy="1848600"/>
           </a:xfrm>
           <a:prstGeom prst="rect">
             <a:avLst/>
@@ -9352,7 +9199,7 @@
         <p:spPr>
           <a:xfrm>
             <a:off x="5760000" y="540000"/>
-            <a:ext cx="3959280" cy="1815480"/>
+            <a:ext cx="3958920" cy="1815120"/>
           </a:xfrm>
           <a:prstGeom prst="rect">
             <a:avLst/>
@@ -9375,7 +9222,7 @@
         <p:spPr>
           <a:xfrm>
             <a:off x="5803200" y="2700000"/>
-            <a:ext cx="3736440" cy="2419560"/>
+            <a:ext cx="3736080" cy="2419200"/>
           </a:xfrm>
           <a:prstGeom prst="rect">
             <a:avLst/>
@@ -9428,7 +9275,7 @@
         <p:spPr>
           <a:xfrm>
             <a:off x="360000" y="225720"/>
-            <a:ext cx="9358920" cy="717840"/>
+            <a:ext cx="9358560" cy="717480"/>
           </a:xfrm>
           <a:prstGeom prst="rect">
             <a:avLst/>
@@ -9483,7 +9330,7 @@
         <p:spPr>
           <a:xfrm>
             <a:off x="360000" y="1485000"/>
-            <a:ext cx="4860000" cy="1035000"/>
+            <a:ext cx="4859640" cy="1034640"/>
           </a:xfrm>
           <a:prstGeom prst="rect">
             <a:avLst/>
@@ -9519,7 +9366,16 @@
                 </a:solidFill>
                 <a:latin typeface="Source Sans Pro Semibold"/>
               </a:rPr>
-              <a:t>Form to submit data on Patient/Therapist information</a:t>
+              <a:t>Form to submit data on </a:t>
+            </a:r>
+            <a:r>
+              <a:rPr b="1" lang="en-GB" sz="2400" spc="-1" strike="noStrike">
+                <a:solidFill>
+                  <a:srgbClr val="2c3e50"/>
+                </a:solidFill>
+                <a:latin typeface="Source Sans Pro Semibold"/>
+              </a:rPr>
+              <a:t>Patient/Therapist information</a:t>
             </a:r>
             <a:endParaRPr b="0" lang="en-GB" sz="2400" spc="-1" strike="noStrike">
               <a:solidFill>
@@ -9543,7 +9399,7 @@
         <p:spPr>
           <a:xfrm>
             <a:off x="5400000" y="1620000"/>
-            <a:ext cx="4499280" cy="3248640"/>
+            <a:ext cx="4498920" cy="3248280"/>
           </a:xfrm>
           <a:prstGeom prst="rect">
             <a:avLst/>
@@ -9566,7 +9422,7 @@
         <p:spPr>
           <a:xfrm>
             <a:off x="987840" y="2340000"/>
-            <a:ext cx="3512160" cy="2880000"/>
+            <a:ext cx="3511800" cy="2879640"/>
           </a:xfrm>
           <a:prstGeom prst="rect">
             <a:avLst/>
@@ -9619,7 +9475,7 @@
         <p:spPr>
           <a:xfrm>
             <a:off x="360000" y="225720"/>
-            <a:ext cx="9358920" cy="717840"/>
+            <a:ext cx="9358560" cy="717480"/>
           </a:xfrm>
           <a:prstGeom prst="rect">
             <a:avLst/>
@@ -9674,7 +9530,7 @@
         <p:spPr>
           <a:xfrm>
             <a:off x="360000" y="1485000"/>
-            <a:ext cx="4679280" cy="1214280"/>
+            <a:ext cx="4678920" cy="1213920"/>
           </a:xfrm>
           <a:prstGeom prst="rect">
             <a:avLst/>
@@ -9710,16 +9566,7 @@
                 </a:solidFill>
                 <a:latin typeface="Source Sans Pro Semibold"/>
               </a:rPr>
-              <a:t>Submitted form information is </a:t>
-            </a:r>
-            <a:r>
-              <a:rPr b="1" lang="en-GB" sz="2000" spc="-1" strike="noStrike">
-                <a:solidFill>
-                  <a:srgbClr val="2c3e50"/>
-                </a:solidFill>
-                <a:latin typeface="Source Sans Pro Semibold"/>
-              </a:rPr>
-              <a:t>displayed on user stats page</a:t>
+              <a:t>Submitted form information is displayed on user stats page</a:t>
             </a:r>
             <a:endParaRPr b="0" lang="en-GB" sz="2000" spc="-1" strike="noStrike">
               <a:solidFill>
@@ -9750,25 +9597,7 @@
                 </a:solidFill>
                 <a:latin typeface="Source Sans Pro Semibold"/>
               </a:rPr>
-              <a:t>Exercise session statistics, including </a:t>
-            </a:r>
-            <a:r>
-              <a:rPr b="1" lang="en-GB" sz="2000" spc="-1" strike="noStrike">
-                <a:solidFill>
-                  <a:srgbClr val="2c3e50"/>
-                </a:solidFill>
-                <a:latin typeface="Source Sans Pro Semibold"/>
-              </a:rPr>
-              <a:t>total time spent exercising and </a:t>
-            </a:r>
-            <a:r>
-              <a:rPr b="1" lang="en-GB" sz="2000" spc="-1" strike="noStrike">
-                <a:solidFill>
-                  <a:srgbClr val="2c3e50"/>
-                </a:solidFill>
-                <a:latin typeface="Source Sans Pro Semibold"/>
-              </a:rPr>
-              <a:t>sessions completed</a:t>
+              <a:t>Exercise session statistics, including total time spent exercising and sessions completed</a:t>
             </a:r>
             <a:endParaRPr b="0" lang="en-GB" sz="2000" spc="-1" strike="noStrike">
               <a:solidFill>
@@ -9792,7 +9621,7 @@
         <p:spPr>
           <a:xfrm>
             <a:off x="5220000" y="828720"/>
-            <a:ext cx="4679640" cy="1870920"/>
+            <a:ext cx="4679280" cy="1870560"/>
           </a:xfrm>
           <a:prstGeom prst="rect">
             <a:avLst/>
@@ -9815,7 +9644,7 @@
         <p:spPr>
           <a:xfrm>
             <a:off x="5220000" y="2864160"/>
-            <a:ext cx="3678480" cy="2355120"/>
+            <a:ext cx="3678120" cy="2354760"/>
           </a:xfrm>
           <a:prstGeom prst="rect">
             <a:avLst/>
@@ -9838,7 +9667,7 @@
         <p:spPr>
           <a:xfrm>
             <a:off x="720000" y="2699280"/>
-            <a:ext cx="3685680" cy="2593440"/>
+            <a:ext cx="3685320" cy="2593080"/>
           </a:xfrm>
           <a:prstGeom prst="rect">
             <a:avLst/>
@@ -9891,7 +9720,7 @@
         <p:spPr>
           <a:xfrm>
             <a:off x="360000" y="225720"/>
-            <a:ext cx="9358920" cy="717840"/>
+            <a:ext cx="9358560" cy="717480"/>
           </a:xfrm>
           <a:prstGeom prst="rect">
             <a:avLst/>
@@ -9946,7 +9775,7 @@
         <p:spPr>
           <a:xfrm>
             <a:off x="301680" y="3013560"/>
-            <a:ext cx="5457960" cy="2026080"/>
+            <a:ext cx="5457600" cy="2025720"/>
           </a:xfrm>
           <a:prstGeom prst="rect">
             <a:avLst/>
@@ -9965,7 +9794,7 @@
         <p:spPr>
           <a:xfrm>
             <a:off x="360360" y="1485000"/>
-            <a:ext cx="5399280" cy="854640"/>
+            <a:ext cx="4859640" cy="675000"/>
           </a:xfrm>
           <a:prstGeom prst="rect">
             <a:avLst/>
@@ -9983,10 +9812,10 @@
         </p:style>
         <p:txBody>
           <a:bodyPr lIns="0" rIns="0" tIns="0" bIns="0" anchor="t">
-            <a:normAutofit/>
-          </a:bodyPr>
-          <a:p>
-            <a:pPr marL="432000" indent="-324000">
+            <a:normAutofit fontScale="97000"/>
+          </a:bodyPr>
+          <a:p>
+            <a:pPr marL="419040" indent="-314280">
               <a:lnSpc>
                 <a:spcPct val="100000"/>
               </a:lnSpc>
@@ -10006,6 +9835,7 @@
                   <a:srgbClr val="2c3e50"/>
                 </a:solidFill>
                 <a:latin typeface="Source Sans Pro Semibold"/>
+                <a:ea typeface="DejaVu Sans"/>
               </a:rPr>
               <a:t>Patient’s form information is used to provide exercise recommendations</a:t>
             </a:r>
@@ -10031,7 +9861,7 @@
         <p:spPr>
           <a:xfrm>
             <a:off x="5402160" y="1260000"/>
-            <a:ext cx="4497480" cy="1259640"/>
+            <a:ext cx="4497120" cy="1259280"/>
           </a:xfrm>
           <a:prstGeom prst="rect">
             <a:avLst/>
@@ -10054,7 +9884,7 @@
         <p:spPr>
           <a:xfrm>
             <a:off x="5985000" y="2880000"/>
-            <a:ext cx="3757680" cy="2007360"/>
+            <a:ext cx="3757320" cy="2007000"/>
           </a:xfrm>
           <a:prstGeom prst="rect">
             <a:avLst/>
@@ -10107,7 +9937,7 @@
         <p:spPr>
           <a:xfrm>
             <a:off x="360000" y="225720"/>
-            <a:ext cx="9358920" cy="717840"/>
+            <a:ext cx="9358560" cy="717480"/>
           </a:xfrm>
           <a:prstGeom prst="rect">
             <a:avLst/>
@@ -10158,7 +9988,7 @@
         <p:spPr>
           <a:xfrm>
             <a:off x="360360" y="1485000"/>
-            <a:ext cx="5399280" cy="854640"/>
+            <a:ext cx="5398920" cy="854280"/>
           </a:xfrm>
           <a:prstGeom prst="rect">
             <a:avLst/>
@@ -10199,6 +10029,7 @@
                   <a:srgbClr val="2c3e50"/>
                 </a:solidFill>
                 <a:latin typeface="Source Sans Pro Semibold"/>
+                <a:ea typeface="DejaVu Sans"/>
               </a:rPr>
               <a:t>Therapist can search patients by email</a:t>
             </a:r>
@@ -10230,6 +10061,7 @@
                   <a:srgbClr val="2c3e50"/>
                 </a:solidFill>
                 <a:latin typeface="Source Sans Pro Semibold"/>
+                <a:ea typeface="DejaVu Sans"/>
               </a:rPr>
               <a:t>Therapist can add patients and view their statistics</a:t>
             </a:r>
@@ -10255,7 +10087,7 @@
         <p:spPr>
           <a:xfrm>
             <a:off x="540000" y="2520000"/>
-            <a:ext cx="4793040" cy="2699640"/>
+            <a:ext cx="4792680" cy="2699280"/>
           </a:xfrm>
           <a:prstGeom prst="rect">
             <a:avLst/>
@@ -10278,7 +10110,7 @@
         <p:spPr>
           <a:xfrm>
             <a:off x="6300000" y="360000"/>
-            <a:ext cx="3059640" cy="3052800"/>
+            <a:ext cx="3059280" cy="3052440"/>
           </a:xfrm>
           <a:prstGeom prst="rect">
             <a:avLst/>
@@ -10301,7 +10133,7 @@
         <p:spPr>
           <a:xfrm>
             <a:off x="6300000" y="3600000"/>
-            <a:ext cx="2808720" cy="1893600"/>
+            <a:ext cx="2808360" cy="1893240"/>
           </a:xfrm>
           <a:prstGeom prst="rect">
             <a:avLst/>

</xml_diff>

<commit_message>
update presentation to latest webapp images
</commit_message>
<xml_diff>
--- a/report/neurorecovery_final_presentation.pptx
+++ b/report/neurorecovery_final_presentation.pptx
@@ -79,7 +79,7 @@
         <p:txBody>
           <a:bodyPr/>
           <a:p>
-            <a:fld id="{28F51AB0-B9C2-43C0-902D-E66943CD2CE1}" type="slidenum">
+            <a:fld id="{F14985D1-29ED-45AB-9839-64D27015A20A}" type="slidenum">
               <a:t>&lt;#&gt;</a:t>
             </a:fld>
           </a:p>
@@ -288,7 +288,7 @@
         <p:txBody>
           <a:bodyPr/>
           <a:p>
-            <a:fld id="{BFBD24B1-216B-4381-8A14-7D581EC81E50}" type="slidenum">
+            <a:fld id="{2A396121-8050-4729-B164-51A62B138567}" type="slidenum">
               <a:t>&lt;#&gt;</a:t>
             </a:fld>
           </a:p>
@@ -583,7 +583,7 @@
         <p:txBody>
           <a:bodyPr/>
           <a:p>
-            <a:fld id="{28572A8B-D132-41DC-8A6F-F7080CBC71A9}" type="slidenum">
+            <a:fld id="{A23FDA65-3540-4C0B-B708-215D30F634EB}" type="slidenum">
               <a:t>&lt;#&gt;</a:t>
             </a:fld>
           </a:p>
@@ -964,7 +964,7 @@
         <p:txBody>
           <a:bodyPr/>
           <a:p>
-            <a:fld id="{070C01C1-3C4C-4274-8C94-CA5C841C5934}" type="slidenum">
+            <a:fld id="{913511A6-05D2-4D8A-BB91-D36E856D04C2}" type="slidenum">
               <a:t>&lt;#&gt;</a:t>
             </a:fld>
           </a:p>
@@ -2104,7 +2104,7 @@
         <p:txBody>
           <a:bodyPr/>
           <a:p>
-            <a:fld id="{4B329BD9-3A02-4F3E-A426-4BE44A4254B1}" type="slidenum">
+            <a:fld id="{81D92008-6769-4086-8060-4A828AAB701F}" type="slidenum">
               <a:t>&lt;#&gt;</a:t>
             </a:fld>
           </a:p>
@@ -3559,7 +3559,7 @@
         <p:txBody>
           <a:bodyPr/>
           <a:p>
-            <a:fld id="{75BC9CE0-D02D-443D-9201-7B84F8BB846E}" type="slidenum">
+            <a:fld id="{0210D0DA-5C59-4322-AD1D-F2BD3B028A08}" type="slidenum">
               <a:t>&lt;#&gt;</a:t>
             </a:fld>
           </a:p>
@@ -3768,7 +3768,7 @@
         <p:txBody>
           <a:bodyPr/>
           <a:p>
-            <a:fld id="{ACAB2536-1559-4EE1-BA63-D2661DE9A1E5}" type="slidenum">
+            <a:fld id="{9E2525AB-3315-42F7-BDDE-EDDE1F9F3B00}" type="slidenum">
               <a:t>&lt;#&gt;</a:t>
             </a:fld>
           </a:p>
@@ -3891,7 +3891,7 @@
         <p:txBody>
           <a:bodyPr/>
           <a:p>
-            <a:fld id="{037140E7-BFF8-4012-97FD-0779483C162C}" type="slidenum">
+            <a:fld id="{7426F9E4-6309-48C6-A1D7-06FB2C2FF7A6}" type="slidenum">
               <a:t>&lt;#&gt;</a:t>
             </a:fld>
           </a:p>
@@ -4012,7 +4012,7 @@
         <p:txBody>
           <a:bodyPr/>
           <a:p>
-            <a:fld id="{78F55BB0-94A6-462C-8304-52FA087026DB}" type="slidenum">
+            <a:fld id="{9E37332A-7630-4926-8C2F-3FFE23E9EBF5}" type="slidenum">
               <a:t>&lt;#&gt;</a:t>
             </a:fld>
           </a:p>
@@ -4264,7 +4264,7 @@
         <p:txBody>
           <a:bodyPr/>
           <a:p>
-            <a:fld id="{A884280A-3E26-49F9-A861-F9C04E89E101}" type="slidenum">
+            <a:fld id="{E56B2B27-E636-41C1-A45B-C1583BD47911}" type="slidenum">
               <a:t>&lt;#&gt;</a:t>
             </a:fld>
           </a:p>
@@ -4516,7 +4516,7 @@
         <p:txBody>
           <a:bodyPr/>
           <a:p>
-            <a:fld id="{A8F85D53-8D5E-4409-A48B-B7726DF8008E}" type="slidenum">
+            <a:fld id="{9B82259B-8E41-4191-BB9A-87AC0E587F07}" type="slidenum">
               <a:t>&lt;#&gt;</a:t>
             </a:fld>
           </a:p>
@@ -4768,7 +4768,7 @@
         <p:txBody>
           <a:bodyPr/>
           <a:p>
-            <a:fld id="{F66FE73F-E486-46A2-B23C-AE042734AEF9}" type="slidenum">
+            <a:fld id="{A41BB793-5B9A-43B5-99DF-A502989EA055}" type="slidenum">
               <a:t>&lt;#&gt;</a:t>
             </a:fld>
           </a:p>
@@ -4826,7 +4826,7 @@
         <p:spPr>
           <a:xfrm>
             <a:off x="0" y="0"/>
-            <a:ext cx="10077120" cy="5667120"/>
+            <a:ext cx="10076760" cy="5666760"/>
           </a:xfrm>
           <a:prstGeom prst="rect">
             <a:avLst/>
@@ -4873,7 +4873,7 @@
         <p:spPr>
           <a:xfrm>
             <a:off x="0" y="0"/>
-            <a:ext cx="10077120" cy="3777120"/>
+            <a:ext cx="10076760" cy="3776760"/>
           </a:xfrm>
           <a:prstGeom prst="rect">
             <a:avLst/>
@@ -4927,7 +4927,7 @@
         <p:spPr>
           <a:xfrm>
             <a:off x="3420000" y="5400000"/>
-            <a:ext cx="3237120" cy="267120"/>
+            <a:ext cx="3236760" cy="266760"/>
           </a:xfrm>
           <a:prstGeom prst="rect">
             <a:avLst/>
@@ -4999,7 +4999,7 @@
         <p:spPr>
           <a:xfrm>
             <a:off x="9180000" y="5130000"/>
-            <a:ext cx="717120" cy="537120"/>
+            <a:ext cx="716760" cy="536760"/>
           </a:xfrm>
           <a:prstGeom prst="rect">
             <a:avLst/>
@@ -5040,7 +5040,7 @@
                 <a:tab algn="l" pos="0"/>
               </a:tabLst>
             </a:pPr>
-            <a:fld id="{93EFB90D-54A4-488C-B53D-C2D2C6DB5065}" type="slidenum">
+            <a:fld id="{60A2AD0F-B336-409D-A8F0-A919F00B9CE3}" type="slidenum">
               <a:rPr b="1" lang="en-GB" sz="1800" spc="-1" strike="noStrike">
                 <a:solidFill>
                   <a:srgbClr val="ffffff"/>
@@ -5071,7 +5071,7 @@
         <p:spPr>
           <a:xfrm>
             <a:off x="360000" y="5400000"/>
-            <a:ext cx="2877120" cy="267120"/>
+            <a:ext cx="2876760" cy="266760"/>
           </a:xfrm>
           <a:prstGeom prst="rect">
             <a:avLst/>
@@ -5213,7 +5213,16 @@
                 </a:solidFill>
                 <a:latin typeface="Arial"/>
               </a:rPr>
-              <a:t>Click to edit the outline text format</a:t>
+              <a:t>Click to edit the outline </a:t>
+            </a:r>
+            <a:r>
+              <a:rPr b="0" lang="en-GB" sz="3200" spc="-1" strike="noStrike">
+                <a:solidFill>
+                  <a:srgbClr val="000000"/>
+                </a:solidFill>
+                <a:latin typeface="Arial"/>
+              </a:rPr>
+              <a:t>text format</a:t>
             </a:r>
             <a:endParaRPr b="0" lang="en-GB" sz="3200" spc="-1" strike="noStrike">
               <a:solidFill>
@@ -5381,7 +5390,16 @@
                 </a:solidFill>
                 <a:latin typeface="Arial"/>
               </a:rPr>
-              <a:t>Seventh Outline Level</a:t>
+              <a:t>Seventh Outline </a:t>
+            </a:r>
+            <a:r>
+              <a:rPr b="0" lang="en-GB" sz="2000" spc="-1" strike="noStrike">
+                <a:solidFill>
+                  <a:srgbClr val="000000"/>
+                </a:solidFill>
+                <a:latin typeface="Arial"/>
+              </a:rPr>
+              <a:t>Level</a:t>
             </a:r>
             <a:endParaRPr b="0" lang="en-GB" sz="2000" spc="-1" strike="noStrike">
               <a:solidFill>
@@ -5438,7 +5456,7 @@
         <p:spPr>
           <a:xfrm>
             <a:off x="0" y="5400000"/>
-            <a:ext cx="10077120" cy="267120"/>
+            <a:ext cx="10076760" cy="266760"/>
           </a:xfrm>
           <a:prstGeom prst="rect">
             <a:avLst/>
@@ -5485,7 +5503,7 @@
         <p:spPr>
           <a:xfrm>
             <a:off x="0" y="0"/>
-            <a:ext cx="10077120" cy="1212120"/>
+            <a:ext cx="10076760" cy="1211760"/>
           </a:xfrm>
           <a:prstGeom prst="rect">
             <a:avLst/>
@@ -5532,7 +5550,7 @@
         <p:spPr>
           <a:xfrm>
             <a:off x="9315000" y="5175000"/>
-            <a:ext cx="447120" cy="447120"/>
+            <a:ext cx="446760" cy="446760"/>
           </a:xfrm>
           <a:prstGeom prst="ellipse">
             <a:avLst/>
@@ -5582,7 +5600,7 @@
         <p:spPr>
           <a:xfrm>
             <a:off x="9180000" y="5130000"/>
-            <a:ext cx="717120" cy="537120"/>
+            <a:ext cx="716760" cy="536760"/>
           </a:xfrm>
           <a:prstGeom prst="rect">
             <a:avLst/>
@@ -5608,7 +5626,7 @@
                 <a:spcPct val="100000"/>
               </a:lnSpc>
             </a:pPr>
-            <a:fld id="{D1860AA0-3781-4349-BF2E-3823F2589C04}" type="slidenum">
+            <a:fld id="{AFBB2266-B8C9-4E79-B72F-09DA6B00462F}" type="slidenum">
               <a:rPr b="1" lang="en-GB" sz="1800" spc="-1" strike="noStrike">
                 <a:solidFill>
                   <a:srgbClr val="ffffff"/>
@@ -5640,7 +5658,7 @@
         <p:spPr>
           <a:xfrm>
             <a:off x="3420000" y="5400000"/>
-            <a:ext cx="3237120" cy="267120"/>
+            <a:ext cx="3236760" cy="266760"/>
           </a:xfrm>
           <a:prstGeom prst="rect">
             <a:avLst/>
@@ -5712,7 +5730,7 @@
         <p:spPr>
           <a:xfrm>
             <a:off x="360000" y="5400000"/>
-            <a:ext cx="2877120" cy="267120"/>
+            <a:ext cx="2876760" cy="266760"/>
           </a:xfrm>
           <a:prstGeom prst="rect">
             <a:avLst/>
@@ -5797,7 +5815,16 @@
                 </a:solidFill>
                 <a:latin typeface="Arial"/>
               </a:rPr>
-              <a:t>Click to edit the title text format</a:t>
+              <a:t>Click to edit the title text </a:t>
+            </a:r>
+            <a:r>
+              <a:rPr b="0" lang="en-GB" sz="4400" spc="-1" strike="noStrike">
+                <a:solidFill>
+                  <a:srgbClr val="000000"/>
+                </a:solidFill>
+                <a:latin typeface="Arial"/>
+              </a:rPr>
+              <a:t>format</a:t>
             </a:r>
             <a:endParaRPr b="0" lang="en-GB" sz="4400" spc="-1" strike="noStrike">
               <a:solidFill>
@@ -5854,16 +5881,7 @@
                 </a:solidFill>
                 <a:latin typeface="Arial"/>
               </a:rPr>
-              <a:t>Click to edit the outline text </a:t>
-            </a:r>
-            <a:r>
-              <a:rPr b="0" lang="en-GB" sz="3200" spc="-1" strike="noStrike">
-                <a:solidFill>
-                  <a:srgbClr val="000000"/>
-                </a:solidFill>
-                <a:latin typeface="Arial"/>
-              </a:rPr>
-              <a:t>format</a:t>
+              <a:t>Click to edit the outline text format</a:t>
             </a:r>
             <a:endParaRPr b="0" lang="en-GB" sz="3200" spc="-1" strike="noStrike">
               <a:solidFill>
@@ -6092,7 +6110,7 @@
         <p:spPr>
           <a:xfrm>
             <a:off x="360000" y="2880000"/>
-            <a:ext cx="9357120" cy="716040"/>
+            <a:ext cx="9356760" cy="715680"/>
           </a:xfrm>
           <a:prstGeom prst="rect">
             <a:avLst/>
@@ -6147,7 +6165,7 @@
         <p:spPr>
           <a:xfrm>
             <a:off x="360000" y="3915000"/>
-            <a:ext cx="9357120" cy="1482120"/>
+            <a:ext cx="9356760" cy="1481760"/>
           </a:xfrm>
           <a:prstGeom prst="rect">
             <a:avLst/>
@@ -6202,7 +6220,7 @@
         <p:spPr>
           <a:xfrm>
             <a:off x="2458440" y="118080"/>
-            <a:ext cx="5278680" cy="2939040"/>
+            <a:ext cx="5278320" cy="2938680"/>
           </a:xfrm>
           <a:prstGeom prst="rect">
             <a:avLst/>
@@ -6255,7 +6273,7 @@
         <p:spPr>
           <a:xfrm>
             <a:off x="360000" y="225720"/>
-            <a:ext cx="9357120" cy="716040"/>
+            <a:ext cx="9356760" cy="715680"/>
           </a:xfrm>
           <a:prstGeom prst="rect">
             <a:avLst/>
@@ -6310,7 +6328,7 @@
         <p:spPr>
           <a:xfrm>
             <a:off x="360000" y="1485000"/>
-            <a:ext cx="6479280" cy="1034280"/>
+            <a:ext cx="6478920" cy="1033920"/>
           </a:xfrm>
           <a:prstGeom prst="rect">
             <a:avLst/>
@@ -6346,7 +6364,16 @@
                 </a:solidFill>
                 <a:latin typeface="Arial"/>
               </a:rPr>
-              <a:t>NeuroRecovery app provides a frontend button to reach MatLab Psychtoolbox Simulation</a:t>
+              <a:t>NeuroRecovery app provides a frontend button to reach MatLab </a:t>
+            </a:r>
+            <a:r>
+              <a:rPr b="1" lang="en-GB" sz="1600" spc="-1" strike="noStrike">
+                <a:solidFill>
+                  <a:srgbClr val="2c3e50"/>
+                </a:solidFill>
+                <a:latin typeface="Arial"/>
+              </a:rPr>
+              <a:t>Psychtoolbox Simulation</a:t>
             </a:r>
             <a:endParaRPr b="0" lang="en-GB" sz="1600" spc="-1" strike="noStrike">
               <a:solidFill>
@@ -6377,7 +6404,16 @@
                 </a:solidFill>
                 <a:latin typeface="Arial"/>
               </a:rPr>
-              <a:t>Local Python server on client triggers QuickAssist, RDP or Local Matlab program for Psychtoolbox Simulation</a:t>
+              <a:t>Local Python server on client triggers QuickAssist, RDP or Local </a:t>
+            </a:r>
+            <a:r>
+              <a:rPr b="1" lang="en-GB" sz="1600" spc="-1" strike="noStrike">
+                <a:solidFill>
+                  <a:srgbClr val="2c3e50"/>
+                </a:solidFill>
+                <a:latin typeface="Arial"/>
+              </a:rPr>
+              <a:t>Matlab program for Psychtoolbox Simulation</a:t>
             </a:r>
             <a:endParaRPr b="0" lang="en-GB" sz="1600" spc="-1" strike="noStrike">
               <a:solidFill>
@@ -6401,7 +6437,7 @@
         <p:spPr>
           <a:xfrm>
             <a:off x="7560000" y="890640"/>
-            <a:ext cx="2467800" cy="1987920"/>
+            <a:ext cx="2467440" cy="1987560"/>
           </a:xfrm>
           <a:prstGeom prst="rect">
             <a:avLst/>
@@ -6424,7 +6460,7 @@
         <p:spPr>
           <a:xfrm>
             <a:off x="720000" y="2933640"/>
-            <a:ext cx="3598560" cy="2644920"/>
+            <a:ext cx="3598200" cy="2644560"/>
           </a:xfrm>
           <a:prstGeom prst="rect">
             <a:avLst/>
@@ -6447,7 +6483,7 @@
         <p:spPr>
           <a:xfrm>
             <a:off x="5400000" y="2962440"/>
-            <a:ext cx="4498560" cy="2433240"/>
+            <a:ext cx="4498200" cy="2432880"/>
           </a:xfrm>
           <a:prstGeom prst="rect">
             <a:avLst/>
@@ -6500,7 +6536,7 @@
         <p:spPr>
           <a:xfrm>
             <a:off x="360000" y="225720"/>
-            <a:ext cx="9357120" cy="716040"/>
+            <a:ext cx="9356760" cy="715680"/>
           </a:xfrm>
           <a:prstGeom prst="rect">
             <a:avLst/>
@@ -6555,7 +6591,7 @@
         <p:spPr>
           <a:xfrm>
             <a:off x="360000" y="1485000"/>
-            <a:ext cx="8998920" cy="2833920"/>
+            <a:ext cx="8998560" cy="2833560"/>
           </a:xfrm>
           <a:prstGeom prst="rect">
             <a:avLst/>
@@ -6684,7 +6720,16 @@
                 </a:solidFill>
                 <a:latin typeface="Arial"/>
               </a:rPr>
-              <a:t>Hosted in a Kubernetes Cluster(K3s) running in an Azure RHEL Virtual Machine</a:t>
+              <a:t>Hosted in a Kubernetes Cluster(K3s) running in an Azure RHEL </a:t>
+            </a:r>
+            <a:r>
+              <a:rPr b="1" lang="en-GB" sz="2400" spc="-1" strike="noStrike">
+                <a:solidFill>
+                  <a:srgbClr val="2c3e50"/>
+                </a:solidFill>
+                <a:latin typeface="Arial"/>
+              </a:rPr>
+              <a:t>Virtual Machine</a:t>
             </a:r>
             <a:endParaRPr b="0" lang="en-GB" sz="2400" spc="-1" strike="noStrike">
               <a:solidFill>
@@ -6769,7 +6814,7 @@
         <p:spPr>
           <a:xfrm>
             <a:off x="360000" y="225720"/>
-            <a:ext cx="9357120" cy="716040"/>
+            <a:ext cx="9356760" cy="715680"/>
           </a:xfrm>
           <a:prstGeom prst="rect">
             <a:avLst/>
@@ -6824,7 +6869,7 @@
         <p:spPr>
           <a:xfrm>
             <a:off x="360000" y="1485000"/>
-            <a:ext cx="5218200" cy="3733200"/>
+            <a:ext cx="5217840" cy="3732840"/>
           </a:xfrm>
           <a:prstGeom prst="rect">
             <a:avLst/>
@@ -6860,7 +6905,16 @@
                 </a:solidFill>
                 <a:latin typeface="Arial"/>
               </a:rPr>
-              <a:t>Single Page Application(SPA) returns a HTML, CSS and JavaScript bundle to user’s browser</a:t>
+              <a:t>Single Page Application(SPA) returns a HTML, CSS and JavaScript </a:t>
+            </a:r>
+            <a:r>
+              <a:rPr b="1" lang="en-GB" sz="1600" spc="-1" strike="noStrike">
+                <a:solidFill>
+                  <a:srgbClr val="2c3e50"/>
+                </a:solidFill>
+                <a:latin typeface="Arial"/>
+              </a:rPr>
+              <a:t>bundle to user’s browser</a:t>
             </a:r>
             <a:endParaRPr b="0" lang="en-GB" sz="1600" spc="-1" strike="noStrike">
               <a:solidFill>
@@ -6922,7 +6976,16 @@
                 </a:solidFill>
                 <a:latin typeface="Arial"/>
               </a:rPr>
-              <a:t>Backend interaction requires requests to be made from the user’s browser using the JavaScript fetch API</a:t>
+              <a:t>Backend interaction requires requests to be made from the user’s </a:t>
+            </a:r>
+            <a:r>
+              <a:rPr b="1" lang="en-GB" sz="1600" spc="-1" strike="noStrike">
+                <a:solidFill>
+                  <a:srgbClr val="2c3e50"/>
+                </a:solidFill>
+                <a:latin typeface="Arial"/>
+              </a:rPr>
+              <a:t>browser using the JavaScript fetch API</a:t>
             </a:r>
             <a:endParaRPr b="0" lang="en-GB" sz="1600" spc="-1" strike="noStrike">
               <a:solidFill>
@@ -6953,7 +7016,16 @@
                 </a:solidFill>
                 <a:latin typeface="Arial"/>
               </a:rPr>
-              <a:t>Component-based frontend development, each page in the app is a separate component</a:t>
+              <a:t>Component-based frontend development, each page in the app is a </a:t>
+            </a:r>
+            <a:r>
+              <a:rPr b="1" lang="en-GB" sz="1600" spc="-1" strike="noStrike">
+                <a:solidFill>
+                  <a:srgbClr val="2c3e50"/>
+                </a:solidFill>
+                <a:latin typeface="Arial"/>
+              </a:rPr>
+              <a:t>separate component</a:t>
             </a:r>
             <a:endParaRPr b="0" lang="en-GB" sz="1600" spc="-1" strike="noStrike">
               <a:solidFill>
@@ -6977,7 +7049,7 @@
         <p:spPr>
           <a:xfrm>
             <a:off x="7380720" y="217080"/>
-            <a:ext cx="1798200" cy="2841120"/>
+            <a:ext cx="1797840" cy="2840760"/>
           </a:xfrm>
           <a:prstGeom prst="rect">
             <a:avLst/>
@@ -7000,7 +7072,7 @@
         <p:spPr>
           <a:xfrm>
             <a:off x="5682240" y="3157560"/>
-            <a:ext cx="3466080" cy="2420640"/>
+            <a:ext cx="3465720" cy="2420280"/>
           </a:xfrm>
           <a:prstGeom prst="rect">
             <a:avLst/>
@@ -7053,7 +7125,7 @@
         <p:spPr>
           <a:xfrm>
             <a:off x="360000" y="225720"/>
-            <a:ext cx="9357120" cy="716040"/>
+            <a:ext cx="9356760" cy="715680"/>
           </a:xfrm>
           <a:prstGeom prst="rect">
             <a:avLst/>
@@ -7108,7 +7180,7 @@
         <p:spPr>
           <a:xfrm>
             <a:off x="360000" y="1485000"/>
-            <a:ext cx="4858200" cy="3733200"/>
+            <a:ext cx="4857840" cy="3732840"/>
           </a:xfrm>
           <a:prstGeom prst="rect">
             <a:avLst/>
@@ -7261,7 +7333,7 @@
         <p:spPr>
           <a:xfrm>
             <a:off x="5580000" y="720000"/>
-            <a:ext cx="3424320" cy="4259880"/>
+            <a:ext cx="3423960" cy="4259520"/>
           </a:xfrm>
           <a:prstGeom prst="rect">
             <a:avLst/>
@@ -7314,7 +7386,7 @@
         <p:spPr>
           <a:xfrm>
             <a:off x="360000" y="225720"/>
-            <a:ext cx="9357120" cy="716040"/>
+            <a:ext cx="9356760" cy="715680"/>
           </a:xfrm>
           <a:prstGeom prst="rect">
             <a:avLst/>
@@ -7369,7 +7441,7 @@
         <p:spPr>
           <a:xfrm>
             <a:off x="360000" y="1485000"/>
-            <a:ext cx="4858200" cy="3733200"/>
+            <a:ext cx="4857840" cy="3732840"/>
           </a:xfrm>
           <a:prstGeom prst="rect">
             <a:avLst/>
@@ -7491,7 +7563,7 @@
         <p:spPr>
           <a:xfrm>
             <a:off x="5910120" y="428760"/>
-            <a:ext cx="3983760" cy="2810160"/>
+            <a:ext cx="3983400" cy="2809800"/>
           </a:xfrm>
           <a:prstGeom prst="rect">
             <a:avLst/>
@@ -7514,7 +7586,7 @@
         <p:spPr>
           <a:xfrm>
             <a:off x="5940000" y="3420000"/>
-            <a:ext cx="2292840" cy="1923840"/>
+            <a:ext cx="2292480" cy="1923480"/>
           </a:xfrm>
           <a:prstGeom prst="rect">
             <a:avLst/>
@@ -7567,7 +7639,7 @@
         <p:spPr>
           <a:xfrm>
             <a:off x="360000" y="225720"/>
-            <a:ext cx="9357120" cy="716040"/>
+            <a:ext cx="9356760" cy="715680"/>
           </a:xfrm>
           <a:prstGeom prst="rect">
             <a:avLst/>
@@ -7622,7 +7694,7 @@
         <p:spPr>
           <a:xfrm>
             <a:off x="360000" y="1485000"/>
-            <a:ext cx="4858200" cy="3733200"/>
+            <a:ext cx="4857840" cy="3732840"/>
           </a:xfrm>
           <a:prstGeom prst="rect">
             <a:avLst/>
@@ -7775,7 +7847,7 @@
         <p:spPr>
           <a:xfrm>
             <a:off x="5580000" y="943560"/>
-            <a:ext cx="4317480" cy="1452240"/>
+            <a:ext cx="4317120" cy="1451880"/>
           </a:xfrm>
           <a:prstGeom prst="rect">
             <a:avLst/>
@@ -7798,7 +7870,7 @@
         <p:spPr>
           <a:xfrm>
             <a:off x="5220000" y="2700000"/>
-            <a:ext cx="4809240" cy="2338200"/>
+            <a:ext cx="4808880" cy="2337840"/>
           </a:xfrm>
           <a:prstGeom prst="rect">
             <a:avLst/>
@@ -7851,7 +7923,7 @@
         <p:spPr>
           <a:xfrm>
             <a:off x="360000" y="225720"/>
-            <a:ext cx="9357120" cy="716040"/>
+            <a:ext cx="9356760" cy="715680"/>
           </a:xfrm>
           <a:prstGeom prst="rect">
             <a:avLst/>
@@ -7906,7 +7978,7 @@
         <p:spPr>
           <a:xfrm>
             <a:off x="360000" y="1485000"/>
-            <a:ext cx="4858200" cy="3733200"/>
+            <a:ext cx="4857840" cy="3732840"/>
           </a:xfrm>
           <a:prstGeom prst="rect">
             <a:avLst/>
@@ -8059,7 +8131,7 @@
         <p:spPr>
           <a:xfrm>
             <a:off x="5760000" y="704880"/>
-            <a:ext cx="3937680" cy="4333320"/>
+            <a:ext cx="3937320" cy="4332960"/>
           </a:xfrm>
           <a:prstGeom prst="rect">
             <a:avLst/>
@@ -8112,7 +8184,7 @@
         <p:spPr>
           <a:xfrm>
             <a:off x="360000" y="225720"/>
-            <a:ext cx="9357120" cy="716040"/>
+            <a:ext cx="9356760" cy="715680"/>
           </a:xfrm>
           <a:prstGeom prst="rect">
             <a:avLst/>
@@ -8167,7 +8239,7 @@
         <p:spPr>
           <a:xfrm>
             <a:off x="360000" y="1485000"/>
-            <a:ext cx="8819640" cy="2834640"/>
+            <a:ext cx="8819280" cy="2834280"/>
           </a:xfrm>
           <a:prstGeom prst="rect">
             <a:avLst/>
@@ -8474,7 +8546,7 @@
         <p:spPr>
           <a:xfrm>
             <a:off x="360000" y="225720"/>
-            <a:ext cx="9357120" cy="717120"/>
+            <a:ext cx="9356760" cy="716760"/>
           </a:xfrm>
           <a:prstGeom prst="rect">
             <a:avLst/>
@@ -8529,7 +8601,7 @@
         <p:spPr>
           <a:xfrm>
             <a:off x="180000" y="1485000"/>
-            <a:ext cx="5939280" cy="854280"/>
+            <a:ext cx="5938920" cy="853920"/>
           </a:xfrm>
           <a:prstGeom prst="rect">
             <a:avLst/>
@@ -8651,7 +8723,7 @@
         <p:spPr>
           <a:xfrm>
             <a:off x="543600" y="2700000"/>
-            <a:ext cx="5393520" cy="2517480"/>
+            <a:ext cx="5393160" cy="2517120"/>
           </a:xfrm>
           <a:prstGeom prst="rect">
             <a:avLst/>
@@ -8674,7 +8746,7 @@
         <p:spPr>
           <a:xfrm>
             <a:off x="6480000" y="900000"/>
-            <a:ext cx="3417480" cy="4219200"/>
+            <a:ext cx="3417120" cy="4218840"/>
           </a:xfrm>
           <a:prstGeom prst="rect">
             <a:avLst/>
@@ -8727,7 +8799,7 @@
         <p:spPr>
           <a:xfrm>
             <a:off x="360000" y="225720"/>
-            <a:ext cx="9357120" cy="716040"/>
+            <a:ext cx="9356760" cy="715680"/>
           </a:xfrm>
           <a:prstGeom prst="rect">
             <a:avLst/>
@@ -8782,7 +8854,7 @@
         <p:spPr>
           <a:xfrm>
             <a:off x="360000" y="1485000"/>
-            <a:ext cx="5580000" cy="855000"/>
+            <a:ext cx="5579640" cy="854640"/>
           </a:xfrm>
           <a:prstGeom prst="rect">
             <a:avLst/>
@@ -8872,13 +8944,13 @@
         </p:blipFill>
         <p:spPr>
           <a:xfrm>
-            <a:off x="720360" y="2734920"/>
-            <a:ext cx="3957120" cy="2482560"/>
-          </a:xfrm>
-          <a:prstGeom prst="rect">
-            <a:avLst/>
-          </a:prstGeom>
-          <a:ln w="10800">
+            <a:off x="6480000" y="943920"/>
+            <a:ext cx="3251160" cy="1542960"/>
+          </a:xfrm>
+          <a:prstGeom prst="rect">
+            <a:avLst/>
+          </a:prstGeom>
+          <a:ln w="0">
             <a:noFill/>
           </a:ln>
         </p:spPr>
@@ -8895,8 +8967,8 @@
         </p:blipFill>
         <p:spPr>
           <a:xfrm>
-            <a:off x="6480000" y="943920"/>
-            <a:ext cx="3251520" cy="1543320"/>
+            <a:off x="5940000" y="2700000"/>
+            <a:ext cx="4089240" cy="2441880"/>
           </a:xfrm>
           <a:prstGeom prst="rect">
             <a:avLst/>
@@ -8918,8 +8990,8 @@
         </p:blipFill>
         <p:spPr>
           <a:xfrm>
-            <a:off x="5940000" y="2700000"/>
-            <a:ext cx="4089600" cy="2442240"/>
+            <a:off x="720000" y="2700000"/>
+            <a:ext cx="4251240" cy="2520000"/>
           </a:xfrm>
           <a:prstGeom prst="rect">
             <a:avLst/>
@@ -8972,7 +9044,7 @@
         <p:spPr>
           <a:xfrm>
             <a:off x="360000" y="225720"/>
-            <a:ext cx="9357120" cy="716040"/>
+            <a:ext cx="9356760" cy="715680"/>
           </a:xfrm>
           <a:prstGeom prst="rect">
             <a:avLst/>
@@ -9027,7 +9099,7 @@
         <p:spPr>
           <a:xfrm>
             <a:off x="360000" y="1485000"/>
-            <a:ext cx="5218920" cy="1033920"/>
+            <a:ext cx="5218560" cy="1033560"/>
           </a:xfrm>
           <a:prstGeom prst="rect">
             <a:avLst/>
@@ -9117,13 +9189,13 @@
         </p:blipFill>
         <p:spPr>
           <a:xfrm>
-            <a:off x="720360" y="3190320"/>
-            <a:ext cx="4677120" cy="1847160"/>
-          </a:xfrm>
-          <a:prstGeom prst="rect">
-            <a:avLst/>
-          </a:prstGeom>
-          <a:ln w="10800">
+            <a:off x="6120000" y="704880"/>
+            <a:ext cx="3597120" cy="1648440"/>
+          </a:xfrm>
+          <a:prstGeom prst="rect">
+            <a:avLst/>
+          </a:prstGeom>
+          <a:ln w="0">
             <a:noFill/>
           </a:ln>
         </p:spPr>
@@ -9140,8 +9212,8 @@
         </p:blipFill>
         <p:spPr>
           <a:xfrm>
-            <a:off x="6120000" y="704880"/>
-            <a:ext cx="3597480" cy="1648800"/>
+            <a:off x="5803200" y="2700000"/>
+            <a:ext cx="3734280" cy="2417400"/>
           </a:xfrm>
           <a:prstGeom prst="rect">
             <a:avLst/>
@@ -9163,8 +9235,8 @@
         </p:blipFill>
         <p:spPr>
           <a:xfrm>
-            <a:off x="5803200" y="2700000"/>
-            <a:ext cx="3734640" cy="2417760"/>
+            <a:off x="540000" y="2968560"/>
+            <a:ext cx="4680000" cy="2212560"/>
           </a:xfrm>
           <a:prstGeom prst="rect">
             <a:avLst/>
@@ -9217,7 +9289,7 @@
         <p:spPr>
           <a:xfrm>
             <a:off x="360000" y="225720"/>
-            <a:ext cx="9357120" cy="716040"/>
+            <a:ext cx="9356760" cy="715680"/>
           </a:xfrm>
           <a:prstGeom prst="rect">
             <a:avLst/>
@@ -9272,7 +9344,7 @@
         <p:spPr>
           <a:xfrm>
             <a:off x="360720" y="1485000"/>
-            <a:ext cx="4858200" cy="493920"/>
+            <a:ext cx="4857840" cy="493560"/>
           </a:xfrm>
           <a:prstGeom prst="rect">
             <a:avLst/>
@@ -9332,7 +9404,7 @@
         <p:spPr>
           <a:xfrm>
             <a:off x="5400000" y="1620000"/>
-            <a:ext cx="4497480" cy="3246840"/>
+            <a:ext cx="4497120" cy="3246480"/>
           </a:xfrm>
           <a:prstGeom prst="rect">
             <a:avLst/>
@@ -9355,7 +9427,7 @@
         <p:spPr>
           <a:xfrm>
             <a:off x="987840" y="2340000"/>
-            <a:ext cx="3510360" cy="2878200"/>
+            <a:ext cx="3510000" cy="2877840"/>
           </a:xfrm>
           <a:prstGeom prst="rect">
             <a:avLst/>
@@ -9408,7 +9480,7 @@
         <p:spPr>
           <a:xfrm>
             <a:off x="360000" y="225720"/>
-            <a:ext cx="9357120" cy="716040"/>
+            <a:ext cx="9356760" cy="715680"/>
           </a:xfrm>
           <a:prstGeom prst="rect">
             <a:avLst/>
@@ -9463,7 +9535,7 @@
         <p:spPr>
           <a:xfrm>
             <a:off x="360000" y="1485000"/>
-            <a:ext cx="4679640" cy="1034640"/>
+            <a:ext cx="4679280" cy="1034280"/>
           </a:xfrm>
           <a:prstGeom prst="rect">
             <a:avLst/>
@@ -9554,7 +9626,7 @@
         <p:spPr>
           <a:xfrm>
             <a:off x="5221080" y="829800"/>
-            <a:ext cx="4677840" cy="1869120"/>
+            <a:ext cx="4677480" cy="1868760"/>
           </a:xfrm>
           <a:prstGeom prst="rect">
             <a:avLst/>
@@ -9577,7 +9649,7 @@
         <p:spPr>
           <a:xfrm>
             <a:off x="5220000" y="2864160"/>
-            <a:ext cx="3676680" cy="2353320"/>
+            <a:ext cx="3676320" cy="2352960"/>
           </a:xfrm>
           <a:prstGeom prst="rect">
             <a:avLst/>
@@ -9599,8 +9671,8 @@
         </p:blipFill>
         <p:spPr>
           <a:xfrm>
-            <a:off x="720000" y="2699280"/>
-            <a:ext cx="3683880" cy="2591640"/>
+            <a:off x="720000" y="2874240"/>
+            <a:ext cx="3060000" cy="2705760"/>
           </a:xfrm>
           <a:prstGeom prst="rect">
             <a:avLst/>
@@ -9653,7 +9725,7 @@
         <p:spPr>
           <a:xfrm>
             <a:off x="360000" y="225720"/>
-            <a:ext cx="9357120" cy="716040"/>
+            <a:ext cx="9356760" cy="715680"/>
           </a:xfrm>
           <a:prstGeom prst="rect">
             <a:avLst/>
@@ -9695,39 +9767,16 @@
           </a:p>
         </p:txBody>
       </p:sp>
-      <p:pic>
-        <p:nvPicPr>
-          <p:cNvPr id="116" name="" descr=""/>
-          <p:cNvPicPr/>
-          <p:nvPr/>
-        </p:nvPicPr>
-        <p:blipFill>
-          <a:blip r:embed="rId1"/>
-          <a:stretch/>
-        </p:blipFill>
-        <p:spPr>
-          <a:xfrm>
-            <a:off x="301680" y="3013560"/>
-            <a:ext cx="5456160" cy="2024280"/>
-          </a:xfrm>
-          <a:prstGeom prst="rect">
-            <a:avLst/>
-          </a:prstGeom>
-          <a:ln w="0">
-            <a:noFill/>
-          </a:ln>
-        </p:spPr>
-      </p:pic>
-      <p:sp>
-        <p:nvSpPr>
-          <p:cNvPr id="117" name="PlaceHolder 6"/>
+      <p:sp>
+        <p:nvSpPr>
+          <p:cNvPr id="116" name="PlaceHolder 6"/>
           <p:cNvSpPr/>
           <p:nvPr/>
         </p:nvSpPr>
         <p:spPr>
           <a:xfrm>
             <a:off x="360360" y="1485000"/>
-            <a:ext cx="4678920" cy="494280"/>
+            <a:ext cx="4678560" cy="493920"/>
           </a:xfrm>
           <a:prstGeom prst="rect">
             <a:avLst/>
@@ -9783,6 +9832,29 @@
       </p:sp>
       <p:pic>
         <p:nvPicPr>
+          <p:cNvPr id="117" name="" descr=""/>
+          <p:cNvPicPr/>
+          <p:nvPr/>
+        </p:nvPicPr>
+        <p:blipFill>
+          <a:blip r:embed="rId1"/>
+          <a:stretch/>
+        </p:blipFill>
+        <p:spPr>
+          <a:xfrm>
+            <a:off x="5402160" y="1260000"/>
+            <a:ext cx="4495320" cy="1257480"/>
+          </a:xfrm>
+          <a:prstGeom prst="rect">
+            <a:avLst/>
+          </a:prstGeom>
+          <a:ln w="0">
+            <a:noFill/>
+          </a:ln>
+        </p:spPr>
+      </p:pic>
+      <p:pic>
+        <p:nvPicPr>
           <p:cNvPr id="118" name="" descr=""/>
           <p:cNvPicPr/>
           <p:nvPr/>
@@ -9793,8 +9865,8 @@
         </p:blipFill>
         <p:spPr>
           <a:xfrm>
-            <a:off x="5402160" y="1260000"/>
-            <a:ext cx="4495680" cy="1257840"/>
+            <a:off x="5985000" y="2880000"/>
+            <a:ext cx="3755520" cy="2005200"/>
           </a:xfrm>
           <a:prstGeom prst="rect">
             <a:avLst/>
@@ -9816,8 +9888,8 @@
         </p:blipFill>
         <p:spPr>
           <a:xfrm>
-            <a:off x="5985000" y="2880000"/>
-            <a:ext cx="3755880" cy="2005560"/>
+            <a:off x="360000" y="3029400"/>
+            <a:ext cx="5221440" cy="2010600"/>
           </a:xfrm>
           <a:prstGeom prst="rect">
             <a:avLst/>
@@ -9870,7 +9942,7 @@
         <p:spPr>
           <a:xfrm>
             <a:off x="360000" y="225720"/>
-            <a:ext cx="9357120" cy="716040"/>
+            <a:ext cx="9356760" cy="715680"/>
           </a:xfrm>
           <a:prstGeom prst="rect">
             <a:avLst/>
@@ -9921,7 +9993,7 @@
         <p:spPr>
           <a:xfrm>
             <a:off x="360000" y="1485000"/>
-            <a:ext cx="5397480" cy="674280"/>
+            <a:ext cx="5397120" cy="673920"/>
           </a:xfrm>
           <a:prstGeom prst="rect">
             <a:avLst/>
@@ -10019,8 +10091,8 @@
         </p:blipFill>
         <p:spPr>
           <a:xfrm>
-            <a:off x="540000" y="2520000"/>
-            <a:ext cx="4791240" cy="2697840"/>
+            <a:off x="6300000" y="360000"/>
+            <a:ext cx="3057480" cy="3050640"/>
           </a:xfrm>
           <a:prstGeom prst="rect">
             <a:avLst/>
@@ -10042,8 +10114,8 @@
         </p:blipFill>
         <p:spPr>
           <a:xfrm>
-            <a:off x="6300000" y="360000"/>
-            <a:ext cx="3057840" cy="3051000"/>
+            <a:off x="6300000" y="3600000"/>
+            <a:ext cx="2806560" cy="1891440"/>
           </a:xfrm>
           <a:prstGeom prst="rect">
             <a:avLst/>
@@ -10065,8 +10137,8 @@
         </p:blipFill>
         <p:spPr>
           <a:xfrm>
-            <a:off x="6300000" y="3600000"/>
-            <a:ext cx="2806920" cy="1891800"/>
+            <a:off x="720000" y="2717280"/>
+            <a:ext cx="3922560" cy="2682720"/>
           </a:xfrm>
           <a:prstGeom prst="rect">
             <a:avLst/>

</xml_diff>